<commit_message>
updated slides for MKE talk
</commit_message>
<xml_diff>
--- a/slides/Monodroid101.pptx
+++ b/slides/Monodroid101.pptx
@@ -1,6 +1,6 @@
 
 <file path=ppt/presentation.xml><?xml version="1.0" encoding="utf-8"?>
-<p:presentation xmlns:a="http://schemas.openxmlformats.org/drawingml/2006/main" xmlns:r="http://schemas.openxmlformats.org/officeDocument/2006/relationships" xmlns:mc="http://schemas.openxmlformats.org/markup-compatibility/2006" xmlns:mv="urn:schemas-microsoft-com:mac:vml" xmlns:p="http://schemas.openxmlformats.org/presentationml/2006/main" mc:Ignorable="mv" mc:PreserveAttributes="mv:*" saveSubsetFonts="1">
+<p:presentation xmlns:a="http://schemas.openxmlformats.org/drawingml/2006/main" xmlns:r="http://schemas.openxmlformats.org/officeDocument/2006/relationships" xmlns:p="http://schemas.openxmlformats.org/presentationml/2006/main" saveSubsetFonts="1">
   <p:sldMasterIdLst>
     <p:sldMasterId id="2147483672" r:id="rId1"/>
   </p:sldMasterIdLst>
@@ -135,7 +135,7 @@
 </file>
 
 <file path=ppt/notesMasters/notesMaster1.xml><?xml version="1.0" encoding="utf-8"?>
-<p:notesMaster xmlns:a="http://schemas.openxmlformats.org/drawingml/2006/main" xmlns:r="http://schemas.openxmlformats.org/officeDocument/2006/relationships" xmlns:mc="http://schemas.openxmlformats.org/markup-compatibility/2006" xmlns:mv="urn:schemas-microsoft-com:mac:vml" xmlns:p="http://schemas.openxmlformats.org/presentationml/2006/main" mc:Ignorable="mv" mc:PreserveAttributes="mv:*">
+<p:notesMaster xmlns:a="http://schemas.openxmlformats.org/drawingml/2006/main" xmlns:r="http://schemas.openxmlformats.org/officeDocument/2006/relationships" xmlns:p="http://schemas.openxmlformats.org/presentationml/2006/main">
   <p:cSld>
     <p:bg>
       <p:bgRef idx="1001">
@@ -221,7 +221,7 @@
             <a:fld id="{122FED64-F4A4-1445-90DE-B431FA7DF8D3}" type="datetimeFigureOut">
               <a:rPr lang="en-US" smtClean="0"/>
               <a:pPr/>
-              <a:t>11/9/10</a:t>
+              <a:t>1/5/2011</a:t>
             </a:fld>
             <a:endParaRPr lang="en-US" dirty="0"/>
           </a:p>
@@ -492,7 +492,7 @@
 </file>
 
 <file path=ppt/notesSlides/notesSlide1.xml><?xml version="1.0" encoding="utf-8"?>
-<p:notes xmlns:a="http://schemas.openxmlformats.org/drawingml/2006/main" xmlns:r="http://schemas.openxmlformats.org/officeDocument/2006/relationships" xmlns:mc="http://schemas.openxmlformats.org/markup-compatibility/2006" xmlns:mv="urn:schemas-microsoft-com:mac:vml" xmlns:p="http://schemas.openxmlformats.org/presentationml/2006/main" mc:Ignorable="mv" mc:PreserveAttributes="mv:*">
+<p:notes xmlns:a="http://schemas.openxmlformats.org/drawingml/2006/main" xmlns:r="http://schemas.openxmlformats.org/officeDocument/2006/relationships" xmlns:p="http://schemas.openxmlformats.org/presentationml/2006/main">
   <p:cSld>
     <p:spTree>
       <p:nvGrpSpPr>
@@ -637,7 +637,7 @@
 </file>
 
 <file path=ppt/notesSlides/notesSlide2.xml><?xml version="1.0" encoding="utf-8"?>
-<p:notes xmlns:a="http://schemas.openxmlformats.org/drawingml/2006/main" xmlns:r="http://schemas.openxmlformats.org/officeDocument/2006/relationships" xmlns:mc="http://schemas.openxmlformats.org/markup-compatibility/2006" xmlns:mv="urn:schemas-microsoft-com:mac:vml" xmlns:p="http://schemas.openxmlformats.org/presentationml/2006/main" mc:Ignorable="mv" mc:PreserveAttributes="mv:*">
+<p:notes xmlns:a="http://schemas.openxmlformats.org/drawingml/2006/main" xmlns:r="http://schemas.openxmlformats.org/officeDocument/2006/relationships" xmlns:p="http://schemas.openxmlformats.org/presentationml/2006/main">
   <p:cSld>
     <p:spTree>
       <p:nvGrpSpPr>
@@ -771,7 +771,7 @@
 </file>
 
 <file path=ppt/notesSlides/notesSlide3.xml><?xml version="1.0" encoding="utf-8"?>
-<p:notes xmlns:a="http://schemas.openxmlformats.org/drawingml/2006/main" xmlns:r="http://schemas.openxmlformats.org/officeDocument/2006/relationships" xmlns:mc="http://schemas.openxmlformats.org/markup-compatibility/2006" xmlns:mv="urn:schemas-microsoft-com:mac:vml" xmlns:p="http://schemas.openxmlformats.org/presentationml/2006/main" mc:Ignorable="mv" mc:PreserveAttributes="mv:*">
+<p:notes xmlns:a="http://schemas.openxmlformats.org/drawingml/2006/main" xmlns:r="http://schemas.openxmlformats.org/officeDocument/2006/relationships" xmlns:p="http://schemas.openxmlformats.org/presentationml/2006/main">
   <p:cSld>
     <p:spTree>
       <p:nvGrpSpPr>
@@ -884,7 +884,7 @@
 </file>
 
 <file path=ppt/notesSlides/notesSlide4.xml><?xml version="1.0" encoding="utf-8"?>
-<p:notes xmlns:a="http://schemas.openxmlformats.org/drawingml/2006/main" xmlns:r="http://schemas.openxmlformats.org/officeDocument/2006/relationships" xmlns:mc="http://schemas.openxmlformats.org/markup-compatibility/2006" xmlns:mv="urn:schemas-microsoft-com:mac:vml" xmlns:p="http://schemas.openxmlformats.org/presentationml/2006/main" mc:Ignorable="mv" mc:PreserveAttributes="mv:*">
+<p:notes xmlns:a="http://schemas.openxmlformats.org/drawingml/2006/main" xmlns:r="http://schemas.openxmlformats.org/officeDocument/2006/relationships" xmlns:p="http://schemas.openxmlformats.org/presentationml/2006/main">
   <p:cSld>
     <p:spTree>
       <p:nvGrpSpPr>
@@ -974,7 +974,7 @@
 </file>
 
 <file path=ppt/slideLayouts/slideLayout1.xml><?xml version="1.0" encoding="utf-8"?>
-<p:sldLayout xmlns:a="http://schemas.openxmlformats.org/drawingml/2006/main" xmlns:r="http://schemas.openxmlformats.org/officeDocument/2006/relationships" xmlns:mc="http://schemas.openxmlformats.org/markup-compatibility/2006" xmlns:mv="urn:schemas-microsoft-com:mac:vml" xmlns:p="http://schemas.openxmlformats.org/presentationml/2006/main" mc:Ignorable="mv" mc:PreserveAttributes="mv:*" type="title" preserve="1">
+<p:sldLayout xmlns:a="http://schemas.openxmlformats.org/drawingml/2006/main" xmlns:r="http://schemas.openxmlformats.org/officeDocument/2006/relationships" xmlns:p="http://schemas.openxmlformats.org/presentationml/2006/main" type="title" preserve="1">
   <p:cSld name="Title Slide">
     <p:spTree>
       <p:nvGrpSpPr>
@@ -1155,7 +1155,7 @@
             <a:fld id="{DC14A1DA-BDB1-4693-9FC0-65DE61D7C2F9}" type="datetimeFigureOut">
               <a:rPr lang="en-US" smtClean="0"/>
               <a:pPr/>
-              <a:t>11/9/10</a:t>
+              <a:t>1/5/2011</a:t>
             </a:fld>
             <a:endParaRPr lang="en-US"/>
           </a:p>
@@ -1213,7 +1213,7 @@
 </file>
 
 <file path=ppt/slideLayouts/slideLayout10.xml><?xml version="1.0" encoding="utf-8"?>
-<p:sldLayout xmlns:a="http://schemas.openxmlformats.org/drawingml/2006/main" xmlns:r="http://schemas.openxmlformats.org/officeDocument/2006/relationships" xmlns:mc="http://schemas.openxmlformats.org/markup-compatibility/2006" xmlns:mv="urn:schemas-microsoft-com:mac:vml" xmlns:p="http://schemas.openxmlformats.org/presentationml/2006/main" mc:Ignorable="mv" mc:PreserveAttributes="mv:*" type="vertTx" preserve="1">
+<p:sldLayout xmlns:a="http://schemas.openxmlformats.org/drawingml/2006/main" xmlns:r="http://schemas.openxmlformats.org/officeDocument/2006/relationships" xmlns:p="http://schemas.openxmlformats.org/presentationml/2006/main" type="vertTx" preserve="1">
   <p:cSld name="Title and Vertical Text">
     <p:spTree>
       <p:nvGrpSpPr>
@@ -1322,7 +1322,7 @@
             <a:fld id="{DC14A1DA-BDB1-4693-9FC0-65DE61D7C2F9}" type="datetimeFigureOut">
               <a:rPr lang="en-US" smtClean="0"/>
               <a:pPr/>
-              <a:t>11/9/10</a:t>
+              <a:t>1/5/2011</a:t>
             </a:fld>
             <a:endParaRPr lang="en-US"/>
           </a:p>
@@ -1380,7 +1380,7 @@
 </file>
 
 <file path=ppt/slideLayouts/slideLayout11.xml><?xml version="1.0" encoding="utf-8"?>
-<p:sldLayout xmlns:a="http://schemas.openxmlformats.org/drawingml/2006/main" xmlns:r="http://schemas.openxmlformats.org/officeDocument/2006/relationships" xmlns:mc="http://schemas.openxmlformats.org/markup-compatibility/2006" xmlns:mv="urn:schemas-microsoft-com:mac:vml" xmlns:p="http://schemas.openxmlformats.org/presentationml/2006/main" mc:Ignorable="mv" mc:PreserveAttributes="mv:*" type="vertTitleAndTx" preserve="1">
+<p:sldLayout xmlns:a="http://schemas.openxmlformats.org/drawingml/2006/main" xmlns:r="http://schemas.openxmlformats.org/officeDocument/2006/relationships" xmlns:p="http://schemas.openxmlformats.org/presentationml/2006/main" type="vertTitleAndTx" preserve="1">
   <p:cSld name="Vertical Title and Text">
     <p:spTree>
       <p:nvGrpSpPr>
@@ -1499,7 +1499,7 @@
             <a:fld id="{DC14A1DA-BDB1-4693-9FC0-65DE61D7C2F9}" type="datetimeFigureOut">
               <a:rPr lang="en-US" smtClean="0"/>
               <a:pPr/>
-              <a:t>11/9/10</a:t>
+              <a:t>1/5/2011</a:t>
             </a:fld>
             <a:endParaRPr lang="en-US"/>
           </a:p>
@@ -1557,7 +1557,7 @@
 </file>
 
 <file path=ppt/slideLayouts/slideLayout2.xml><?xml version="1.0" encoding="utf-8"?>
-<p:sldLayout xmlns:a="http://schemas.openxmlformats.org/drawingml/2006/main" xmlns:r="http://schemas.openxmlformats.org/officeDocument/2006/relationships" xmlns:mc="http://schemas.openxmlformats.org/markup-compatibility/2006" xmlns:mv="urn:schemas-microsoft-com:mac:vml" xmlns:p="http://schemas.openxmlformats.org/presentationml/2006/main" mc:Ignorable="mv" mc:PreserveAttributes="mv:*" type="obj" preserve="1">
+<p:sldLayout xmlns:a="http://schemas.openxmlformats.org/drawingml/2006/main" xmlns:r="http://schemas.openxmlformats.org/officeDocument/2006/relationships" xmlns:p="http://schemas.openxmlformats.org/presentationml/2006/main" type="obj" preserve="1">
   <p:cSld name="Title and Content">
     <p:spTree>
       <p:nvGrpSpPr>
@@ -1666,7 +1666,7 @@
             <a:fld id="{DC14A1DA-BDB1-4693-9FC0-65DE61D7C2F9}" type="datetimeFigureOut">
               <a:rPr lang="en-US" smtClean="0"/>
               <a:pPr/>
-              <a:t>11/9/10</a:t>
+              <a:t>1/5/2011</a:t>
             </a:fld>
             <a:endParaRPr lang="en-US"/>
           </a:p>
@@ -1724,7 +1724,7 @@
 </file>
 
 <file path=ppt/slideLayouts/slideLayout3.xml><?xml version="1.0" encoding="utf-8"?>
-<p:sldLayout xmlns:a="http://schemas.openxmlformats.org/drawingml/2006/main" xmlns:r="http://schemas.openxmlformats.org/officeDocument/2006/relationships" xmlns:mc="http://schemas.openxmlformats.org/markup-compatibility/2006" xmlns:mv="urn:schemas-microsoft-com:mac:vml" xmlns:p="http://schemas.openxmlformats.org/presentationml/2006/main" mc:Ignorable="mv" mc:PreserveAttributes="mv:*" type="secHead" preserve="1">
+<p:sldLayout xmlns:a="http://schemas.openxmlformats.org/drawingml/2006/main" xmlns:r="http://schemas.openxmlformats.org/officeDocument/2006/relationships" xmlns:p="http://schemas.openxmlformats.org/presentationml/2006/main" type="secHead" preserve="1">
   <p:cSld name="Section Header">
     <p:spTree>
       <p:nvGrpSpPr>
@@ -1909,7 +1909,7 @@
             <a:fld id="{DC14A1DA-BDB1-4693-9FC0-65DE61D7C2F9}" type="datetimeFigureOut">
               <a:rPr lang="en-US" smtClean="0"/>
               <a:pPr/>
-              <a:t>11/9/10</a:t>
+              <a:t>1/5/2011</a:t>
             </a:fld>
             <a:endParaRPr lang="en-US"/>
           </a:p>
@@ -1967,7 +1967,7 @@
 </file>
 
 <file path=ppt/slideLayouts/slideLayout4.xml><?xml version="1.0" encoding="utf-8"?>
-<p:sldLayout xmlns:a="http://schemas.openxmlformats.org/drawingml/2006/main" xmlns:r="http://schemas.openxmlformats.org/officeDocument/2006/relationships" xmlns:mc="http://schemas.openxmlformats.org/markup-compatibility/2006" xmlns:mv="urn:schemas-microsoft-com:mac:vml" xmlns:p="http://schemas.openxmlformats.org/presentationml/2006/main" mc:Ignorable="mv" mc:PreserveAttributes="mv:*" type="twoObj" preserve="1">
+<p:sldLayout xmlns:a="http://schemas.openxmlformats.org/drawingml/2006/main" xmlns:r="http://schemas.openxmlformats.org/officeDocument/2006/relationships" xmlns:p="http://schemas.openxmlformats.org/presentationml/2006/main" type="twoObj" preserve="1">
   <p:cSld name="Two Content">
     <p:spTree>
       <p:nvGrpSpPr>
@@ -2194,7 +2194,7 @@
             <a:fld id="{DC14A1DA-BDB1-4693-9FC0-65DE61D7C2F9}" type="datetimeFigureOut">
               <a:rPr lang="en-US" smtClean="0"/>
               <a:pPr/>
-              <a:t>11/9/10</a:t>
+              <a:t>1/5/2011</a:t>
             </a:fld>
             <a:endParaRPr lang="en-US"/>
           </a:p>
@@ -2252,7 +2252,7 @@
 </file>
 
 <file path=ppt/slideLayouts/slideLayout5.xml><?xml version="1.0" encoding="utf-8"?>
-<p:sldLayout xmlns:a="http://schemas.openxmlformats.org/drawingml/2006/main" xmlns:r="http://schemas.openxmlformats.org/officeDocument/2006/relationships" xmlns:mc="http://schemas.openxmlformats.org/markup-compatibility/2006" xmlns:mv="urn:schemas-microsoft-com:mac:vml" xmlns:p="http://schemas.openxmlformats.org/presentationml/2006/main" mc:Ignorable="mv" mc:PreserveAttributes="mv:*" type="twoTxTwoObj" preserve="1">
+<p:sldLayout xmlns:a="http://schemas.openxmlformats.org/drawingml/2006/main" xmlns:r="http://schemas.openxmlformats.org/officeDocument/2006/relationships" xmlns:p="http://schemas.openxmlformats.org/presentationml/2006/main" type="twoTxTwoObj" preserve="1">
   <p:cSld name="Comparison">
     <p:spTree>
       <p:nvGrpSpPr>
@@ -2613,7 +2613,7 @@
             <a:fld id="{DC14A1DA-BDB1-4693-9FC0-65DE61D7C2F9}" type="datetimeFigureOut">
               <a:rPr lang="en-US" smtClean="0"/>
               <a:pPr/>
-              <a:t>11/9/10</a:t>
+              <a:t>1/5/2011</a:t>
             </a:fld>
             <a:endParaRPr lang="en-US"/>
           </a:p>
@@ -2671,7 +2671,7 @@
 </file>
 
 <file path=ppt/slideLayouts/slideLayout6.xml><?xml version="1.0" encoding="utf-8"?>
-<p:sldLayout xmlns:a="http://schemas.openxmlformats.org/drawingml/2006/main" xmlns:r="http://schemas.openxmlformats.org/officeDocument/2006/relationships" xmlns:mc="http://schemas.openxmlformats.org/markup-compatibility/2006" xmlns:mv="urn:schemas-microsoft-com:mac:vml" xmlns:p="http://schemas.openxmlformats.org/presentationml/2006/main" mc:Ignorable="mv" mc:PreserveAttributes="mv:*" type="titleOnly" preserve="1">
+<p:sldLayout xmlns:a="http://schemas.openxmlformats.org/drawingml/2006/main" xmlns:r="http://schemas.openxmlformats.org/officeDocument/2006/relationships" xmlns:p="http://schemas.openxmlformats.org/presentationml/2006/main" type="titleOnly" preserve="1">
   <p:cSld name="Title Only">
     <p:spTree>
       <p:nvGrpSpPr>
@@ -2728,7 +2728,7 @@
             <a:fld id="{DC14A1DA-BDB1-4693-9FC0-65DE61D7C2F9}" type="datetimeFigureOut">
               <a:rPr lang="en-US" smtClean="0"/>
               <a:pPr/>
-              <a:t>11/9/10</a:t>
+              <a:t>1/5/2011</a:t>
             </a:fld>
             <a:endParaRPr lang="en-US"/>
           </a:p>
@@ -2786,7 +2786,7 @@
 </file>
 
 <file path=ppt/slideLayouts/slideLayout7.xml><?xml version="1.0" encoding="utf-8"?>
-<p:sldLayout xmlns:a="http://schemas.openxmlformats.org/drawingml/2006/main" xmlns:r="http://schemas.openxmlformats.org/officeDocument/2006/relationships" xmlns:mc="http://schemas.openxmlformats.org/markup-compatibility/2006" xmlns:mv="urn:schemas-microsoft-com:mac:vml" xmlns:p="http://schemas.openxmlformats.org/presentationml/2006/main" mc:Ignorable="mv" mc:PreserveAttributes="mv:*" type="blank" preserve="1">
+<p:sldLayout xmlns:a="http://schemas.openxmlformats.org/drawingml/2006/main" xmlns:r="http://schemas.openxmlformats.org/officeDocument/2006/relationships" xmlns:p="http://schemas.openxmlformats.org/presentationml/2006/main" type="blank" preserve="1">
   <p:cSld name="Blank">
     <p:spTree>
       <p:nvGrpSpPr>
@@ -2820,7 +2820,7 @@
             <a:fld id="{DC14A1DA-BDB1-4693-9FC0-65DE61D7C2F9}" type="datetimeFigureOut">
               <a:rPr lang="en-US" smtClean="0"/>
               <a:pPr/>
-              <a:t>11/9/10</a:t>
+              <a:t>1/5/2011</a:t>
             </a:fld>
             <a:endParaRPr lang="en-US"/>
           </a:p>
@@ -2878,7 +2878,7 @@
 </file>
 
 <file path=ppt/slideLayouts/slideLayout8.xml><?xml version="1.0" encoding="utf-8"?>
-<p:sldLayout xmlns:a="http://schemas.openxmlformats.org/drawingml/2006/main" xmlns:r="http://schemas.openxmlformats.org/officeDocument/2006/relationships" xmlns:mc="http://schemas.openxmlformats.org/markup-compatibility/2006" xmlns:mv="urn:schemas-microsoft-com:mac:vml" xmlns:p="http://schemas.openxmlformats.org/presentationml/2006/main" mc:Ignorable="mv" mc:PreserveAttributes="mv:*" type="objTx" preserve="1">
+<p:sldLayout xmlns:a="http://schemas.openxmlformats.org/drawingml/2006/main" xmlns:r="http://schemas.openxmlformats.org/officeDocument/2006/relationships" xmlns:p="http://schemas.openxmlformats.org/presentationml/2006/main" type="objTx" preserve="1">
   <p:cSld name="Content with Caption">
     <p:spTree>
       <p:nvGrpSpPr>
@@ -3094,7 +3094,7 @@
             <a:fld id="{DC14A1DA-BDB1-4693-9FC0-65DE61D7C2F9}" type="datetimeFigureOut">
               <a:rPr lang="en-US" smtClean="0"/>
               <a:pPr/>
-              <a:t>11/9/10</a:t>
+              <a:t>1/5/2011</a:t>
             </a:fld>
             <a:endParaRPr lang="en-US"/>
           </a:p>
@@ -3152,7 +3152,7 @@
 </file>
 
 <file path=ppt/slideLayouts/slideLayout9.xml><?xml version="1.0" encoding="utf-8"?>
-<p:sldLayout xmlns:a="http://schemas.openxmlformats.org/drawingml/2006/main" xmlns:r="http://schemas.openxmlformats.org/officeDocument/2006/relationships" xmlns:mc="http://schemas.openxmlformats.org/markup-compatibility/2006" xmlns:mv="urn:schemas-microsoft-com:mac:vml" xmlns:p="http://schemas.openxmlformats.org/presentationml/2006/main" mc:Ignorable="mv" mc:PreserveAttributes="mv:*" type="picTx" preserve="1">
+<p:sldLayout xmlns:a="http://schemas.openxmlformats.org/drawingml/2006/main" xmlns:r="http://schemas.openxmlformats.org/officeDocument/2006/relationships" xmlns:p="http://schemas.openxmlformats.org/presentationml/2006/main" type="picTx" preserve="1">
   <p:cSld name="Picture with Caption">
     <p:spTree>
       <p:nvGrpSpPr>
@@ -3344,7 +3344,7 @@
             <a:fld id="{DC14A1DA-BDB1-4693-9FC0-65DE61D7C2F9}" type="datetimeFigureOut">
               <a:rPr lang="en-US" smtClean="0"/>
               <a:pPr/>
-              <a:t>11/9/10</a:t>
+              <a:t>1/5/2011</a:t>
             </a:fld>
             <a:endParaRPr lang="en-US"/>
           </a:p>
@@ -3402,12 +3402,12 @@
 </file>
 
 <file path=ppt/slideMasters/slideMaster1.xml><?xml version="1.0" encoding="utf-8"?>
-<p:sldMaster xmlns:a="http://schemas.openxmlformats.org/drawingml/2006/main" xmlns:r="http://schemas.openxmlformats.org/officeDocument/2006/relationships" xmlns:mc="http://schemas.openxmlformats.org/markup-compatibility/2006" xmlns:mv="urn:schemas-microsoft-com:mac:vml" xmlns:p="http://schemas.openxmlformats.org/presentationml/2006/main" mc:Ignorable="mv" mc:PreserveAttributes="mv:*">
+<p:sldMaster xmlns:a="http://schemas.openxmlformats.org/drawingml/2006/main" xmlns:r="http://schemas.openxmlformats.org/officeDocument/2006/relationships" xmlns:p="http://schemas.openxmlformats.org/presentationml/2006/main">
   <p:cSld>
     <p:bg>
       <p:bgPr>
         <a:blipFill dpi="0" rotWithShape="1">
-          <a:blip r:embed="rId13">
+          <a:blip r:embed="rId13" cstate="print">
             <a:alphaModFix amt="80000"/>
           </a:blip>
           <a:srcRect/>
@@ -3564,7 +3564,7 @@
             <a:fld id="{DC14A1DA-BDB1-4693-9FC0-65DE61D7C2F9}" type="datetimeFigureOut">
               <a:rPr lang="en-US" smtClean="0"/>
               <a:pPr/>
-              <a:t>11/9/10</a:t>
+              <a:t>1/5/2011</a:t>
             </a:fld>
             <a:endParaRPr lang="en-US" dirty="0"/>
           </a:p>
@@ -3921,7 +3921,7 @@
 </file>
 
 <file path=ppt/slides/slide1.xml><?xml version="1.0" encoding="utf-8"?>
-<p:sld xmlns:a="http://schemas.openxmlformats.org/drawingml/2006/main" xmlns:r="http://schemas.openxmlformats.org/officeDocument/2006/relationships" xmlns:mc="http://schemas.openxmlformats.org/markup-compatibility/2006" xmlns:mv="urn:schemas-microsoft-com:mac:vml" xmlns:p="http://schemas.openxmlformats.org/presentationml/2006/main" mc:Ignorable="mv" mc:PreserveAttributes="mv:*">
+<p:sld xmlns:a="http://schemas.openxmlformats.org/drawingml/2006/main" xmlns:r="http://schemas.openxmlformats.org/officeDocument/2006/relationships" xmlns:p="http://schemas.openxmlformats.org/presentationml/2006/main">
   <p:cSld>
     <p:spTree>
       <p:nvGrpSpPr>
@@ -3953,10 +3953,6 @@
           <a:lstStyle/>
           <a:p>
             <a:r>
-              <a:rPr lang="en-US" dirty="0" smtClean="0"/>
-              <a:t/>
-            </a:r>
-            <a:r>
               <a:rPr lang="en-US" dirty="0" smtClean="0">
                 <a:latin typeface="Franklin Gothic Medium"/>
                 <a:cs typeface="Franklin Gothic Medium"/>
@@ -3983,19 +3979,24 @@
           <a:lstStyle/>
           <a:p>
             <a:r>
-              <a:rPr lang="en-US" smtClean="0"/>
+              <a:rPr lang="en-US" dirty="0" smtClean="0"/>
               <a:t>Kevin McMahon</a:t>
             </a:r>
           </a:p>
           <a:p>
             <a:r>
-              <a:rPr lang="en-US" smtClean="0"/>
-              <a:t>@klmcmahon</a:t>
-            </a:r>
-          </a:p>
-          <a:p>
-            <a:r>
-              <a:rPr lang="en-US" smtClean="0"/>
+              <a:rPr lang="en-US" dirty="0" smtClean="0"/>
+              <a:t>@</a:t>
+            </a:r>
+            <a:r>
+              <a:rPr lang="en-US" dirty="0" err="1" smtClean="0"/>
+              <a:t>klmcmahon</a:t>
+            </a:r>
+            <a:endParaRPr lang="en-US" dirty="0" smtClean="0"/>
+          </a:p>
+          <a:p>
+            <a:r>
+              <a:rPr lang="en-US" dirty="0" smtClean="0"/>
               <a:t>http://blog.kevfoo.com</a:t>
             </a:r>
             <a:endParaRPr lang="en-US" dirty="0"/>
@@ -4018,7 +4019,7 @@
 </file>
 
 <file path=ppt/slides/slide10.xml><?xml version="1.0" encoding="utf-8"?>
-<p:sld xmlns:a="http://schemas.openxmlformats.org/drawingml/2006/main" xmlns:r="http://schemas.openxmlformats.org/officeDocument/2006/relationships" xmlns:mc="http://schemas.openxmlformats.org/markup-compatibility/2006" xmlns:mv="urn:schemas-microsoft-com:mac:vml" xmlns:p="http://schemas.openxmlformats.org/presentationml/2006/main" mc:Ignorable="mv" mc:PreserveAttributes="mv:*">
+<p:sld xmlns:a="http://schemas.openxmlformats.org/drawingml/2006/main" xmlns:r="http://schemas.openxmlformats.org/officeDocument/2006/relationships" xmlns:p="http://schemas.openxmlformats.org/presentationml/2006/main">
   <p:cSld>
     <p:spTree>
       <p:nvGrpSpPr>
@@ -4103,31 +4104,40 @@
             <a:pPr lvl="1"/>
             <a:r>
               <a:rPr lang="en-US" dirty="0" smtClean="0"/>
-              <a:t>~$400 individual / ~$1000 enterprise</a:t>
+              <a:t>~$400 individual / ~$1000 </a:t>
+            </a:r>
+            <a:r>
+              <a:rPr lang="en-US" dirty="0" smtClean="0"/>
+              <a:t>enterprise </a:t>
+            </a:r>
+          </a:p>
+          <a:p>
+            <a:r>
+              <a:rPr lang="en-US" dirty="0" smtClean="0"/>
+              <a:t>Windows and Mac OS  X </a:t>
+            </a:r>
+            <a:r>
+              <a:rPr lang="en-US" dirty="0" smtClean="0"/>
+              <a:t>(</a:t>
+            </a:r>
+            <a:r>
+              <a:rPr lang="en-US" dirty="0" smtClean="0"/>
+              <a:t>Linux soon)</a:t>
             </a:r>
             <a:endParaRPr lang="en-US" dirty="0" smtClean="0"/>
           </a:p>
           <a:p>
             <a:r>
               <a:rPr lang="en-US" dirty="0" smtClean="0"/>
-              <a:t>Closed preview</a:t>
-            </a:r>
-            <a:endParaRPr lang="en-US" dirty="0" smtClean="0"/>
+              <a:t>Now in Open Preview</a:t>
+            </a:r>
           </a:p>
           <a:p>
             <a:pPr lvl="1"/>
             <a:r>
               <a:rPr lang="en-US" b="1" dirty="0" smtClean="0"/>
-              <a:t>SIGN UP!</a:t>
-            </a:r>
-          </a:p>
-          <a:p>
-            <a:pPr lvl="1"/>
-            <a:r>
-              <a:rPr lang="en-US" dirty="0" smtClean="0"/>
-              <a:t>People added each preview release.</a:t>
-            </a:r>
-            <a:endParaRPr lang="en-US" dirty="0" smtClean="0"/>
+              <a:t>DOWNLOAD AND TRY IT!</a:t>
+            </a:r>
           </a:p>
           <a:p>
             <a:r>
@@ -4170,7 +4180,7 @@
 </file>
 
 <file path=ppt/slides/slide11.xml><?xml version="1.0" encoding="utf-8"?>
-<p:sld xmlns:a="http://schemas.openxmlformats.org/drawingml/2006/main" xmlns:r="http://schemas.openxmlformats.org/officeDocument/2006/relationships" xmlns:mc="http://schemas.openxmlformats.org/markup-compatibility/2006" xmlns:mv="urn:schemas-microsoft-com:mac:vml" xmlns:p="http://schemas.openxmlformats.org/presentationml/2006/main" mc:Ignorable="mv" mc:PreserveAttributes="mv:*">
+<p:sld xmlns:a="http://schemas.openxmlformats.org/drawingml/2006/main" xmlns:r="http://schemas.openxmlformats.org/officeDocument/2006/relationships" xmlns:p="http://schemas.openxmlformats.org/presentationml/2006/main">
   <p:cSld>
     <p:spTree>
       <p:nvGrpSpPr>
@@ -4311,7 +4321,7 @@
 </file>
 
 <file path=ppt/slides/slide12.xml><?xml version="1.0" encoding="utf-8"?>
-<p:sld xmlns:a="http://schemas.openxmlformats.org/drawingml/2006/main" xmlns:r="http://schemas.openxmlformats.org/officeDocument/2006/relationships" xmlns:mc="http://schemas.openxmlformats.org/markup-compatibility/2006" xmlns:mv="urn:schemas-microsoft-com:mac:vml" xmlns:p="http://schemas.openxmlformats.org/presentationml/2006/main" mc:Ignorable="mv" mc:PreserveAttributes="mv:*">
+<p:sld xmlns:a="http://schemas.openxmlformats.org/drawingml/2006/main" xmlns:r="http://schemas.openxmlformats.org/officeDocument/2006/relationships" xmlns:p="http://schemas.openxmlformats.org/presentationml/2006/main">
   <p:cSld>
     <p:spTree>
       <p:nvGrpSpPr>
@@ -4391,7 +4401,7 @@
 </file>
 
 <file path=ppt/slides/slide13.xml><?xml version="1.0" encoding="utf-8"?>
-<p:sld xmlns:a="http://schemas.openxmlformats.org/drawingml/2006/main" xmlns:r="http://schemas.openxmlformats.org/officeDocument/2006/relationships" xmlns:mc="http://schemas.openxmlformats.org/markup-compatibility/2006" xmlns:mv="urn:schemas-microsoft-com:mac:vml" xmlns:p="http://schemas.openxmlformats.org/presentationml/2006/main" mc:Ignorable="mv" mc:PreserveAttributes="mv:*">
+<p:sld xmlns:a="http://schemas.openxmlformats.org/drawingml/2006/main" xmlns:r="http://schemas.openxmlformats.org/officeDocument/2006/relationships" xmlns:p="http://schemas.openxmlformats.org/presentationml/2006/main">
   <p:cSld>
     <p:spTree>
       <p:nvGrpSpPr>
@@ -4429,14 +4439,7 @@
                 <a:latin typeface="Franklin Gothic Medium"/>
                 <a:cs typeface="Franklin Gothic Medium"/>
               </a:rPr>
-              <a:t>MonoDroid Design</a:t>
-            </a:r>
-            <a:r>
-              <a:rPr lang="en-US" dirty="0" smtClean="0">
-                <a:latin typeface="Franklin Gothic Medium"/>
-                <a:cs typeface="Franklin Gothic Medium"/>
-              </a:rPr>
-              <a:t> Principles</a:t>
+              <a:t>MonoDroid Design Principles</a:t>
             </a:r>
             <a:endParaRPr lang="en-US" dirty="0">
               <a:latin typeface="Franklin Gothic Medium"/>
@@ -4482,7 +4485,6 @@
               <a:rPr lang="en-US" dirty="0" smtClean="0"/>
               <a:t>Allow developers to subclass any Java class</a:t>
             </a:r>
-            <a:endParaRPr lang="en-US" dirty="0" smtClean="0"/>
           </a:p>
           <a:p>
             <a:pPr>
@@ -4503,13 +4505,8 @@
             </a:pPr>
             <a:r>
               <a:rPr lang="en-US" dirty="0" smtClean="0"/>
-              <a:t>Java </a:t>
-            </a:r>
-            <a:r>
-              <a:rPr lang="en-US" dirty="0" smtClean="0"/>
-              <a:t>properties as C# properties</a:t>
-            </a:r>
-            <a:endParaRPr lang="en-US" dirty="0" smtClean="0"/>
+              <a:t>Java properties as C# properties</a:t>
+            </a:r>
           </a:p>
           <a:p>
             <a:pPr>
@@ -4519,13 +4516,8 @@
             </a:pPr>
             <a:r>
               <a:rPr lang="en-US" dirty="0" smtClean="0"/>
-              <a:t>Strongly </a:t>
-            </a:r>
-            <a:r>
-              <a:rPr lang="en-US" dirty="0" smtClean="0"/>
-              <a:t>typed API</a:t>
-            </a:r>
-            <a:endParaRPr lang="en-US" dirty="0" smtClean="0"/>
+              <a:t>Strongly typed API</a:t>
+            </a:r>
           </a:p>
           <a:p>
             <a:pPr>
@@ -4546,7 +4538,7 @@
 </file>
 
 <file path=ppt/slides/slide14.xml><?xml version="1.0" encoding="utf-8"?>
-<p:sld xmlns:a="http://schemas.openxmlformats.org/drawingml/2006/main" xmlns:r="http://schemas.openxmlformats.org/officeDocument/2006/relationships" xmlns:mc="http://schemas.openxmlformats.org/markup-compatibility/2006" xmlns:mv="urn:schemas-microsoft-com:mac:vml" xmlns:p="http://schemas.openxmlformats.org/presentationml/2006/main" mc:Ignorable="mv" mc:PreserveAttributes="mv:*">
+<p:sld xmlns:a="http://schemas.openxmlformats.org/drawingml/2006/main" xmlns:r="http://schemas.openxmlformats.org/officeDocument/2006/relationships" xmlns:p="http://schemas.openxmlformats.org/presentationml/2006/main">
   <p:cSld>
     <p:spTree>
       <p:nvGrpSpPr>
@@ -4691,44 +4683,20 @@
               <a:rPr lang="en-US" dirty="0" err="1" smtClean="0"/>
               <a:t>MonoDevelop</a:t>
             </a:r>
-            <a:r>
-              <a:rPr lang="en-US" dirty="0" smtClean="0"/>
-              <a:t> (support targeted for v1.0)</a:t>
-            </a:r>
-          </a:p>
-          <a:p>
-            <a:r>
-              <a:rPr lang="en-US" dirty="0" smtClean="0"/>
-              <a:t>C# &gt; </a:t>
-            </a:r>
-            <a:r>
-              <a:rPr lang="en-US" dirty="0" smtClean="0"/>
-              <a:t>Java</a:t>
+            <a:endParaRPr lang="en-US" dirty="0" smtClean="0"/>
+          </a:p>
+          <a:p>
+            <a:r>
+              <a:rPr lang="en-US" dirty="0" smtClean="0"/>
+              <a:t>C# &gt; Java</a:t>
             </a:r>
           </a:p>
           <a:p>
             <a:pPr lvl="1"/>
             <a:r>
               <a:rPr lang="en-US" dirty="0" smtClean="0"/>
-              <a:t>Friction still exists due to</a:t>
-            </a:r>
-            <a:r>
-              <a:rPr lang="en-US" dirty="0" smtClean="0"/>
-              <a:t> </a:t>
-            </a:r>
-            <a:r>
-              <a:rPr lang="en-US" dirty="0" smtClean="0"/>
-              <a:t>Java idioms and </a:t>
-            </a:r>
-            <a:r>
-              <a:rPr lang="en-US" dirty="0" smtClean="0"/>
-              <a:t>architecture</a:t>
-            </a:r>
-            <a:r>
-              <a:rPr lang="en-US" dirty="0" smtClean="0"/>
-              <a:t>.</a:t>
-            </a:r>
-            <a:endParaRPr lang="en-US" dirty="0" smtClean="0"/>
+              <a:t>Friction still exists due to Java idioms and architecture.</a:t>
+            </a:r>
           </a:p>
         </p:txBody>
       </p:sp>
@@ -4741,7 +4709,7 @@
 </file>
 
 <file path=ppt/slides/slide15.xml><?xml version="1.0" encoding="utf-8"?>
-<p:sld xmlns:a="http://schemas.openxmlformats.org/drawingml/2006/main" xmlns:r="http://schemas.openxmlformats.org/officeDocument/2006/relationships" xmlns:mc="http://schemas.openxmlformats.org/markup-compatibility/2006" xmlns:mv="urn:schemas-microsoft-com:mac:vml" xmlns:p="http://schemas.openxmlformats.org/presentationml/2006/main" mc:Ignorable="mv" mc:PreserveAttributes="mv:*">
+<p:sld xmlns:a="http://schemas.openxmlformats.org/drawingml/2006/main" xmlns:r="http://schemas.openxmlformats.org/officeDocument/2006/relationships" xmlns:p="http://schemas.openxmlformats.org/presentationml/2006/main">
   <p:cSld>
     <p:spTree>
       <p:nvGrpSpPr>
@@ -4879,7 +4847,7 @@
 </file>
 
 <file path=ppt/slides/slide16.xml><?xml version="1.0" encoding="utf-8"?>
-<p:sld xmlns:a="http://schemas.openxmlformats.org/drawingml/2006/main" xmlns:r="http://schemas.openxmlformats.org/officeDocument/2006/relationships" xmlns:mc="http://schemas.openxmlformats.org/markup-compatibility/2006" xmlns:mv="urn:schemas-microsoft-com:mac:vml" xmlns:p="http://schemas.openxmlformats.org/presentationml/2006/main" mc:Ignorable="mv" mc:PreserveAttributes="mv:*">
+<p:sld xmlns:a="http://schemas.openxmlformats.org/drawingml/2006/main" xmlns:r="http://schemas.openxmlformats.org/officeDocument/2006/relationships" xmlns:p="http://schemas.openxmlformats.org/presentationml/2006/main">
   <p:cSld>
     <p:spTree>
       <p:nvGrpSpPr>
@@ -5003,7 +4971,7 @@
 </file>
 
 <file path=ppt/slides/slide17.xml><?xml version="1.0" encoding="utf-8"?>
-<p:sld xmlns:a="http://schemas.openxmlformats.org/drawingml/2006/main" xmlns:r="http://schemas.openxmlformats.org/officeDocument/2006/relationships" xmlns:mc="http://schemas.openxmlformats.org/markup-compatibility/2006" xmlns:mv="urn:schemas-microsoft-com:mac:vml" xmlns:p="http://schemas.openxmlformats.org/presentationml/2006/main" mc:Ignorable="mv" mc:PreserveAttributes="mv:*">
+<p:sld xmlns:a="http://schemas.openxmlformats.org/drawingml/2006/main" xmlns:r="http://schemas.openxmlformats.org/officeDocument/2006/relationships" xmlns:p="http://schemas.openxmlformats.org/presentationml/2006/main">
   <p:cSld>
     <p:spTree>
       <p:nvGrpSpPr>
@@ -5105,7 +5073,7 @@
 </file>
 
 <file path=ppt/slides/slide18.xml><?xml version="1.0" encoding="utf-8"?>
-<p:sld xmlns:a="http://schemas.openxmlformats.org/drawingml/2006/main" xmlns:r="http://schemas.openxmlformats.org/officeDocument/2006/relationships" xmlns:mc="http://schemas.openxmlformats.org/markup-compatibility/2006" xmlns:mv="urn:schemas-microsoft-com:mac:vml" xmlns:p="http://schemas.openxmlformats.org/presentationml/2006/main" mc:Ignorable="mv" mc:PreserveAttributes="mv:*">
+<p:sld xmlns:a="http://schemas.openxmlformats.org/drawingml/2006/main" xmlns:r="http://schemas.openxmlformats.org/officeDocument/2006/relationships" xmlns:p="http://schemas.openxmlformats.org/presentationml/2006/main">
   <p:cSld>
     <p:spTree>
       <p:nvGrpSpPr>
@@ -5206,7 +5174,7 @@
 </file>
 
 <file path=ppt/slides/slide19.xml><?xml version="1.0" encoding="utf-8"?>
-<p:sld xmlns:a="http://schemas.openxmlformats.org/drawingml/2006/main" xmlns:r="http://schemas.openxmlformats.org/officeDocument/2006/relationships" xmlns:mc="http://schemas.openxmlformats.org/markup-compatibility/2006" xmlns:mv="urn:schemas-microsoft-com:mac:vml" xmlns:p="http://schemas.openxmlformats.org/presentationml/2006/main" mc:Ignorable="mv" mc:PreserveAttributes="mv:*">
+<p:sld xmlns:a="http://schemas.openxmlformats.org/drawingml/2006/main" xmlns:r="http://schemas.openxmlformats.org/officeDocument/2006/relationships" xmlns:p="http://schemas.openxmlformats.org/presentationml/2006/main">
   <p:cSld>
     <p:spTree>
       <p:nvGrpSpPr>
@@ -5288,7 +5256,7 @@
 </file>
 
 <file path=ppt/slides/slide2.xml><?xml version="1.0" encoding="utf-8"?>
-<p:sld xmlns:a="http://schemas.openxmlformats.org/drawingml/2006/main" xmlns:r="http://schemas.openxmlformats.org/officeDocument/2006/relationships" xmlns:mc="http://schemas.openxmlformats.org/markup-compatibility/2006" xmlns:mv="urn:schemas-microsoft-com:mac:vml" xmlns:p="http://schemas.openxmlformats.org/presentationml/2006/main" mc:Ignorable="mv" mc:PreserveAttributes="mv:*">
+<p:sld xmlns:a="http://schemas.openxmlformats.org/drawingml/2006/main" xmlns:r="http://schemas.openxmlformats.org/officeDocument/2006/relationships" xmlns:p="http://schemas.openxmlformats.org/presentationml/2006/main">
   <p:cSld>
     <p:spTree>
       <p:nvGrpSpPr>
@@ -5412,7 +5380,7 @@
 </file>
 
 <file path=ppt/slides/slide20.xml><?xml version="1.0" encoding="utf-8"?>
-<p:sld xmlns:a="http://schemas.openxmlformats.org/drawingml/2006/main" xmlns:r="http://schemas.openxmlformats.org/officeDocument/2006/relationships" xmlns:mc="http://schemas.openxmlformats.org/markup-compatibility/2006" xmlns:mv="urn:schemas-microsoft-com:mac:vml" xmlns:p="http://schemas.openxmlformats.org/presentationml/2006/main" mc:Ignorable="mv" mc:PreserveAttributes="mv:*">
+<p:sld xmlns:a="http://schemas.openxmlformats.org/drawingml/2006/main" xmlns:r="http://schemas.openxmlformats.org/officeDocument/2006/relationships" xmlns:p="http://schemas.openxmlformats.org/presentationml/2006/main">
   <p:cSld>
     <p:spTree>
       <p:nvGrpSpPr>
@@ -5502,7 +5470,7 @@
 </file>
 
 <file path=ppt/slides/slide21.xml><?xml version="1.0" encoding="utf-8"?>
-<p:sld xmlns:a="http://schemas.openxmlformats.org/drawingml/2006/main" xmlns:r="http://schemas.openxmlformats.org/officeDocument/2006/relationships" xmlns:mc="http://schemas.openxmlformats.org/markup-compatibility/2006" xmlns:mv="urn:schemas-microsoft-com:mac:vml" xmlns:p="http://schemas.openxmlformats.org/presentationml/2006/main" mc:Ignorable="mv" mc:PreserveAttributes="mv:*">
+<p:sld xmlns:a="http://schemas.openxmlformats.org/drawingml/2006/main" xmlns:r="http://schemas.openxmlformats.org/officeDocument/2006/relationships" xmlns:p="http://schemas.openxmlformats.org/presentationml/2006/main">
   <p:cSld>
     <p:spTree>
       <p:nvGrpSpPr>
@@ -5628,7 +5596,7 @@
 </file>
 
 <file path=ppt/slides/slide22.xml><?xml version="1.0" encoding="utf-8"?>
-<p:sld xmlns:a="http://schemas.openxmlformats.org/drawingml/2006/main" xmlns:r="http://schemas.openxmlformats.org/officeDocument/2006/relationships" xmlns:mc="http://schemas.openxmlformats.org/markup-compatibility/2006" xmlns:mv="urn:schemas-microsoft-com:mac:vml" xmlns:p="http://schemas.openxmlformats.org/presentationml/2006/main" mc:Ignorable="mv" mc:PreserveAttributes="mv:*">
+<p:sld xmlns:a="http://schemas.openxmlformats.org/drawingml/2006/main" xmlns:r="http://schemas.openxmlformats.org/officeDocument/2006/relationships" xmlns:p="http://schemas.openxmlformats.org/presentationml/2006/main">
   <p:cSld>
     <p:spTree>
       <p:nvGrpSpPr>
@@ -5720,7 +5688,7 @@
 </file>
 
 <file path=ppt/slides/slide23.xml><?xml version="1.0" encoding="utf-8"?>
-<p:sld xmlns:a="http://schemas.openxmlformats.org/drawingml/2006/main" xmlns:r="http://schemas.openxmlformats.org/officeDocument/2006/relationships" xmlns:mc="http://schemas.openxmlformats.org/markup-compatibility/2006" xmlns:mv="urn:schemas-microsoft-com:mac:vml" xmlns:p="http://schemas.openxmlformats.org/presentationml/2006/main" mc:Ignorable="mv" mc:PreserveAttributes="mv:*">
+<p:sld xmlns:a="http://schemas.openxmlformats.org/drawingml/2006/main" xmlns:r="http://schemas.openxmlformats.org/officeDocument/2006/relationships" xmlns:p="http://schemas.openxmlformats.org/presentationml/2006/main">
   <p:cSld>
     <p:spTree>
       <p:nvGrpSpPr>
@@ -5787,13 +5755,8 @@
             </a:pPr>
             <a:r>
               <a:rPr lang="en-US" dirty="0" smtClean="0"/>
-              <a:t>Images</a:t>
-            </a:r>
-            <a:r>
-              <a:rPr lang="en-US" dirty="0" smtClean="0"/>
-              <a:t>, layout descriptions, binary blobs and string dictionaries</a:t>
-            </a:r>
-            <a:endParaRPr lang="en-US" dirty="0" smtClean="0"/>
+              <a:t>Images, layout descriptions, binary blobs and string dictionaries</a:t>
+            </a:r>
           </a:p>
           <a:p>
             <a:pPr>
@@ -5814,15 +5777,7 @@
             </a:pPr>
             <a:r>
               <a:rPr lang="en-US" dirty="0" smtClean="0"/>
-              <a:t>Makes </a:t>
-            </a:r>
-            <a:r>
-              <a:rPr lang="en-US" dirty="0" smtClean="0"/>
-              <a:t>managing assets</a:t>
-            </a:r>
-            <a:r>
-              <a:rPr lang="en-US" dirty="0" smtClean="0"/>
-              <a:t> easier</a:t>
+              <a:t>Makes managing assets easier</a:t>
             </a:r>
           </a:p>
           <a:p>
@@ -5857,7 +5812,6 @@
               <a:rPr lang="en-US" dirty="0" smtClean="0"/>
               <a:t>Different hardware configurations</a:t>
             </a:r>
-            <a:endParaRPr lang="en-US" dirty="0" smtClean="0"/>
           </a:p>
         </p:txBody>
       </p:sp>
@@ -5870,7 +5824,7 @@
 </file>
 
 <file path=ppt/slides/slide24.xml><?xml version="1.0" encoding="utf-8"?>
-<p:sld xmlns:a="http://schemas.openxmlformats.org/drawingml/2006/main" xmlns:r="http://schemas.openxmlformats.org/officeDocument/2006/relationships" xmlns:mc="http://schemas.openxmlformats.org/markup-compatibility/2006" xmlns:mv="urn:schemas-microsoft-com:mac:vml" xmlns:p="http://schemas.openxmlformats.org/presentationml/2006/main" mc:Ignorable="mv" mc:PreserveAttributes="mv:*">
+<p:sld xmlns:a="http://schemas.openxmlformats.org/drawingml/2006/main" xmlns:r="http://schemas.openxmlformats.org/officeDocument/2006/relationships" xmlns:p="http://schemas.openxmlformats.org/presentationml/2006/main">
   <p:cSld>
     <p:spTree>
       <p:nvGrpSpPr>
@@ -5967,7 +5921,7 @@
 </file>
 
 <file path=ppt/slides/slide25.xml><?xml version="1.0" encoding="utf-8"?>
-<p:sld xmlns:a="http://schemas.openxmlformats.org/drawingml/2006/main" xmlns:r="http://schemas.openxmlformats.org/officeDocument/2006/relationships" xmlns:mc="http://schemas.openxmlformats.org/markup-compatibility/2006" xmlns:mv="urn:schemas-microsoft-com:mac:vml" xmlns:p="http://schemas.openxmlformats.org/presentationml/2006/main" mc:Ignorable="mv" mc:PreserveAttributes="mv:*">
+<p:sld xmlns:a="http://schemas.openxmlformats.org/drawingml/2006/main" xmlns:r="http://schemas.openxmlformats.org/officeDocument/2006/relationships" xmlns:p="http://schemas.openxmlformats.org/presentationml/2006/main">
   <p:cSld>
     <p:spTree>
       <p:nvGrpSpPr>
@@ -6025,7 +5979,7 @@
         <p:spPr/>
         <p:txBody>
           <a:bodyPr>
-            <a:normAutofit fontScale="77500" lnSpcReduction="20000"/>
+            <a:normAutofit fontScale="70000" lnSpcReduction="20000"/>
           </a:bodyPr>
           <a:lstStyle/>
           <a:p>
@@ -6034,16 +5988,36 @@
             </a:pPr>
             <a:r>
               <a:rPr lang="en-US" dirty="0" smtClean="0"/>
-              <a:t>Links</a:t>
-            </a:r>
-          </a:p>
-          <a:p>
-            <a:r>
-              <a:rPr lang="en-US" sz="2571" dirty="0" smtClean="0">
+              <a:t>Download the Preview!</a:t>
+            </a:r>
+          </a:p>
+          <a:p>
+            <a:r>
+              <a:rPr lang="en-US" dirty="0" smtClean="0">
                 <a:latin typeface="Lucida Console"/>
+                <a:cs typeface="Lucida Console"/>
                 <a:hlinkClick r:id="rId2"/>
               </a:rPr>
-              <a:t>http://www.monodroid.net</a:t>
+              <a:t>http://monodroid.net/Welcome</a:t>
+            </a:r>
+            <a:endParaRPr lang="en-US" dirty="0" smtClean="0">
+              <a:latin typeface="Lucida Console"/>
+              <a:cs typeface="Lucida Console"/>
+            </a:endParaRPr>
+          </a:p>
+          <a:p>
+            <a:pPr>
+              <a:buNone/>
+            </a:pPr>
+            <a:endParaRPr lang="en-US" dirty="0" smtClean="0"/>
+          </a:p>
+          <a:p>
+            <a:pPr>
+              <a:buNone/>
+            </a:pPr>
+            <a:r>
+              <a:rPr lang="en-US" dirty="0" smtClean="0"/>
+              <a:t>Links</a:t>
             </a:r>
           </a:p>
           <a:p>
@@ -6052,14 +6026,16 @@
                 <a:latin typeface="Lucida Console"/>
                 <a:hlinkClick r:id="rId3"/>
               </a:rPr>
-              <a:t>http://developer.android.com</a:t>
-            </a:r>
+              <a:t>http://www.monodroid.net</a:t>
+            </a:r>
+          </a:p>
+          <a:p>
             <a:r>
               <a:rPr lang="en-US" sz="2571" dirty="0" smtClean="0">
                 <a:latin typeface="Lucida Console"/>
-                <a:hlinkClick r:id="rId3"/>
+                <a:hlinkClick r:id="rId4"/>
               </a:rPr>
-              <a:t>/</a:t>
+              <a:t>http://developer.android.com/</a:t>
             </a:r>
             <a:endParaRPr lang="en-US" sz="2571" dirty="0" smtClean="0">
               <a:latin typeface="Lucida Console"/>
@@ -6128,24 +6104,9 @@
               <a:rPr lang="en-US" sz="2571" dirty="0" smtClean="0">
                 <a:latin typeface="Lucida Console"/>
                 <a:cs typeface="Lucida Console"/>
-                <a:hlinkClick r:id="rId2"/>
+                <a:hlinkClick r:id="rId5"/>
               </a:rPr>
               <a:t>https://github.com/mono/monodroid-samples</a:t>
-            </a:r>
-            <a:endParaRPr lang="en-US" sz="2571" dirty="0" smtClean="0">
-              <a:latin typeface="Lucida Console"/>
-              <a:cs typeface="Lucida Console"/>
-              <a:hlinkClick r:id="rId4"/>
-            </a:endParaRPr>
-          </a:p>
-          <a:p>
-            <a:r>
-              <a:rPr lang="en-US" sz="2571" dirty="0" smtClean="0">
-                <a:latin typeface="Lucida Console"/>
-                <a:cs typeface="Lucida Console"/>
-                <a:hlinkClick r:id="rId4"/>
-              </a:rPr>
-              <a:t>https://github.com/kevinmcmahon/MonoDroid-101</a:t>
             </a:r>
             <a:endParaRPr lang="en-US" sz="2571" dirty="0" smtClean="0">
               <a:latin typeface="Lucida Console"/>
@@ -6153,33 +6114,15 @@
             </a:endParaRPr>
           </a:p>
           <a:p>
-            <a:pPr>
-              <a:buNone/>
-            </a:pPr>
-            <a:endParaRPr lang="en-US" dirty="0" smtClean="0"/>
-          </a:p>
-          <a:p>
-            <a:pPr>
-              <a:buNone/>
-            </a:pPr>
-            <a:r>
-              <a:rPr lang="en-US" dirty="0" smtClean="0"/>
-              <a:t>SIGN UP FOR THE BETA!</a:t>
-            </a:r>
-          </a:p>
-          <a:p>
             <a:r>
               <a:rPr lang="en-US" sz="2571" dirty="0" smtClean="0">
                 <a:latin typeface="Lucida Console"/>
                 <a:cs typeface="Lucida Console"/>
-                <a:hlinkClick r:id="rId5"/>
+                <a:hlinkClick r:id="rId6"/>
               </a:rPr>
-              <a:t>http://go-mono.com/monodroid/</a:t>
-            </a:r>
-            <a:endParaRPr lang="en-US" sz="2571" dirty="0">
-              <a:latin typeface="Lucida Console"/>
-              <a:cs typeface="Lucida Console"/>
-            </a:endParaRPr>
+              <a:t>https://github.com/kevinmcmahon/MonoDroid101</a:t>
+            </a:r>
+            <a:endParaRPr lang="en-US" sz="2400" dirty="0" smtClean="0"/>
           </a:p>
         </p:txBody>
       </p:sp>
@@ -6192,7 +6135,7 @@
 </file>
 
 <file path=ppt/slides/slide3.xml><?xml version="1.0" encoding="utf-8"?>
-<p:sld xmlns:a="http://schemas.openxmlformats.org/drawingml/2006/main" xmlns:r="http://schemas.openxmlformats.org/officeDocument/2006/relationships" xmlns:mc="http://schemas.openxmlformats.org/markup-compatibility/2006" xmlns:mv="urn:schemas-microsoft-com:mac:vml" xmlns:p="http://schemas.openxmlformats.org/presentationml/2006/main" mc:Ignorable="mv" mc:PreserveAttributes="mv:*">
+<p:sld xmlns:a="http://schemas.openxmlformats.org/drawingml/2006/main" xmlns:r="http://schemas.openxmlformats.org/officeDocument/2006/relationships" xmlns:p="http://schemas.openxmlformats.org/presentationml/2006/main">
   <p:cSld>
     <p:spTree>
       <p:nvGrpSpPr>
@@ -6335,7 +6278,7 @@
 </file>
 
 <file path=ppt/slides/slide4.xml><?xml version="1.0" encoding="utf-8"?>
-<p:sld xmlns:a="http://schemas.openxmlformats.org/drawingml/2006/main" xmlns:r="http://schemas.openxmlformats.org/officeDocument/2006/relationships" xmlns:mc="http://schemas.openxmlformats.org/markup-compatibility/2006" xmlns:mv="urn:schemas-microsoft-com:mac:vml" xmlns:p="http://schemas.openxmlformats.org/presentationml/2006/main" mc:Ignorable="mv" mc:PreserveAttributes="mv:*">
+<p:sld xmlns:a="http://schemas.openxmlformats.org/drawingml/2006/main" xmlns:r="http://schemas.openxmlformats.org/officeDocument/2006/relationships" xmlns:p="http://schemas.openxmlformats.org/presentationml/2006/main">
   <p:cSld>
     <p:spTree>
       <p:nvGrpSpPr>
@@ -6399,7 +6342,7 @@
           <a:blip r:embed="rId2" cstate="print">
             <a:extLst>
               <a:ext uri="{28A0092B-C50C-407E-A947-70E740481C1C}">
-                <a14:useLocalDpi xmlns="" xmlns:a14="http://schemas.microsoft.com/office/drawing/2010/main" xmlns:p="http://schemas.openxmlformats.org/presentationml/2006/main" xmlns:r="http://schemas.openxmlformats.org/officeDocument/2006/relationships" xmlns:a="http://schemas.openxmlformats.org/drawingml/2006/main" val="0"/>
+                <a14:useLocalDpi xmlns:mc="http://schemas.openxmlformats.org/markup-compatibility/2006" xmlns:mv="urn:schemas-microsoft-com:mac:vml" xmlns="" xmlns:a14="http://schemas.microsoft.com/office/drawing/2010/main" val="0"/>
               </a:ext>
             </a:extLst>
           </a:blip>
@@ -6433,7 +6376,7 @@
 </file>
 
 <file path=ppt/slides/slide5.xml><?xml version="1.0" encoding="utf-8"?>
-<p:sld xmlns:a="http://schemas.openxmlformats.org/drawingml/2006/main" xmlns:r="http://schemas.openxmlformats.org/officeDocument/2006/relationships" xmlns:mc="http://schemas.openxmlformats.org/markup-compatibility/2006" xmlns:mv="urn:schemas-microsoft-com:mac:vml" xmlns:p="http://schemas.openxmlformats.org/presentationml/2006/main" mc:Ignorable="mv" mc:PreserveAttributes="mv:*">
+<p:sld xmlns:a="http://schemas.openxmlformats.org/drawingml/2006/main" xmlns:r="http://schemas.openxmlformats.org/officeDocument/2006/relationships" xmlns:p="http://schemas.openxmlformats.org/presentationml/2006/main">
   <p:cSld>
     <p:spTree>
       <p:nvGrpSpPr>
@@ -6495,7 +6438,7 @@
           <a:blip r:embed="rId3" cstate="print">
             <a:extLst>
               <a:ext uri="{28A0092B-C50C-407E-A947-70E740481C1C}">
-                <a14:useLocalDpi xmlns="" xmlns:a14="http://schemas.microsoft.com/office/drawing/2010/main" xmlns:p="http://schemas.openxmlformats.org/presentationml/2006/main" xmlns:r="http://schemas.openxmlformats.org/officeDocument/2006/relationships" xmlns:a="http://schemas.openxmlformats.org/drawingml/2006/main" val="0"/>
+                <a14:useLocalDpi xmlns:mc="http://schemas.openxmlformats.org/markup-compatibility/2006" xmlns:mv="urn:schemas-microsoft-com:mac:vml" xmlns="" xmlns:a14="http://schemas.microsoft.com/office/drawing/2010/main" val="0"/>
               </a:ext>
             </a:extLst>
           </a:blip>
@@ -6529,7 +6472,7 @@
 </file>
 
 <file path=ppt/slides/slide6.xml><?xml version="1.0" encoding="utf-8"?>
-<p:sld xmlns:a="http://schemas.openxmlformats.org/drawingml/2006/main" xmlns:r="http://schemas.openxmlformats.org/officeDocument/2006/relationships" xmlns:mc="http://schemas.openxmlformats.org/markup-compatibility/2006" xmlns:mv="urn:schemas-microsoft-com:mac:vml" xmlns:p="http://schemas.openxmlformats.org/presentationml/2006/main" mc:Ignorable="mv" mc:PreserveAttributes="mv:*">
+<p:sld xmlns:a="http://schemas.openxmlformats.org/drawingml/2006/main" xmlns:r="http://schemas.openxmlformats.org/officeDocument/2006/relationships" xmlns:p="http://schemas.openxmlformats.org/presentationml/2006/main">
   <p:cSld>
     <p:spTree>
       <p:nvGrpSpPr>
@@ -6591,7 +6534,7 @@
           <a:blip r:embed="rId2" cstate="print">
             <a:extLst>
               <a:ext uri="{28A0092B-C50C-407E-A947-70E740481C1C}">
-                <a14:useLocalDpi xmlns="" xmlns:a14="http://schemas.microsoft.com/office/drawing/2010/main" xmlns:p="http://schemas.openxmlformats.org/presentationml/2006/main" xmlns:r="http://schemas.openxmlformats.org/officeDocument/2006/relationships" xmlns:a="http://schemas.openxmlformats.org/drawingml/2006/main" val="0"/>
+                <a14:useLocalDpi xmlns:mc="http://schemas.openxmlformats.org/markup-compatibility/2006" xmlns:mv="urn:schemas-microsoft-com:mac:vml" xmlns="" xmlns:a14="http://schemas.microsoft.com/office/drawing/2010/main" val="0"/>
               </a:ext>
             </a:extLst>
           </a:blip>
@@ -6625,7 +6568,7 @@
 </file>
 
 <file path=ppt/slides/slide7.xml><?xml version="1.0" encoding="utf-8"?>
-<p:sld xmlns:a="http://schemas.openxmlformats.org/drawingml/2006/main" xmlns:r="http://schemas.openxmlformats.org/officeDocument/2006/relationships" xmlns:mc="http://schemas.openxmlformats.org/markup-compatibility/2006" xmlns:mv="urn:schemas-microsoft-com:mac:vml" xmlns:p="http://schemas.openxmlformats.org/presentationml/2006/main" mc:Ignorable="mv" mc:PreserveAttributes="mv:*">
+<p:sld xmlns:a="http://schemas.openxmlformats.org/drawingml/2006/main" xmlns:r="http://schemas.openxmlformats.org/officeDocument/2006/relationships" xmlns:p="http://schemas.openxmlformats.org/presentationml/2006/main">
   <p:cSld>
     <p:spTree>
       <p:nvGrpSpPr>
@@ -6689,7 +6632,7 @@
           <a:blip r:embed="rId3" cstate="print">
             <a:extLst>
               <a:ext uri="{28A0092B-C50C-407E-A947-70E740481C1C}">
-                <a14:useLocalDpi xmlns="" xmlns:a14="http://schemas.microsoft.com/office/drawing/2010/main" xmlns:p="http://schemas.openxmlformats.org/presentationml/2006/main" xmlns:r="http://schemas.openxmlformats.org/officeDocument/2006/relationships" xmlns:a="http://schemas.openxmlformats.org/drawingml/2006/main" val="0"/>
+                <a14:useLocalDpi xmlns:mc="http://schemas.openxmlformats.org/markup-compatibility/2006" xmlns:mv="urn:schemas-microsoft-com:mac:vml" xmlns="" xmlns:a14="http://schemas.microsoft.com/office/drawing/2010/main" val="0"/>
               </a:ext>
             </a:extLst>
           </a:blip>
@@ -6723,7 +6666,7 @@
 </file>
 
 <file path=ppt/slides/slide8.xml><?xml version="1.0" encoding="utf-8"?>
-<p:sld xmlns:a="http://schemas.openxmlformats.org/drawingml/2006/main" xmlns:r="http://schemas.openxmlformats.org/officeDocument/2006/relationships" xmlns:mc="http://schemas.openxmlformats.org/markup-compatibility/2006" xmlns:mv="urn:schemas-microsoft-com:mac:vml" xmlns:p="http://schemas.openxmlformats.org/presentationml/2006/main" mc:Ignorable="mv" mc:PreserveAttributes="mv:*">
+<p:sld xmlns:a="http://schemas.openxmlformats.org/drawingml/2006/main" xmlns:r="http://schemas.openxmlformats.org/officeDocument/2006/relationships" xmlns:p="http://schemas.openxmlformats.org/presentationml/2006/main">
   <p:cSld>
     <p:spTree>
       <p:nvGrpSpPr>
@@ -6787,7 +6730,7 @@
           <a:blip r:embed="rId2" cstate="print">
             <a:extLst>
               <a:ext uri="{28A0092B-C50C-407E-A947-70E740481C1C}">
-                <a14:useLocalDpi xmlns="" xmlns:a14="http://schemas.microsoft.com/office/drawing/2010/main" xmlns:p="http://schemas.openxmlformats.org/presentationml/2006/main" xmlns:r="http://schemas.openxmlformats.org/officeDocument/2006/relationships" xmlns:a="http://schemas.openxmlformats.org/drawingml/2006/main" val="0"/>
+                <a14:useLocalDpi xmlns:mc="http://schemas.openxmlformats.org/markup-compatibility/2006" xmlns:mv="urn:schemas-microsoft-com:mac:vml" xmlns="" xmlns:a14="http://schemas.microsoft.com/office/drawing/2010/main" val="0"/>
               </a:ext>
             </a:extLst>
           </a:blip>
@@ -6821,7 +6764,7 @@
 </file>
 
 <file path=ppt/slides/slide9.xml><?xml version="1.0" encoding="utf-8"?>
-<p:sld xmlns:a="http://schemas.openxmlformats.org/drawingml/2006/main" xmlns:r="http://schemas.openxmlformats.org/officeDocument/2006/relationships" xmlns:mc="http://schemas.openxmlformats.org/markup-compatibility/2006" xmlns:mv="urn:schemas-microsoft-com:mac:vml" xmlns:p="http://schemas.openxmlformats.org/presentationml/2006/main" mc:Ignorable="mv" mc:PreserveAttributes="mv:*">
+<p:sld xmlns:a="http://schemas.openxmlformats.org/drawingml/2006/main" xmlns:r="http://schemas.openxmlformats.org/officeDocument/2006/relationships" xmlns:p="http://schemas.openxmlformats.org/presentationml/2006/main">
   <p:cSld>
     <p:spTree>
       <p:nvGrpSpPr>
@@ -6894,21 +6837,12 @@
               <a:rPr lang="en-US" dirty="0" smtClean="0"/>
               <a:t>Register-based</a:t>
             </a:r>
-            <a:endParaRPr lang="en-US" dirty="0" smtClean="0"/>
           </a:p>
           <a:p>
             <a:pPr lvl="1"/>
             <a:r>
               <a:rPr lang="en-US" dirty="0" smtClean="0"/>
-              <a:t>R</a:t>
-            </a:r>
-            <a:r>
-              <a:rPr lang="en-US" dirty="0" smtClean="0"/>
-              <a:t>uns </a:t>
-            </a:r>
-            <a:r>
-              <a:rPr lang="en-US" dirty="0" smtClean="0"/>
-              <a:t>multiple </a:t>
+              <a:t>Runs multiple </a:t>
             </a:r>
             <a:r>
               <a:rPr lang="en-US" dirty="0" err="1" smtClean="0"/>
@@ -6923,15 +6857,7 @@
             <a:pPr lvl="1"/>
             <a:r>
               <a:rPr lang="en-US" dirty="0" smtClean="0"/>
-              <a:t>Requires a </a:t>
-            </a:r>
-            <a:r>
-              <a:rPr lang="en-US" dirty="0" smtClean="0"/>
-              <a:t>.class to </a:t>
-            </a:r>
-            <a:r>
-              <a:rPr lang="en-US" dirty="0" smtClean="0"/>
-              <a:t>.</a:t>
+              <a:t>Requires a .class to .</a:t>
             </a:r>
             <a:r>
               <a:rPr lang="en-US" dirty="0" err="1" smtClean="0"/>
@@ -6941,7 +6867,6 @@
               <a:rPr lang="en-US" dirty="0" smtClean="0"/>
               <a:t> transformation</a:t>
             </a:r>
-            <a:endParaRPr lang="en-US" dirty="0" smtClean="0"/>
           </a:p>
           <a:p>
             <a:pPr lvl="1"/>
@@ -6949,7 +6874,6 @@
               <a:rPr lang="en-US" dirty="0" smtClean="0"/>
               <a:t>JIT (as of Android 2.2)</a:t>
             </a:r>
-            <a:endParaRPr lang="en-US" dirty="0" smtClean="0"/>
           </a:p>
           <a:p>
             <a:r>
@@ -6961,32 +6885,15 @@
             <a:pPr lvl="1"/>
             <a:r>
               <a:rPr lang="en-US" dirty="0" smtClean="0"/>
-              <a:t>R</a:t>
-            </a:r>
-            <a:r>
-              <a:rPr lang="en-US" dirty="0" smtClean="0"/>
-              <a:t>uns in their own process </a:t>
+              <a:t>Runs in their own process </a:t>
             </a:r>
           </a:p>
           <a:p>
             <a:pPr lvl="1"/>
             <a:r>
               <a:rPr lang="en-US" dirty="0" smtClean="0"/>
-              <a:t>Runs </a:t>
-            </a:r>
-            <a:r>
-              <a:rPr lang="en-US" dirty="0" smtClean="0"/>
-              <a:t>on their </a:t>
-            </a:r>
-            <a:r>
-              <a:rPr lang="en-US" dirty="0" smtClean="0"/>
-              <a:t>own</a:t>
-            </a:r>
-            <a:r>
-              <a:rPr lang="en-US" dirty="0" smtClean="0"/>
-              <a:t> VM</a:t>
-            </a:r>
-            <a:endParaRPr lang="en-US" dirty="0" smtClean="0"/>
+              <a:t>Runs on their own VM</a:t>
+            </a:r>
           </a:p>
         </p:txBody>
       </p:sp>

</xml_diff>

<commit_message>
Milwaukee talk final changes
</commit_message>
<xml_diff>
--- a/slides/Monodroid101.pptx
+++ b/slides/Monodroid101.pptx
@@ -2,7 +2,7 @@
 <file path=ppt/presentation.xml><?xml version="1.0" encoding="utf-8"?>
 <p:presentation xmlns:a="http://schemas.openxmlformats.org/drawingml/2006/main" xmlns:r="http://schemas.openxmlformats.org/officeDocument/2006/relationships" xmlns:p="http://schemas.openxmlformats.org/presentationml/2006/main" saveSubsetFonts="1">
   <p:sldMasterIdLst>
-    <p:sldMasterId id="2147483672" r:id="rId1"/>
+    <p:sldMasterId id="2147483696" r:id="rId1"/>
   </p:sldMasterIdLst>
   <p:notesMasterIdLst>
     <p:notesMasterId r:id="rId27"/>
@@ -396,7 +396,7 @@
     </p:spTree>
     <p:extLst>
       <p:ext uri="{BB962C8B-B14F-4D97-AF65-F5344CB8AC3E}">
-        <p14:creationId xmlns:p14="http://schemas.microsoft.com/office/powerpoint/2010/main" xmlns="" val="3056856797"/>
+        <p14:creationId xmlns="" xmlns:p14="http://schemas.microsoft.com/office/powerpoint/2010/main" val="3056856797"/>
       </p:ext>
     </p:extLst>
   </p:cSld>
@@ -3441,6 +3441,10 @@
             </a:lvl9pPr>
           </a:lstStyle>
           <a:p>
+            <a:r>
+              <a:rPr lang="en-US" smtClean="0"/>
+              <a:t>Click icon to add picture</a:t>
+            </a:r>
             <a:endParaRPr lang="en-US"/>
           </a:p>
         </p:txBody>
@@ -3642,7 +3646,7 @@
           <a:lstStyle/>
           <a:p>
             <a:r>
-              <a:rPr lang="en-US" dirty="0" smtClean="0"/>
+              <a:rPr lang="en-US" smtClean="0"/>
               <a:t>Click to edit Master title style</a:t>
             </a:r>
             <a:endParaRPr lang="en-US" dirty="0"/>
@@ -3676,35 +3680,35 @@
           <a:p>
             <a:pPr lvl="0"/>
             <a:r>
-              <a:rPr lang="en-US" dirty="0" smtClean="0"/>
+              <a:rPr lang="en-US" smtClean="0"/>
               <a:t>Click to edit Master text styles</a:t>
             </a:r>
           </a:p>
           <a:p>
             <a:pPr lvl="1"/>
             <a:r>
-              <a:rPr lang="en-US" dirty="0" smtClean="0"/>
+              <a:rPr lang="en-US" smtClean="0"/>
               <a:t>Second level</a:t>
             </a:r>
           </a:p>
           <a:p>
             <a:pPr lvl="2"/>
             <a:r>
-              <a:rPr lang="en-US" dirty="0" smtClean="0"/>
+              <a:rPr lang="en-US" smtClean="0"/>
               <a:t>Third level</a:t>
             </a:r>
           </a:p>
           <a:p>
             <a:pPr lvl="3"/>
             <a:r>
-              <a:rPr lang="en-US" dirty="0" smtClean="0"/>
+              <a:rPr lang="en-US" smtClean="0"/>
               <a:t>Fourth level</a:t>
             </a:r>
           </a:p>
           <a:p>
             <a:pPr lvl="4"/>
             <a:r>
-              <a:rPr lang="en-US" dirty="0" smtClean="0"/>
+              <a:rPr lang="en-US" smtClean="0"/>
               <a:t>Fifth level</a:t>
             </a:r>
             <a:endParaRPr lang="en-US" dirty="0"/>
@@ -3839,17 +3843,17 @@
   </p:cSld>
   <p:clrMap bg1="lt1" tx1="dk1" bg2="lt2" tx2="dk2" accent1="accent1" accent2="accent2" accent3="accent3" accent4="accent4" accent5="accent5" accent6="accent6" hlink="hlink" folHlink="folHlink"/>
   <p:sldLayoutIdLst>
-    <p:sldLayoutId id="2147483673" r:id="rId1"/>
-    <p:sldLayoutId id="2147483674" r:id="rId2"/>
-    <p:sldLayoutId id="2147483675" r:id="rId3"/>
-    <p:sldLayoutId id="2147483676" r:id="rId4"/>
-    <p:sldLayoutId id="2147483677" r:id="rId5"/>
-    <p:sldLayoutId id="2147483678" r:id="rId6"/>
-    <p:sldLayoutId id="2147483679" r:id="rId7"/>
-    <p:sldLayoutId id="2147483680" r:id="rId8"/>
-    <p:sldLayoutId id="2147483681" r:id="rId9"/>
-    <p:sldLayoutId id="2147483682" r:id="rId10"/>
-    <p:sldLayoutId id="2147483683" r:id="rId11"/>
+    <p:sldLayoutId id="2147483697" r:id="rId1"/>
+    <p:sldLayoutId id="2147483698" r:id="rId2"/>
+    <p:sldLayoutId id="2147483699" r:id="rId3"/>
+    <p:sldLayoutId id="2147483700" r:id="rId4"/>
+    <p:sldLayoutId id="2147483701" r:id="rId5"/>
+    <p:sldLayoutId id="2147483702" r:id="rId6"/>
+    <p:sldLayoutId id="2147483703" r:id="rId7"/>
+    <p:sldLayoutId id="2147483704" r:id="rId8"/>
+    <p:sldLayoutId id="2147483705" r:id="rId9"/>
+    <p:sldLayoutId id="2147483706" r:id="rId10"/>
+    <p:sldLayoutId id="2147483707" r:id="rId11"/>
   </p:sldLayoutIdLst>
   <p:txStyles>
     <p:titleStyle>
@@ -4138,12 +4142,19 @@
           <a:p>
             <a:r>
               <a:rPr lang="en-US" dirty="0" smtClean="0">
+                <a:solidFill>
+                  <a:srgbClr val="141717"/>
+                </a:solidFill>
                 <a:latin typeface="Franklin Gothic Medium"/>
                 <a:cs typeface="Franklin Gothic Medium"/>
               </a:rPr>
               <a:t>.NET? MonoDroid Does</a:t>
             </a:r>
-            <a:endParaRPr lang="en-US" dirty="0"/>
+            <a:endParaRPr lang="en-US" dirty="0">
+              <a:solidFill>
+                <a:srgbClr val="141717"/>
+              </a:solidFill>
+            </a:endParaRPr>
           </a:p>
         </p:txBody>
       </p:sp>
@@ -4260,6 +4271,9 @@
           <a:p>
             <a:r>
               <a:rPr lang="en-US" dirty="0" smtClean="0">
+                <a:solidFill>
+                  <a:srgbClr val="141717"/>
+                </a:solidFill>
                 <a:latin typeface="Franklin Gothic Medium"/>
                 <a:cs typeface="Franklin Gothic Medium"/>
               </a:rPr>
@@ -4267,6 +4281,9 @@
             </a:r>
             <a:r>
               <a:rPr lang="en-US" dirty="0" err="1" smtClean="0">
+                <a:solidFill>
+                  <a:srgbClr val="141717"/>
+                </a:solidFill>
                 <a:latin typeface="Franklin Gothic Medium"/>
                 <a:cs typeface="Franklin Gothic Medium"/>
               </a:rPr>
@@ -4274,12 +4291,18 @@
             </a:r>
             <a:r>
               <a:rPr lang="en-US" dirty="0" smtClean="0">
+                <a:solidFill>
+                  <a:srgbClr val="141717"/>
+                </a:solidFill>
                 <a:latin typeface="Franklin Gothic Medium"/>
                 <a:cs typeface="Franklin Gothic Medium"/>
               </a:rPr>
               <a:t>?</a:t>
             </a:r>
             <a:endParaRPr lang="en-US" dirty="0">
+              <a:solidFill>
+                <a:srgbClr val="141717"/>
+              </a:solidFill>
               <a:latin typeface="Franklin Gothic Medium"/>
               <a:cs typeface="Franklin Gothic Medium"/>
             </a:endParaRPr>
@@ -4304,58 +4327,94 @@
           <a:lstStyle/>
           <a:p>
             <a:r>
-              <a:rPr lang="en-US" dirty="0" smtClean="0"/>
+              <a:rPr lang="en-US" dirty="0" smtClean="0">
+                <a:solidFill>
+                  <a:srgbClr val="141717"/>
+                </a:solidFill>
+              </a:rPr>
               <a:t>Commercial Product from Novell</a:t>
             </a:r>
           </a:p>
           <a:p>
             <a:pPr lvl="1"/>
             <a:r>
-              <a:rPr lang="en-US" dirty="0" smtClean="0"/>
+              <a:rPr lang="en-US" dirty="0" smtClean="0">
+                <a:solidFill>
+                  <a:srgbClr val="141717"/>
+                </a:solidFill>
+              </a:rPr>
               <a:t>~$400 individual / ~$1000 enterprise </a:t>
             </a:r>
           </a:p>
           <a:p>
             <a:r>
-              <a:rPr lang="en-US" dirty="0" smtClean="0"/>
+              <a:rPr lang="en-US" dirty="0" smtClean="0">
+                <a:solidFill>
+                  <a:srgbClr val="141717"/>
+                </a:solidFill>
+              </a:rPr>
               <a:t>Windows and Mac OS X (Linux soon)</a:t>
             </a:r>
           </a:p>
           <a:p>
             <a:r>
-              <a:rPr lang="en-US" dirty="0" smtClean="0"/>
+              <a:rPr lang="en-US" dirty="0" smtClean="0">
+                <a:solidFill>
+                  <a:srgbClr val="141717"/>
+                </a:solidFill>
+              </a:rPr>
               <a:t>Now in Open Preview</a:t>
             </a:r>
           </a:p>
           <a:p>
             <a:pPr lvl="1"/>
             <a:r>
-              <a:rPr lang="en-US" b="1" dirty="0" smtClean="0"/>
+              <a:rPr lang="en-US" b="1" dirty="0" smtClean="0">
+                <a:solidFill>
+                  <a:srgbClr val="141717"/>
+                </a:solidFill>
+              </a:rPr>
               <a:t>DOWNLOAD AND TRY IT!</a:t>
             </a:r>
           </a:p>
           <a:p>
             <a:r>
-              <a:rPr lang="en-US" dirty="0" smtClean="0"/>
+              <a:rPr lang="en-US" dirty="0" smtClean="0">
+                <a:solidFill>
+                  <a:srgbClr val="141717"/>
+                </a:solidFill>
+              </a:rPr>
               <a:t>Project is still raw</a:t>
             </a:r>
           </a:p>
           <a:p>
             <a:pPr lvl="1"/>
             <a:r>
-              <a:rPr lang="en-US" dirty="0" smtClean="0"/>
+              <a:rPr lang="en-US" dirty="0" smtClean="0">
+                <a:solidFill>
+                  <a:srgbClr val="141717"/>
+                </a:solidFill>
+              </a:rPr>
               <a:t>GC</a:t>
             </a:r>
           </a:p>
           <a:p>
             <a:pPr lvl="1"/>
             <a:r>
-              <a:rPr lang="en-US" dirty="0" smtClean="0"/>
+              <a:rPr lang="en-US" dirty="0" smtClean="0">
+                <a:solidFill>
+                  <a:srgbClr val="141717"/>
+                </a:solidFill>
+              </a:rPr>
               <a:t>Not fully optimized for speed or size</a:t>
             </a:r>
           </a:p>
           <a:p>
-            <a:endParaRPr lang="en-US" dirty="0" smtClean="0"/>
+            <a:endParaRPr lang="en-US" dirty="0" smtClean="0">
+              <a:solidFill>
+                <a:srgbClr val="141717"/>
+              </a:solidFill>
+            </a:endParaRPr>
           </a:p>
         </p:txBody>
       </p:sp>
@@ -4408,12 +4467,18 @@
           <a:p>
             <a:r>
               <a:rPr lang="en-US" dirty="0" smtClean="0">
+                <a:solidFill>
+                  <a:srgbClr val="141717"/>
+                </a:solidFill>
                 <a:latin typeface="Franklin Gothic Medium"/>
                 <a:cs typeface="Franklin Gothic Medium"/>
               </a:rPr>
               <a:t>How Does it Work?</a:t>
             </a:r>
             <a:endParaRPr lang="en-US" dirty="0">
+              <a:solidFill>
+                <a:srgbClr val="141717"/>
+              </a:solidFill>
               <a:latin typeface="Franklin Gothic Medium"/>
               <a:cs typeface="Franklin Gothic Medium"/>
             </a:endParaRPr>
@@ -4436,63 +4501,103 @@
           <a:lstStyle/>
           <a:p>
             <a:r>
-              <a:rPr lang="en-US" dirty="0" smtClean="0"/>
+              <a:rPr lang="en-US" dirty="0" smtClean="0">
+                <a:solidFill>
+                  <a:srgbClr val="141717"/>
+                </a:solidFill>
+              </a:rPr>
               <a:t>Mono Runtime</a:t>
             </a:r>
           </a:p>
           <a:p>
             <a:pPr lvl="1"/>
             <a:r>
-              <a:rPr lang="en-US" dirty="0" smtClean="0"/>
+              <a:rPr lang="en-US" dirty="0" smtClean="0">
+                <a:solidFill>
+                  <a:srgbClr val="141717"/>
+                </a:solidFill>
+              </a:rPr>
               <a:t>Native to the device</a:t>
             </a:r>
           </a:p>
           <a:p>
             <a:pPr lvl="1"/>
             <a:r>
-              <a:rPr lang="en-US" dirty="0" smtClean="0"/>
+              <a:rPr lang="en-US" dirty="0" smtClean="0">
+                <a:solidFill>
+                  <a:srgbClr val="141717"/>
+                </a:solidFill>
+              </a:rPr>
               <a:t>Executes .Net code</a:t>
             </a:r>
           </a:p>
           <a:p>
             <a:pPr lvl="1"/>
             <a:r>
-              <a:rPr lang="en-US" dirty="0" smtClean="0"/>
+              <a:rPr lang="en-US" dirty="0" smtClean="0">
+                <a:solidFill>
+                  <a:srgbClr val="141717"/>
+                </a:solidFill>
+              </a:rPr>
               <a:t>Runs </a:t>
             </a:r>
             <a:r>
-              <a:rPr lang="en-US" b="1" dirty="0" smtClean="0"/>
+              <a:rPr lang="en-US" b="1" dirty="0" smtClean="0">
+                <a:solidFill>
+                  <a:srgbClr val="141717"/>
+                </a:solidFill>
+              </a:rPr>
               <a:t>side-by-side</a:t>
             </a:r>
             <a:r>
-              <a:rPr lang="en-US" dirty="0" smtClean="0"/>
+              <a:rPr lang="en-US" dirty="0" smtClean="0">
+                <a:solidFill>
+                  <a:srgbClr val="141717"/>
+                </a:solidFill>
+              </a:rPr>
               <a:t> with Dalvik</a:t>
             </a:r>
           </a:p>
           <a:p>
             <a:r>
-              <a:rPr lang="en-US" dirty="0" smtClean="0"/>
+              <a:rPr lang="en-US" dirty="0" smtClean="0">
+                <a:solidFill>
+                  <a:srgbClr val="141717"/>
+                </a:solidFill>
+              </a:rPr>
               <a:t>Mono to Android Communication</a:t>
             </a:r>
           </a:p>
           <a:p>
             <a:pPr lvl="1"/>
             <a:r>
-              <a:rPr lang="en-US" dirty="0" smtClean="0"/>
+              <a:rPr lang="en-US" dirty="0" smtClean="0">
+                <a:solidFill>
+                  <a:srgbClr val="141717"/>
+                </a:solidFill>
+              </a:rPr>
               <a:t>Java proxies</a:t>
             </a:r>
           </a:p>
           <a:p>
             <a:pPr lvl="2"/>
             <a:r>
-              <a:rPr lang="en-US" dirty="0" smtClean="0"/>
+              <a:rPr lang="en-US" dirty="0" smtClean="0">
+                <a:solidFill>
+                  <a:srgbClr val="141717"/>
+                </a:solidFill>
+              </a:rPr>
               <a:t>Android Callable Wrappers </a:t>
             </a:r>
           </a:p>
           <a:p>
             <a:pPr lvl="2"/>
             <a:r>
-              <a:rPr lang="en-US" dirty="0" smtClean="0"/>
+              <a:rPr lang="en-US" dirty="0" smtClean="0">
+                <a:solidFill>
+                  <a:srgbClr val="141717"/>
+                </a:solidFill>
+              </a:rPr>
               <a:t>Managed Callable Wrappers</a:t>
             </a:r>
           </a:p>
@@ -4500,10 +4605,18 @@
             <a:pPr>
               <a:buNone/>
             </a:pPr>
-            <a:endParaRPr lang="en-US" dirty="0" smtClean="0"/>
-          </a:p>
-          <a:p>
-            <a:endParaRPr lang="en-US" dirty="0" smtClean="0"/>
+            <a:endParaRPr lang="en-US" dirty="0" smtClean="0">
+              <a:solidFill>
+                <a:srgbClr val="141717"/>
+              </a:solidFill>
+            </a:endParaRPr>
+          </a:p>
+          <a:p>
+            <a:endParaRPr lang="en-US" dirty="0" smtClean="0">
+              <a:solidFill>
+                <a:srgbClr val="141717"/>
+              </a:solidFill>
+            </a:endParaRPr>
           </a:p>
         </p:txBody>
       </p:sp>
@@ -4549,12 +4662,18 @@
           <a:p>
             <a:r>
               <a:rPr lang="en-US" dirty="0" smtClean="0">
+                <a:solidFill>
+                  <a:srgbClr val="141717"/>
+                </a:solidFill>
                 <a:latin typeface="Franklin Gothic Medium"/>
                 <a:cs typeface="Franklin Gothic Medium"/>
               </a:rPr>
               <a:t>MonoDroid Architecture</a:t>
             </a:r>
             <a:endParaRPr lang="en-US" dirty="0">
+              <a:solidFill>
+                <a:srgbClr val="141717"/>
+              </a:solidFill>
               <a:latin typeface="Franklin Gothic Medium"/>
               <a:cs typeface="Franklin Gothic Medium"/>
             </a:endParaRPr>
@@ -4573,12 +4692,16 @@
         </p:nvPicPr>
         <p:blipFill>
           <a:blip r:embed="rId3" cstate="print"/>
-          <a:srcRect t="-10074" b="-10074"/>
           <a:stretch>
             <a:fillRect/>
           </a:stretch>
         </p:blipFill>
-        <p:spPr/>
+        <p:spPr>
+          <a:xfrm>
+            <a:off x="1585495" y="2496153"/>
+            <a:ext cx="5973009" cy="2734057"/>
+          </a:xfrm>
+        </p:spPr>
       </p:pic>
     </p:spTree>
   </p:cSld>
@@ -4768,6 +4891,9 @@
           <a:p>
             <a:r>
               <a:rPr lang="en-US" dirty="0" smtClean="0">
+                <a:solidFill>
+                  <a:srgbClr val="141717"/>
+                </a:solidFill>
                 <a:latin typeface="Franklin Gothic Medium"/>
                 <a:cs typeface="Franklin Gothic Medium"/>
               </a:rPr>
@@ -4775,6 +4901,9 @@
             </a:r>
             <a:r>
               <a:rPr lang="en-US" dirty="0" err="1" smtClean="0">
+                <a:solidFill>
+                  <a:srgbClr val="141717"/>
+                </a:solidFill>
                 <a:latin typeface="Franklin Gothic Medium"/>
                 <a:cs typeface="Franklin Gothic Medium"/>
               </a:rPr>
@@ -4782,12 +4911,18 @@
             </a:r>
             <a:r>
               <a:rPr lang="en-US" dirty="0" smtClean="0">
+                <a:solidFill>
+                  <a:srgbClr val="141717"/>
+                </a:solidFill>
                 <a:latin typeface="Franklin Gothic Medium"/>
                 <a:cs typeface="Franklin Gothic Medium"/>
               </a:rPr>
               <a:t>?</a:t>
             </a:r>
             <a:endParaRPr lang="en-US" dirty="0">
+              <a:solidFill>
+                <a:srgbClr val="141717"/>
+              </a:solidFill>
               <a:latin typeface="Franklin Gothic Medium"/>
               <a:cs typeface="Franklin Gothic Medium"/>
             </a:endParaRPr>
@@ -4812,68 +4947,112 @@
           <a:lstStyle/>
           <a:p>
             <a:r>
-              <a:rPr lang="en-US" dirty="0" smtClean="0"/>
+              <a:rPr lang="en-US" dirty="0" smtClean="0">
+                <a:solidFill>
+                  <a:srgbClr val="141717"/>
+                </a:solidFill>
+              </a:rPr>
               <a:t>MonoDroid story not as compelling as MonoTouch.</a:t>
             </a:r>
           </a:p>
           <a:p>
             <a:pPr lvl="1"/>
             <a:r>
-              <a:rPr lang="en-US" dirty="0" smtClean="0"/>
+              <a:rPr lang="en-US" dirty="0" smtClean="0">
+                <a:solidFill>
+                  <a:srgbClr val="141717"/>
+                </a:solidFill>
+              </a:rPr>
               <a:t>GC, decent IDE, not Objective-C</a:t>
             </a:r>
           </a:p>
           <a:p>
             <a:r>
-              <a:rPr lang="en-US" dirty="0" smtClean="0"/>
+              <a:rPr lang="en-US" dirty="0" smtClean="0">
+                <a:solidFill>
+                  <a:srgbClr val="141717"/>
+                </a:solidFill>
+              </a:rPr>
               <a:t>Opportunities for re-use across platforms</a:t>
             </a:r>
           </a:p>
           <a:p>
             <a:pPr lvl="1"/>
             <a:r>
-              <a:rPr lang="en-US" dirty="0" smtClean="0"/>
+              <a:rPr lang="en-US" dirty="0" smtClean="0">
+                <a:solidFill>
+                  <a:srgbClr val="141717"/>
+                </a:solidFill>
+              </a:rPr>
               <a:t>iOS, Android, Windows Phone 7 non-UI components</a:t>
             </a:r>
           </a:p>
           <a:p>
             <a:pPr lvl="1"/>
             <a:r>
-              <a:rPr lang="en-US" dirty="0" smtClean="0"/>
+              <a:rPr lang="en-US" dirty="0" smtClean="0">
+                <a:solidFill>
+                  <a:srgbClr val="141717"/>
+                </a:solidFill>
+              </a:rPr>
               <a:t>XNA for games a possibility</a:t>
             </a:r>
           </a:p>
           <a:p>
             <a:r>
-              <a:rPr lang="en-US" dirty="0" smtClean="0"/>
+              <a:rPr lang="en-US" dirty="0" smtClean="0">
+                <a:solidFill>
+                  <a:srgbClr val="141717"/>
+                </a:solidFill>
+              </a:rPr>
               <a:t>Development tooling and environment</a:t>
             </a:r>
           </a:p>
           <a:p>
             <a:pPr lvl="1"/>
             <a:r>
-              <a:rPr lang="en-US" dirty="0" smtClean="0"/>
+              <a:rPr lang="en-US" dirty="0" smtClean="0">
+                <a:solidFill>
+                  <a:srgbClr val="141717"/>
+                </a:solidFill>
+              </a:rPr>
               <a:t>Visual Studio</a:t>
             </a:r>
           </a:p>
           <a:p>
             <a:pPr lvl="1"/>
             <a:r>
-              <a:rPr lang="en-US" dirty="0" err="1" smtClean="0"/>
+              <a:rPr lang="en-US" dirty="0" err="1" smtClean="0">
+                <a:solidFill>
+                  <a:srgbClr val="141717"/>
+                </a:solidFill>
+              </a:rPr>
               <a:t>MonoDevelop</a:t>
             </a:r>
-            <a:endParaRPr lang="en-US" dirty="0" smtClean="0"/>
-          </a:p>
-          <a:p>
-            <a:r>
-              <a:rPr lang="en-US" dirty="0" smtClean="0"/>
+            <a:endParaRPr lang="en-US" dirty="0" smtClean="0">
+              <a:solidFill>
+                <a:srgbClr val="141717"/>
+              </a:solidFill>
+            </a:endParaRPr>
+          </a:p>
+          <a:p>
+            <a:r>
+              <a:rPr lang="en-US" dirty="0" smtClean="0">
+                <a:solidFill>
+                  <a:srgbClr val="141717"/>
+                </a:solidFill>
+              </a:rPr>
               <a:t>C# &gt; Java</a:t>
             </a:r>
           </a:p>
           <a:p>
             <a:pPr lvl="1"/>
             <a:r>
-              <a:rPr lang="en-US" dirty="0" smtClean="0"/>
+              <a:rPr lang="en-US" dirty="0" smtClean="0">
+                <a:solidFill>
+                  <a:srgbClr val="141717"/>
+                </a:solidFill>
+              </a:rPr>
               <a:t>Friction still exists due to Java idioms and architecture.</a:t>
             </a:r>
           </a:p>
@@ -4921,12 +5100,18 @@
           <a:p>
             <a:r>
               <a:rPr lang="en-US" dirty="0" smtClean="0">
+                <a:solidFill>
+                  <a:srgbClr val="141717"/>
+                </a:solidFill>
                 <a:latin typeface="Franklin Gothic Medium"/>
                 <a:cs typeface="Franklin Gothic Medium"/>
               </a:rPr>
               <a:t>Deployment Options</a:t>
             </a:r>
             <a:endParaRPr lang="en-US" dirty="0">
+              <a:solidFill>
+                <a:srgbClr val="141717"/>
+              </a:solidFill>
               <a:latin typeface="Franklin Gothic Medium"/>
               <a:cs typeface="Franklin Gothic Medium"/>
             </a:endParaRPr>
@@ -4956,7 +5141,11 @@
               </a:spcAft>
             </a:pPr>
             <a:r>
-              <a:rPr lang="en-US" sz="2800" dirty="0" smtClean="0"/>
+              <a:rPr lang="en-US" sz="2800" dirty="0" smtClean="0">
+                <a:solidFill>
+                  <a:srgbClr val="141717"/>
+                </a:solidFill>
+              </a:rPr>
               <a:t>Deploy to Android Virtual Device</a:t>
             </a:r>
           </a:p>
@@ -4967,7 +5156,11 @@
               </a:spcAft>
             </a:pPr>
             <a:r>
-              <a:rPr lang="en-US" sz="2800" dirty="0" smtClean="0"/>
+              <a:rPr lang="en-US" sz="2800" dirty="0" smtClean="0">
+                <a:solidFill>
+                  <a:srgbClr val="141717"/>
+                </a:solidFill>
+              </a:rPr>
               <a:t>Deploy to Device</a:t>
             </a:r>
           </a:p>
@@ -4978,7 +5171,11 @@
               </a:spcAft>
             </a:pPr>
             <a:r>
-              <a:rPr lang="en-US" sz="2800" dirty="0" smtClean="0"/>
+              <a:rPr lang="en-US" sz="2800" dirty="0" smtClean="0">
+                <a:solidFill>
+                  <a:srgbClr val="141717"/>
+                </a:solidFill>
+              </a:rPr>
               <a:t>Debug capabilities on both</a:t>
             </a:r>
           </a:p>
@@ -4989,7 +5186,11 @@
               </a:spcAft>
             </a:pPr>
             <a:r>
-              <a:rPr lang="en-US" sz="2800" dirty="0" smtClean="0"/>
+              <a:rPr lang="en-US" sz="2800" dirty="0" smtClean="0">
+                <a:solidFill>
+                  <a:srgbClr val="141717"/>
+                </a:solidFill>
+              </a:rPr>
               <a:t>Sell (eventually) via Android Marketplace</a:t>
             </a:r>
           </a:p>
@@ -5000,7 +5201,11 @@
               </a:spcAft>
             </a:pPr>
             <a:r>
-              <a:rPr lang="en-US" dirty="0" smtClean="0"/>
+              <a:rPr lang="en-US" dirty="0" smtClean="0">
+                <a:solidFill>
+                  <a:srgbClr val="141717"/>
+                </a:solidFill>
+              </a:rPr>
               <a:t>No “Go Live” license yet</a:t>
             </a:r>
           </a:p>
@@ -5011,7 +5216,11 @@
               </a:spcAft>
             </a:pPr>
             <a:r>
-              <a:rPr lang="en-US" dirty="0" smtClean="0"/>
+              <a:rPr lang="en-US" dirty="0" smtClean="0">
+                <a:solidFill>
+                  <a:srgbClr val="141717"/>
+                </a:solidFill>
+              </a:rPr>
               <a:t>$25 Google developer account</a:t>
             </a:r>
           </a:p>
@@ -5061,6 +5270,9 @@
           <a:p>
             <a:r>
               <a:rPr lang="en-US" dirty="0" smtClean="0">
+                <a:solidFill>
+                  <a:srgbClr val="141717"/>
+                </a:solidFill>
                 <a:latin typeface="Franklin Gothic Medium"/>
                 <a:cs typeface="Franklin Gothic Medium"/>
               </a:rPr>
@@ -5090,7 +5302,11 @@
               </a:spcAft>
             </a:pPr>
             <a:r>
-              <a:rPr lang="en-US" dirty="0" smtClean="0"/>
+              <a:rPr lang="en-US" dirty="0" smtClean="0">
+                <a:solidFill>
+                  <a:srgbClr val="141717"/>
+                </a:solidFill>
+              </a:rPr>
               <a:t>Activities</a:t>
             </a:r>
           </a:p>
@@ -5101,7 +5317,11 @@
               </a:spcAft>
             </a:pPr>
             <a:r>
-              <a:rPr lang="en-US" dirty="0" smtClean="0"/>
+              <a:rPr lang="en-US" dirty="0" smtClean="0">
+                <a:solidFill>
+                  <a:srgbClr val="141717"/>
+                </a:solidFill>
+              </a:rPr>
               <a:t>Services</a:t>
             </a:r>
           </a:p>
@@ -5112,7 +5332,11 @@
               </a:spcAft>
             </a:pPr>
             <a:r>
-              <a:rPr lang="en-US" dirty="0" smtClean="0"/>
+              <a:rPr lang="en-US" dirty="0" smtClean="0">
+                <a:solidFill>
+                  <a:srgbClr val="141717"/>
+                </a:solidFill>
+              </a:rPr>
               <a:t>Content Providers</a:t>
             </a:r>
           </a:p>
@@ -5123,7 +5347,11 @@
               </a:spcAft>
             </a:pPr>
             <a:r>
-              <a:rPr lang="en-US" dirty="0" smtClean="0"/>
+              <a:rPr lang="en-US" dirty="0" smtClean="0">
+                <a:solidFill>
+                  <a:srgbClr val="141717"/>
+                </a:solidFill>
+              </a:rPr>
               <a:t>Intents</a:t>
             </a:r>
           </a:p>
@@ -5134,10 +5362,18 @@
               </a:spcAft>
             </a:pPr>
             <a:r>
-              <a:rPr lang="en-US" dirty="0" smtClean="0"/>
+              <a:rPr lang="en-US" dirty="0" smtClean="0">
+                <a:solidFill>
+                  <a:srgbClr val="141717"/>
+                </a:solidFill>
+              </a:rPr>
               <a:t>Resources</a:t>
             </a:r>
-            <a:endParaRPr lang="en-US" dirty="0"/>
+            <a:endParaRPr lang="en-US" dirty="0">
+              <a:solidFill>
+                <a:srgbClr val="141717"/>
+              </a:solidFill>
+            </a:endParaRPr>
           </a:p>
         </p:txBody>
       </p:sp>
@@ -5183,12 +5419,18 @@
           <a:p>
             <a:r>
               <a:rPr lang="en-US" dirty="0" smtClean="0">
+                <a:solidFill>
+                  <a:srgbClr val="141717"/>
+                </a:solidFill>
                 <a:latin typeface="Franklin Gothic Medium"/>
                 <a:cs typeface="Franklin Gothic Medium"/>
               </a:rPr>
               <a:t>Activities</a:t>
             </a:r>
             <a:endParaRPr lang="en-US" dirty="0">
+              <a:solidFill>
+                <a:srgbClr val="141717"/>
+              </a:solidFill>
               <a:latin typeface="Franklin Gothic Medium"/>
               <a:cs typeface="Franklin Gothic Medium"/>
             </a:endParaRPr>
@@ -5213,7 +5455,11 @@
           <a:lstStyle/>
           <a:p>
             <a:r>
-              <a:rPr lang="en-US" dirty="0" smtClean="0"/>
+              <a:rPr lang="en-US" dirty="0" smtClean="0">
+                <a:solidFill>
+                  <a:srgbClr val="141717"/>
+                </a:solidFill>
+              </a:rPr>
               <a:t>Orchestrates a UI view</a:t>
             </a:r>
           </a:p>
@@ -5224,13 +5470,21 @@
               </a:spcAft>
             </a:pPr>
             <a:r>
-              <a:rPr lang="en-US" dirty="0" smtClean="0"/>
+              <a:rPr lang="en-US" dirty="0" smtClean="0">
+                <a:solidFill>
+                  <a:srgbClr val="141717"/>
+                </a:solidFill>
+              </a:rPr>
               <a:t>Applications are composed of 1-to-Many activities</a:t>
             </a:r>
           </a:p>
           <a:p>
             <a:r>
-              <a:rPr lang="en-US" dirty="0" smtClean="0"/>
+              <a:rPr lang="en-US" dirty="0" smtClean="0">
+                <a:solidFill>
+                  <a:srgbClr val="141717"/>
+                </a:solidFill>
+              </a:rPr>
               <a:t>One activity marked as main and shown first upon launch</a:t>
             </a:r>
           </a:p>
@@ -5285,12 +5539,18 @@
           <a:p>
             <a:r>
               <a:rPr lang="en-US" dirty="0" smtClean="0">
+                <a:solidFill>
+                  <a:srgbClr val="141717"/>
+                </a:solidFill>
                 <a:latin typeface="Franklin Gothic Medium"/>
                 <a:cs typeface="Franklin Gothic Medium"/>
               </a:rPr>
               <a:t>Activities - Views</a:t>
             </a:r>
             <a:endParaRPr lang="en-US" dirty="0">
+              <a:solidFill>
+                <a:srgbClr val="141717"/>
+              </a:solidFill>
               <a:latin typeface="Franklin Gothic Medium"/>
               <a:cs typeface="Franklin Gothic Medium"/>
             </a:endParaRPr>
@@ -5315,32 +5575,56 @@
           <a:lstStyle/>
           <a:p>
             <a:r>
-              <a:rPr lang="en-US" dirty="0" smtClean="0"/>
+              <a:rPr lang="en-US" dirty="0" smtClean="0">
+                <a:solidFill>
+                  <a:srgbClr val="141717"/>
+                </a:solidFill>
+              </a:rPr>
               <a:t>Each activity is given a default window to draw in. </a:t>
             </a:r>
           </a:p>
           <a:p>
             <a:r>
-              <a:rPr lang="en-US" dirty="0" smtClean="0"/>
+              <a:rPr lang="en-US" dirty="0" smtClean="0">
+                <a:solidFill>
+                  <a:srgbClr val="141717"/>
+                </a:solidFill>
+              </a:rPr>
               <a:t>Content of the window is provided by a hierarchy of views</a:t>
             </a:r>
           </a:p>
           <a:p>
             <a:r>
-              <a:rPr lang="en-US" dirty="0" smtClean="0"/>
+              <a:rPr lang="en-US" dirty="0" smtClean="0">
+                <a:solidFill>
+                  <a:srgbClr val="141717"/>
+                </a:solidFill>
+              </a:rPr>
               <a:t>A view hierarchy is placed within an activity's window by the </a:t>
             </a:r>
             <a:r>
-              <a:rPr lang="en-US" dirty="0" err="1" smtClean="0"/>
+              <a:rPr lang="en-US" dirty="0" err="1" smtClean="0">
+                <a:solidFill>
+                  <a:srgbClr val="141717"/>
+                </a:solidFill>
+              </a:rPr>
               <a:t>Activity.SetContentView</a:t>
             </a:r>
             <a:r>
-              <a:rPr lang="en-US" dirty="0" smtClean="0"/>
+              <a:rPr lang="en-US" dirty="0" smtClean="0">
+                <a:solidFill>
+                  <a:srgbClr val="141717"/>
+                </a:solidFill>
+              </a:rPr>
               <a:t>()</a:t>
             </a:r>
           </a:p>
           <a:p>
-            <a:endParaRPr lang="en-US" dirty="0"/>
+            <a:endParaRPr lang="en-US" dirty="0">
+              <a:solidFill>
+                <a:srgbClr val="141717"/>
+              </a:solidFill>
+            </a:endParaRPr>
           </a:p>
         </p:txBody>
       </p:sp>
@@ -5499,7 +5783,11 @@
               </a:lnSpc>
             </a:pPr>
             <a:r>
-              <a:rPr lang="en-US" dirty="0" smtClean="0"/>
+              <a:rPr lang="en-US" dirty="0" smtClean="0">
+                <a:solidFill>
+                  <a:srgbClr val="141717"/>
+                </a:solidFill>
+              </a:rPr>
               <a:t>Overview of Android</a:t>
             </a:r>
           </a:p>
@@ -5510,11 +5798,19 @@
               </a:lnSpc>
             </a:pPr>
             <a:r>
-              <a:rPr lang="en-US" dirty="0" err="1" smtClean="0"/>
+              <a:rPr lang="en-US" dirty="0" err="1" smtClean="0">
+                <a:solidFill>
+                  <a:srgbClr val="141717"/>
+                </a:solidFill>
+              </a:rPr>
               <a:t>MonoDroid</a:t>
             </a:r>
             <a:r>
-              <a:rPr lang="en-US" dirty="0" smtClean="0"/>
+              <a:rPr lang="en-US" dirty="0" smtClean="0">
+                <a:solidFill>
+                  <a:srgbClr val="141717"/>
+                </a:solidFill>
+              </a:rPr>
               <a:t> : What, How, Why</a:t>
             </a:r>
           </a:p>
@@ -5525,7 +5821,11 @@
               </a:lnSpc>
             </a:pPr>
             <a:r>
-              <a:rPr lang="en-US" dirty="0" smtClean="0"/>
+              <a:rPr lang="en-US" dirty="0" smtClean="0">
+                <a:solidFill>
+                  <a:srgbClr val="141717"/>
+                </a:solidFill>
+              </a:rPr>
               <a:t>Code Demo</a:t>
             </a:r>
           </a:p>
@@ -5536,10 +5836,18 @@
               </a:lnSpc>
             </a:pPr>
             <a:r>
-              <a:rPr lang="en-US" dirty="0" smtClean="0"/>
+              <a:rPr lang="en-US" dirty="0" smtClean="0">
+                <a:solidFill>
+                  <a:srgbClr val="141717"/>
+                </a:solidFill>
+              </a:rPr>
               <a:t>MonoDroid Resources</a:t>
             </a:r>
-            <a:endParaRPr lang="en-US" dirty="0"/>
+            <a:endParaRPr lang="en-US" dirty="0">
+              <a:solidFill>
+                <a:srgbClr val="141717"/>
+              </a:solidFill>
+            </a:endParaRPr>
           </a:p>
         </p:txBody>
       </p:sp>
@@ -5592,6 +5900,9 @@
           <a:p>
             <a:r>
               <a:rPr lang="en-US" dirty="0" smtClean="0">
+                <a:solidFill>
+                  <a:srgbClr val="141717"/>
+                </a:solidFill>
                 <a:latin typeface="Franklin Gothic Medium"/>
                 <a:cs typeface="Franklin Gothic Medium"/>
               </a:rPr>
@@ -5616,27 +5927,47 @@
           <a:lstStyle/>
           <a:p>
             <a:r>
-              <a:rPr lang="en-US" dirty="0" smtClean="0"/>
+              <a:rPr lang="en-US" dirty="0" smtClean="0">
+                <a:solidFill>
+                  <a:srgbClr val="141717"/>
+                </a:solidFill>
+              </a:rPr>
               <a:t>Android service are what you’d expect.</a:t>
             </a:r>
           </a:p>
           <a:p>
             <a:r>
-              <a:rPr lang="en-US" dirty="0" smtClean="0"/>
+              <a:rPr lang="en-US" dirty="0" smtClean="0">
+                <a:solidFill>
+                  <a:srgbClr val="141717"/>
+                </a:solidFill>
+              </a:rPr>
               <a:t>Possible to bind to an ongoing service and communicate via exposed interface</a:t>
             </a:r>
           </a:p>
           <a:p>
             <a:r>
-              <a:rPr lang="en-US" dirty="0" smtClean="0"/>
+              <a:rPr lang="en-US" dirty="0" smtClean="0">
+                <a:solidFill>
+                  <a:srgbClr val="141717"/>
+                </a:solidFill>
+              </a:rPr>
               <a:t>Runs in main application process but doesn’t block other components or UI</a:t>
             </a:r>
           </a:p>
           <a:p>
-            <a:endParaRPr lang="en-US" dirty="0" smtClean="0"/>
-          </a:p>
-          <a:p>
-            <a:endParaRPr lang="en-US" dirty="0"/>
+            <a:endParaRPr lang="en-US" dirty="0" smtClean="0">
+              <a:solidFill>
+                <a:srgbClr val="141717"/>
+              </a:solidFill>
+            </a:endParaRPr>
+          </a:p>
+          <a:p>
+            <a:endParaRPr lang="en-US" dirty="0">
+              <a:solidFill>
+                <a:srgbClr val="141717"/>
+              </a:solidFill>
+            </a:endParaRPr>
           </a:p>
         </p:txBody>
       </p:sp>
@@ -5682,17 +6013,27 @@
           <a:p>
             <a:r>
               <a:rPr lang="en-US" dirty="0" smtClean="0">
+                <a:solidFill>
+                  <a:srgbClr val="141717"/>
+                </a:solidFill>
                 <a:latin typeface="Franklin Gothic Medium"/>
                 <a:cs typeface="Franklin Gothic Medium"/>
               </a:rPr>
               <a:t>Content</a:t>
             </a:r>
             <a:r>
-              <a:rPr lang="en-US" dirty="0" smtClean="0"/>
+              <a:rPr lang="en-US" dirty="0" smtClean="0">
+                <a:solidFill>
+                  <a:srgbClr val="141717"/>
+                </a:solidFill>
+              </a:rPr>
               <a:t> </a:t>
             </a:r>
             <a:r>
               <a:rPr lang="en-US" dirty="0" smtClean="0">
+                <a:solidFill>
+                  <a:srgbClr val="141717"/>
+                </a:solidFill>
                 <a:latin typeface="Franklin Gothic Medium"/>
                 <a:cs typeface="Franklin Gothic Medium"/>
               </a:rPr>
@@ -5717,50 +6058,82 @@
           <a:lstStyle/>
           <a:p>
             <a:r>
-              <a:rPr lang="en-US" dirty="0" err="1" smtClean="0"/>
+              <a:rPr lang="en-US" dirty="0" err="1" smtClean="0">
+                <a:solidFill>
+                  <a:srgbClr val="141717"/>
+                </a:solidFill>
+              </a:rPr>
               <a:t>Queryable</a:t>
             </a:r>
             <a:r>
-              <a:rPr lang="en-US" dirty="0" smtClean="0"/>
+              <a:rPr lang="en-US" dirty="0" smtClean="0">
+                <a:solidFill>
+                  <a:srgbClr val="141717"/>
+                </a:solidFill>
+              </a:rPr>
               <a:t> application data stores</a:t>
             </a:r>
           </a:p>
           <a:p>
             <a:r>
-              <a:rPr lang="en-US" dirty="0" smtClean="0"/>
+              <a:rPr lang="en-US" dirty="0" smtClean="0">
+                <a:solidFill>
+                  <a:srgbClr val="141717"/>
+                </a:solidFill>
+              </a:rPr>
               <a:t>Only way to share data amongst other apps</a:t>
             </a:r>
           </a:p>
           <a:p>
             <a:r>
-              <a:rPr lang="en-US" dirty="0" smtClean="0"/>
+              <a:rPr lang="en-US" dirty="0" smtClean="0">
+                <a:solidFill>
+                  <a:srgbClr val="141717"/>
+                </a:solidFill>
+              </a:rPr>
               <a:t>Android ships with common providers</a:t>
             </a:r>
           </a:p>
           <a:p>
             <a:pPr lvl="1"/>
             <a:r>
-              <a:rPr lang="en-US" dirty="0" smtClean="0"/>
+              <a:rPr lang="en-US" dirty="0" smtClean="0">
+                <a:solidFill>
+                  <a:srgbClr val="141717"/>
+                </a:solidFill>
+              </a:rPr>
               <a:t>Audio, video, images, contacts, etc.</a:t>
             </a:r>
           </a:p>
           <a:p>
             <a:r>
-              <a:rPr lang="en-US" dirty="0" smtClean="0"/>
+              <a:rPr lang="en-US" dirty="0" smtClean="0">
+                <a:solidFill>
+                  <a:srgbClr val="141717"/>
+                </a:solidFill>
+              </a:rPr>
               <a:t>Making your application’s data public</a:t>
             </a:r>
           </a:p>
           <a:p>
             <a:pPr lvl="1"/>
             <a:r>
-              <a:rPr lang="en-US" dirty="0" smtClean="0"/>
+              <a:rPr lang="en-US" dirty="0" smtClean="0">
+                <a:solidFill>
+                  <a:srgbClr val="141717"/>
+                </a:solidFill>
+              </a:rPr>
               <a:t>Create a new provider</a:t>
             </a:r>
           </a:p>
           <a:p>
             <a:pPr lvl="1"/>
             <a:r>
-              <a:rPr lang="en-US" dirty="0" smtClean="0"/>
+              <a:rPr lang="en-US" dirty="0" smtClean="0">
+                <a:solidFill>
+                  <a:srgbClr val="141717"/>
+                </a:solidFill>
+              </a:rPr>
               <a:t>Add your data to existing provider</a:t>
             </a:r>
           </a:p>
@@ -5810,6 +6183,9 @@
           <a:p>
             <a:r>
               <a:rPr lang="en-US" dirty="0" smtClean="0">
+                <a:solidFill>
+                  <a:srgbClr val="141717"/>
+                </a:solidFill>
                 <a:latin typeface="Franklin Gothic Medium"/>
                 <a:cs typeface="Franklin Gothic Medium"/>
               </a:rPr>
@@ -5834,27 +6210,47 @@
           <a:lstStyle/>
           <a:p>
             <a:r>
-              <a:rPr lang="en-US" dirty="0" smtClean="0"/>
+              <a:rPr lang="en-US" dirty="0" smtClean="0">
+                <a:solidFill>
+                  <a:srgbClr val="141717"/>
+                </a:solidFill>
+              </a:rPr>
               <a:t>Eventing mechanism</a:t>
             </a:r>
           </a:p>
           <a:p>
             <a:r>
-              <a:rPr lang="en-US" dirty="0" smtClean="0"/>
+              <a:rPr lang="en-US" dirty="0" smtClean="0">
+                <a:solidFill>
+                  <a:srgbClr val="141717"/>
+                </a:solidFill>
+              </a:rPr>
               <a:t>Intent objects are passive data that is of interest to the component that is receiving the intent</a:t>
             </a:r>
           </a:p>
           <a:p>
             <a:r>
-              <a:rPr lang="en-US" dirty="0" smtClean="0"/>
+              <a:rPr lang="en-US" dirty="0" smtClean="0">
+                <a:solidFill>
+                  <a:srgbClr val="141717"/>
+                </a:solidFill>
+              </a:rPr>
               <a:t>Filterable</a:t>
             </a:r>
           </a:p>
           <a:p>
-            <a:endParaRPr lang="en-US" dirty="0" smtClean="0"/>
-          </a:p>
-          <a:p>
-            <a:endParaRPr lang="en-US" dirty="0" smtClean="0"/>
+            <a:endParaRPr lang="en-US" dirty="0" smtClean="0">
+              <a:solidFill>
+                <a:srgbClr val="141717"/>
+              </a:solidFill>
+            </a:endParaRPr>
+          </a:p>
+          <a:p>
+            <a:endParaRPr lang="en-US" dirty="0" smtClean="0">
+              <a:solidFill>
+                <a:srgbClr val="141717"/>
+              </a:solidFill>
+            </a:endParaRPr>
           </a:p>
         </p:txBody>
       </p:sp>
@@ -5902,6 +6298,9 @@
           <a:p>
             <a:r>
               <a:rPr lang="en-US" dirty="0" smtClean="0">
+                <a:solidFill>
+                  <a:srgbClr val="141717"/>
+                </a:solidFill>
                 <a:latin typeface="Franklin Gothic Medium"/>
                 <a:cs typeface="Franklin Gothic Medium"/>
               </a:rPr>
@@ -5933,7 +6332,11 @@
               </a:lnSpc>
             </a:pPr>
             <a:r>
-              <a:rPr lang="en-US" dirty="0" smtClean="0"/>
+              <a:rPr lang="en-US" dirty="0" smtClean="0">
+                <a:solidFill>
+                  <a:srgbClr val="141717"/>
+                </a:solidFill>
+              </a:rPr>
               <a:t>Images, layout descriptions, binary blobs and string dictionaries</a:t>
             </a:r>
           </a:p>
@@ -5944,7 +6347,11 @@
               </a:lnSpc>
             </a:pPr>
             <a:r>
-              <a:rPr lang="en-US" dirty="0" smtClean="0"/>
+              <a:rPr lang="en-US" dirty="0" smtClean="0">
+                <a:solidFill>
+                  <a:srgbClr val="141717"/>
+                </a:solidFill>
+              </a:rPr>
               <a:t>Abstraction layer which helps decouples code</a:t>
             </a:r>
           </a:p>
@@ -5955,7 +6362,11 @@
               </a:lnSpc>
             </a:pPr>
             <a:r>
-              <a:rPr lang="en-US" dirty="0" smtClean="0"/>
+              <a:rPr lang="en-US" dirty="0" smtClean="0">
+                <a:solidFill>
+                  <a:srgbClr val="141717"/>
+                </a:solidFill>
+              </a:rPr>
               <a:t>Makes managing assets easier</a:t>
             </a:r>
           </a:p>
@@ -5966,7 +6377,11 @@
               </a:lnSpc>
             </a:pPr>
             <a:r>
-              <a:rPr lang="en-US" dirty="0" smtClean="0"/>
+              <a:rPr lang="en-US" dirty="0" smtClean="0">
+                <a:solidFill>
+                  <a:srgbClr val="141717"/>
+                </a:solidFill>
+              </a:rPr>
               <a:t>Localization</a:t>
             </a:r>
           </a:p>
@@ -5977,7 +6392,11 @@
               </a:lnSpc>
             </a:pPr>
             <a:r>
-              <a:rPr lang="en-US" dirty="0" smtClean="0"/>
+              <a:rPr lang="en-US" dirty="0" smtClean="0">
+                <a:solidFill>
+                  <a:srgbClr val="141717"/>
+                </a:solidFill>
+              </a:rPr>
               <a:t>Multiple displays</a:t>
             </a:r>
           </a:p>
@@ -5988,7 +6407,11 @@
               </a:lnSpc>
             </a:pPr>
             <a:r>
-              <a:rPr lang="en-US" dirty="0" smtClean="0"/>
+              <a:rPr lang="en-US" dirty="0" smtClean="0">
+                <a:solidFill>
+                  <a:srgbClr val="141717"/>
+                </a:solidFill>
+              </a:rPr>
               <a:t>Different hardware configurations</a:t>
             </a:r>
           </a:p>
@@ -6038,6 +6461,9 @@
           <a:p>
             <a:r>
               <a:rPr lang="en-US" dirty="0" smtClean="0">
+                <a:solidFill>
+                  <a:srgbClr val="141717"/>
+                </a:solidFill>
                 <a:latin typeface="Franklin Gothic Medium"/>
                 <a:cs typeface="Franklin Gothic Medium"/>
               </a:rPr>
@@ -6133,12 +6559,18 @@
           <a:p>
             <a:r>
               <a:rPr lang="en-US" dirty="0" smtClean="0">
+                <a:solidFill>
+                  <a:srgbClr val="141717"/>
+                </a:solidFill>
                 <a:latin typeface="Franklin Gothic Medium"/>
                 <a:cs typeface="Franklin Gothic Medium"/>
               </a:rPr>
               <a:t>MonoDroid Resources</a:t>
             </a:r>
             <a:endParaRPr lang="en-US" dirty="0">
+              <a:solidFill>
+                <a:srgbClr val="141717"/>
+              </a:solidFill>
               <a:latin typeface="Franklin Gothic Medium"/>
               <a:cs typeface="Franklin Gothic Medium"/>
             </a:endParaRPr>
@@ -6166,13 +6598,20 @@
               <a:buNone/>
             </a:pPr>
             <a:r>
-              <a:rPr lang="en-US" dirty="0" smtClean="0"/>
+              <a:rPr lang="en-US" dirty="0" smtClean="0">
+                <a:solidFill>
+                  <a:srgbClr val="141717"/>
+                </a:solidFill>
+              </a:rPr>
               <a:t>Download the Preview!</a:t>
             </a:r>
           </a:p>
           <a:p>
             <a:r>
               <a:rPr lang="en-US" dirty="0" smtClean="0">
+                <a:solidFill>
+                  <a:srgbClr val="141717"/>
+                </a:solidFill>
                 <a:latin typeface="Lucida Console"/>
                 <a:cs typeface="Lucida Console"/>
                 <a:hlinkClick r:id="rId2"/>
@@ -6180,6 +6619,9 @@
               <a:t>http://monodroid.net/Welcome</a:t>
             </a:r>
             <a:endParaRPr lang="en-US" dirty="0" smtClean="0">
+              <a:solidFill>
+                <a:srgbClr val="141717"/>
+              </a:solidFill>
               <a:latin typeface="Lucida Console"/>
               <a:cs typeface="Lucida Console"/>
             </a:endParaRPr>
@@ -6188,20 +6630,31 @@
             <a:pPr>
               <a:buNone/>
             </a:pPr>
-            <a:endParaRPr lang="en-US" dirty="0" smtClean="0"/>
+            <a:endParaRPr lang="en-US" dirty="0" smtClean="0">
+              <a:solidFill>
+                <a:srgbClr val="141717"/>
+              </a:solidFill>
+            </a:endParaRPr>
           </a:p>
           <a:p>
             <a:pPr>
               <a:buNone/>
             </a:pPr>
             <a:r>
-              <a:rPr lang="en-US" dirty="0" smtClean="0"/>
+              <a:rPr lang="en-US" dirty="0" smtClean="0">
+                <a:solidFill>
+                  <a:srgbClr val="141717"/>
+                </a:solidFill>
+              </a:rPr>
               <a:t>Links</a:t>
             </a:r>
           </a:p>
           <a:p>
             <a:r>
               <a:rPr lang="en-US" sz="2571" dirty="0" smtClean="0">
+                <a:solidFill>
+                  <a:srgbClr val="141717"/>
+                </a:solidFill>
                 <a:latin typeface="Lucida Console"/>
                 <a:hlinkClick r:id="rId3"/>
               </a:rPr>
@@ -6211,30 +6664,47 @@
           <a:p>
             <a:r>
               <a:rPr lang="en-US" sz="2571" dirty="0" smtClean="0">
+                <a:solidFill>
+                  <a:srgbClr val="141717"/>
+                </a:solidFill>
                 <a:latin typeface="Lucida Console"/>
                 <a:hlinkClick r:id="rId4"/>
               </a:rPr>
               <a:t>http://developer.android.com/</a:t>
             </a:r>
             <a:endParaRPr lang="en-US" sz="2571" dirty="0" smtClean="0">
+              <a:solidFill>
+                <a:srgbClr val="141717"/>
+              </a:solidFill>
               <a:latin typeface="Lucida Console"/>
             </a:endParaRPr>
           </a:p>
           <a:p>
-            <a:endParaRPr lang="en-US" dirty="0" smtClean="0"/>
+            <a:endParaRPr lang="en-US" dirty="0" smtClean="0">
+              <a:solidFill>
+                <a:srgbClr val="141717"/>
+              </a:solidFill>
+            </a:endParaRPr>
           </a:p>
           <a:p>
             <a:pPr>
               <a:buNone/>
             </a:pPr>
             <a:r>
-              <a:rPr lang="en-US" dirty="0" smtClean="0"/>
+              <a:rPr lang="en-US" dirty="0" smtClean="0">
+                <a:solidFill>
+                  <a:srgbClr val="141717"/>
+                </a:solidFill>
+              </a:rPr>
               <a:t>IRC Support / Discussion</a:t>
             </a:r>
           </a:p>
           <a:p>
             <a:r>
               <a:rPr lang="en-US" sz="2581" dirty="0" smtClean="0">
+                <a:solidFill>
+                  <a:srgbClr val="141717"/>
+                </a:solidFill>
                 <a:latin typeface="Lucida Console"/>
                 <a:cs typeface="Lucida Console"/>
               </a:rPr>
@@ -6242,6 +6712,9 @@
             </a:r>
             <a:r>
               <a:rPr lang="en-US" sz="2581" dirty="0" err="1" smtClean="0">
+                <a:solidFill>
+                  <a:srgbClr val="141717"/>
+                </a:solidFill>
                 <a:latin typeface="Lucida Console"/>
                 <a:cs typeface="Lucida Console"/>
               </a:rPr>
@@ -6249,6 +6722,9 @@
             </a:r>
             <a:r>
               <a:rPr lang="en-US" sz="2581" dirty="0" smtClean="0">
+                <a:solidFill>
+                  <a:srgbClr val="141717"/>
+                </a:solidFill>
                 <a:latin typeface="Lucida Console"/>
                 <a:cs typeface="Lucida Console"/>
               </a:rPr>
@@ -6256,31 +6732,48 @@
             </a:r>
             <a:r>
               <a:rPr lang="en-US" sz="2581" dirty="0" err="1" smtClean="0">
+                <a:solidFill>
+                  <a:srgbClr val="141717"/>
+                </a:solidFill>
                 <a:latin typeface="Lucida Console"/>
                 <a:cs typeface="Lucida Console"/>
               </a:rPr>
               <a:t>irc.gnome.org</a:t>
             </a:r>
             <a:endParaRPr lang="en-US" sz="2581" dirty="0" smtClean="0">
+              <a:solidFill>
+                <a:srgbClr val="141717"/>
+              </a:solidFill>
               <a:latin typeface="Lucida Console"/>
               <a:cs typeface="Lucida Console"/>
             </a:endParaRPr>
           </a:p>
           <a:p>
-            <a:endParaRPr lang="en-US" dirty="0" smtClean="0"/>
+            <a:endParaRPr lang="en-US" dirty="0" smtClean="0">
+              <a:solidFill>
+                <a:srgbClr val="141717"/>
+              </a:solidFill>
+            </a:endParaRPr>
           </a:p>
           <a:p>
             <a:pPr>
               <a:buNone/>
             </a:pPr>
             <a:r>
-              <a:rPr lang="en-US" dirty="0" smtClean="0"/>
+              <a:rPr lang="en-US" dirty="0" smtClean="0">
+                <a:solidFill>
+                  <a:srgbClr val="141717"/>
+                </a:solidFill>
+              </a:rPr>
               <a:t>Code</a:t>
             </a:r>
           </a:p>
           <a:p>
             <a:r>
               <a:rPr lang="en-US" sz="2571" dirty="0" smtClean="0">
+                <a:solidFill>
+                  <a:srgbClr val="141717"/>
+                </a:solidFill>
                 <a:latin typeface="Lucida Console"/>
                 <a:cs typeface="Lucida Console"/>
                 <a:hlinkClick r:id="rId5"/>
@@ -6288,6 +6781,9 @@
               <a:t>https://github.com/mono/monodroid-samples</a:t>
             </a:r>
             <a:endParaRPr lang="en-US" sz="2571" dirty="0" smtClean="0">
+              <a:solidFill>
+                <a:srgbClr val="141717"/>
+              </a:solidFill>
               <a:latin typeface="Lucida Console"/>
               <a:cs typeface="Lucida Console"/>
             </a:endParaRPr>
@@ -6295,13 +6791,20 @@
           <a:p>
             <a:r>
               <a:rPr lang="en-US" sz="2571" dirty="0" smtClean="0">
+                <a:solidFill>
+                  <a:srgbClr val="141717"/>
+                </a:solidFill>
                 <a:latin typeface="Lucida Console"/>
                 <a:cs typeface="Lucida Console"/>
                 <a:hlinkClick r:id="rId6"/>
               </a:rPr>
               <a:t>https://github.com/kevinmcmahon/MonoDroid101</a:t>
             </a:r>
-            <a:endParaRPr lang="en-US" sz="2400" dirty="0" smtClean="0"/>
+            <a:endParaRPr lang="en-US" sz="2400" dirty="0" smtClean="0">
+              <a:solidFill>
+                <a:srgbClr val="141717"/>
+              </a:solidFill>
+            </a:endParaRPr>
           </a:p>
         </p:txBody>
       </p:sp>
@@ -6347,21 +6850,34 @@
           <a:p>
             <a:r>
               <a:rPr lang="en-US" dirty="0" smtClean="0">
+                <a:solidFill>
+                  <a:srgbClr val="141717"/>
+                </a:solidFill>
                 <a:latin typeface="Franklin Gothic Medium"/>
               </a:rPr>
               <a:t>What</a:t>
             </a:r>
             <a:r>
-              <a:rPr lang="en-US" dirty="0" smtClean="0"/>
+              <a:rPr lang="en-US" dirty="0" smtClean="0">
+                <a:solidFill>
+                  <a:srgbClr val="141717"/>
+                </a:solidFill>
+              </a:rPr>
               <a:t> </a:t>
             </a:r>
             <a:r>
               <a:rPr lang="en-US" dirty="0" smtClean="0">
+                <a:solidFill>
+                  <a:srgbClr val="141717"/>
+                </a:solidFill>
                 <a:latin typeface="Franklin Gothic Medium"/>
               </a:rPr>
               <a:t>is Android?</a:t>
             </a:r>
             <a:endParaRPr lang="en-US" dirty="0">
+              <a:solidFill>
+                <a:srgbClr val="141717"/>
+              </a:solidFill>
               <a:latin typeface="Franklin Gothic Medium"/>
             </a:endParaRPr>
           </a:p>
@@ -6390,8 +6906,16 @@
               </a:lnSpc>
             </a:pPr>
             <a:r>
+              <a:rPr lang="en-US" dirty="0" smtClean="0">
+                <a:solidFill>
+                  <a:srgbClr val="141717"/>
+                </a:solidFill>
+              </a:rPr>
+              <a:t>Application</a:t>
+            </a:r>
+            <a:r>
               <a:rPr lang="en-US" dirty="0" smtClean="0"/>
-              <a:t>Application Framework</a:t>
+              <a:t> Framework</a:t>
             </a:r>
           </a:p>
           <a:p>
@@ -6490,16 +7014,26 @@
           <a:p>
             <a:r>
               <a:rPr lang="en-US" dirty="0" smtClean="0">
+                <a:solidFill>
+                  <a:srgbClr val="141717"/>
+                </a:solidFill>
                 <a:latin typeface="Franklin Gothic Medium" pitchFamily="34" charset="0"/>
               </a:rPr>
               <a:t>Android</a:t>
             </a:r>
             <a:r>
-              <a:rPr lang="en-US" dirty="0" smtClean="0"/>
+              <a:rPr lang="en-US" dirty="0" smtClean="0">
+                <a:solidFill>
+                  <a:srgbClr val="141717"/>
+                </a:solidFill>
+              </a:rPr>
               <a:t> </a:t>
             </a:r>
             <a:r>
               <a:rPr lang="en-US" dirty="0" smtClean="0">
+                <a:solidFill>
+                  <a:srgbClr val="141717"/>
+                </a:solidFill>
                 <a:latin typeface="Franklin Gothic Medium" pitchFamily="34" charset="0"/>
               </a:rPr>
               <a:t>Stack</a:t>
@@ -6521,7 +7055,7 @@
           <a:blip r:embed="rId2" cstate="print">
             <a:extLst>
               <a:ext uri="{28A0092B-C50C-407E-A947-70E740481C1C}">
-                <a14:useLocalDpi xmlns:a14="http://schemas.microsoft.com/office/drawing/2010/main" xmlns="" val="0"/>
+                <a14:useLocalDpi xmlns="" xmlns:a14="http://schemas.microsoft.com/office/drawing/2010/main" val="0"/>
               </a:ext>
             </a:extLst>
           </a:blip>
@@ -6531,8 +7065,8 @@
         </p:blipFill>
         <p:spPr>
           <a:xfrm>
-            <a:off x="1175864" y="1447119"/>
-            <a:ext cx="6792273" cy="4877481"/>
+            <a:off x="1420621" y="1600200"/>
+            <a:ext cx="6302757" cy="4525963"/>
           </a:xfrm>
           <a:prstGeom prst="rect">
             <a:avLst/>
@@ -6617,7 +7151,7 @@
           <a:blip r:embed="rId3" cstate="print">
             <a:extLst>
               <a:ext uri="{28A0092B-C50C-407E-A947-70E740481C1C}">
-                <a14:useLocalDpi xmlns:a14="http://schemas.microsoft.com/office/drawing/2010/main" xmlns="" val="0"/>
+                <a14:useLocalDpi xmlns="" xmlns:a14="http://schemas.microsoft.com/office/drawing/2010/main" val="0"/>
               </a:ext>
             </a:extLst>
           </a:blip>
@@ -6684,16 +7218,26 @@
           <a:p>
             <a:r>
               <a:rPr lang="en-US" dirty="0" smtClean="0">
+                <a:solidFill>
+                  <a:srgbClr val="141717"/>
+                </a:solidFill>
                 <a:latin typeface="Franklin Gothic Medium" pitchFamily="34" charset="0"/>
               </a:rPr>
               <a:t>Android</a:t>
             </a:r>
             <a:r>
-              <a:rPr lang="en-US" dirty="0" smtClean="0"/>
+              <a:rPr lang="en-US" dirty="0" smtClean="0">
+                <a:solidFill>
+                  <a:srgbClr val="141717"/>
+                </a:solidFill>
+              </a:rPr>
               <a:t> </a:t>
             </a:r>
             <a:r>
               <a:rPr lang="en-US" dirty="0" smtClean="0">
+                <a:solidFill>
+                  <a:srgbClr val="141717"/>
+                </a:solidFill>
                 <a:latin typeface="Franklin Gothic Medium" pitchFamily="34" charset="0"/>
               </a:rPr>
               <a:t>Stack</a:t>
@@ -6713,7 +7257,7 @@
           <a:blip r:embed="rId2" cstate="print">
             <a:extLst>
               <a:ext uri="{28A0092B-C50C-407E-A947-70E740481C1C}">
-                <a14:useLocalDpi xmlns:a14="http://schemas.microsoft.com/office/drawing/2010/main" xmlns="" val="0"/>
+                <a14:useLocalDpi xmlns="" xmlns:a14="http://schemas.microsoft.com/office/drawing/2010/main" val="0"/>
               </a:ext>
             </a:extLst>
           </a:blip>
@@ -6811,7 +7355,7 @@
           <a:blip r:embed="rId3" cstate="print">
             <a:extLst>
               <a:ext uri="{28A0092B-C50C-407E-A947-70E740481C1C}">
-                <a14:useLocalDpi xmlns:a14="http://schemas.microsoft.com/office/drawing/2010/main" xmlns="" val="0"/>
+                <a14:useLocalDpi xmlns="" xmlns:a14="http://schemas.microsoft.com/office/drawing/2010/main" val="0"/>
               </a:ext>
             </a:extLst>
           </a:blip>
@@ -6821,8 +7365,8 @@
         </p:blipFill>
         <p:spPr>
           <a:xfrm>
-            <a:off x="1175864" y="1447119"/>
-            <a:ext cx="6792273" cy="4877481"/>
+            <a:off x="1420621" y="1600200"/>
+            <a:ext cx="6302757" cy="4525963"/>
           </a:xfrm>
           <a:prstGeom prst="rect">
             <a:avLst/>
@@ -6878,16 +7422,26 @@
           <a:p>
             <a:r>
               <a:rPr lang="en-US" dirty="0" smtClean="0">
+                <a:solidFill>
+                  <a:srgbClr val="141717"/>
+                </a:solidFill>
                 <a:latin typeface="Franklin Gothic Medium" pitchFamily="34" charset="0"/>
               </a:rPr>
               <a:t>Android</a:t>
             </a:r>
             <a:r>
-              <a:rPr lang="en-US" dirty="0" smtClean="0"/>
+              <a:rPr lang="en-US" dirty="0" smtClean="0">
+                <a:solidFill>
+                  <a:srgbClr val="141717"/>
+                </a:solidFill>
+              </a:rPr>
               <a:t> </a:t>
             </a:r>
             <a:r>
               <a:rPr lang="en-US" dirty="0" smtClean="0">
+                <a:solidFill>
+                  <a:srgbClr val="141717"/>
+                </a:solidFill>
                 <a:latin typeface="Franklin Gothic Medium" pitchFamily="34" charset="0"/>
               </a:rPr>
               <a:t>Stack</a:t>
@@ -6909,7 +7463,7 @@
           <a:blip r:embed="rId2" cstate="print">
             <a:extLst>
               <a:ext uri="{28A0092B-C50C-407E-A947-70E740481C1C}">
-                <a14:useLocalDpi xmlns:a14="http://schemas.microsoft.com/office/drawing/2010/main" xmlns="" val="0"/>
+                <a14:useLocalDpi xmlns="" xmlns:a14="http://schemas.microsoft.com/office/drawing/2010/main" val="0"/>
               </a:ext>
             </a:extLst>
           </a:blip>
@@ -6919,8 +7473,8 @@
         </p:blipFill>
         <p:spPr>
           <a:xfrm>
-            <a:off x="1175864" y="1447119"/>
-            <a:ext cx="6792273" cy="4877481"/>
+            <a:off x="1420621" y="1600200"/>
+            <a:ext cx="6302757" cy="4525963"/>
           </a:xfrm>
           <a:prstGeom prst="rect">
             <a:avLst/>
@@ -6978,11 +7532,17 @@
           <a:p>
             <a:r>
               <a:rPr lang="en-US" dirty="0" smtClean="0">
+                <a:solidFill>
+                  <a:srgbClr val="141717"/>
+                </a:solidFill>
                 <a:latin typeface="Franklin Gothic Medium" pitchFamily="34" charset="0"/>
               </a:rPr>
               <a:t>Dalvik Virtual Machine</a:t>
             </a:r>
             <a:endParaRPr lang="en-US" dirty="0">
+              <a:solidFill>
+                <a:srgbClr val="141717"/>
+              </a:solidFill>
               <a:latin typeface="Franklin Gothic Medium" pitchFamily="34" charset="0"/>
             </a:endParaRPr>
           </a:p>
@@ -7006,71 +7566,119 @@
           <a:lstStyle/>
           <a:p>
             <a:r>
-              <a:rPr lang="en-US" dirty="0" smtClean="0"/>
+              <a:rPr lang="en-US" dirty="0" smtClean="0">
+                <a:solidFill>
+                  <a:srgbClr val="141717"/>
+                </a:solidFill>
+              </a:rPr>
               <a:t>Dalvik Virtual Machine</a:t>
             </a:r>
           </a:p>
           <a:p>
             <a:pPr lvl="1"/>
             <a:r>
-              <a:rPr lang="en-US" dirty="0" smtClean="0"/>
+              <a:rPr lang="en-US" dirty="0" smtClean="0">
+                <a:solidFill>
+                  <a:srgbClr val="141717"/>
+                </a:solidFill>
+              </a:rPr>
               <a:t>Register-based</a:t>
             </a:r>
           </a:p>
           <a:p>
             <a:pPr lvl="1"/>
             <a:r>
-              <a:rPr lang="en-US" dirty="0" smtClean="0"/>
+              <a:rPr lang="en-US" dirty="0" smtClean="0">
+                <a:solidFill>
+                  <a:srgbClr val="141717"/>
+                </a:solidFill>
+              </a:rPr>
               <a:t>Runs multiple </a:t>
             </a:r>
             <a:r>
-              <a:rPr lang="en-US" dirty="0" err="1" smtClean="0"/>
+              <a:rPr lang="en-US" dirty="0" err="1" smtClean="0">
+                <a:solidFill>
+                  <a:srgbClr val="141717"/>
+                </a:solidFill>
+              </a:rPr>
               <a:t>VMs</a:t>
             </a:r>
             <a:r>
-              <a:rPr lang="en-US" dirty="0" smtClean="0"/>
+              <a:rPr lang="en-US" dirty="0" smtClean="0">
+                <a:solidFill>
+                  <a:srgbClr val="141717"/>
+                </a:solidFill>
+              </a:rPr>
               <a:t> efficiently</a:t>
             </a:r>
           </a:p>
           <a:p>
             <a:pPr lvl="1"/>
             <a:r>
-              <a:rPr lang="en-US" dirty="0" smtClean="0"/>
+              <a:rPr lang="en-US" dirty="0" smtClean="0">
+                <a:solidFill>
+                  <a:srgbClr val="141717"/>
+                </a:solidFill>
+              </a:rPr>
               <a:t>Requires a .class to .</a:t>
             </a:r>
             <a:r>
-              <a:rPr lang="en-US" dirty="0" err="1" smtClean="0"/>
+              <a:rPr lang="en-US" dirty="0" err="1" smtClean="0">
+                <a:solidFill>
+                  <a:srgbClr val="141717"/>
+                </a:solidFill>
+              </a:rPr>
               <a:t>dex</a:t>
             </a:r>
             <a:r>
-              <a:rPr lang="en-US" dirty="0" smtClean="0"/>
+              <a:rPr lang="en-US" dirty="0" smtClean="0">
+                <a:solidFill>
+                  <a:srgbClr val="141717"/>
+                </a:solidFill>
+              </a:rPr>
               <a:t> transformation</a:t>
             </a:r>
           </a:p>
           <a:p>
             <a:pPr lvl="1"/>
             <a:r>
-              <a:rPr lang="en-US" dirty="0" smtClean="0"/>
+              <a:rPr lang="en-US" dirty="0" smtClean="0">
+                <a:solidFill>
+                  <a:srgbClr val="141717"/>
+                </a:solidFill>
+              </a:rPr>
               <a:t>JIT (as of Android 2.2)</a:t>
             </a:r>
           </a:p>
           <a:p>
             <a:r>
-              <a:rPr lang="en-US" dirty="0" smtClean="0"/>
+              <a:rPr lang="en-US" dirty="0" smtClean="0">
+                <a:solidFill>
+                  <a:srgbClr val="141717"/>
+                </a:solidFill>
+              </a:rPr>
               <a:t>Each Android Application:</a:t>
             </a:r>
           </a:p>
           <a:p>
             <a:pPr lvl="1"/>
             <a:r>
-              <a:rPr lang="en-US" dirty="0" smtClean="0"/>
+              <a:rPr lang="en-US" dirty="0" smtClean="0">
+                <a:solidFill>
+                  <a:srgbClr val="141717"/>
+                </a:solidFill>
+              </a:rPr>
               <a:t>Runs in their own process </a:t>
             </a:r>
           </a:p>
           <a:p>
             <a:pPr lvl="1"/>
             <a:r>
-              <a:rPr lang="en-US" dirty="0" smtClean="0"/>
+              <a:rPr lang="en-US" dirty="0" smtClean="0">
+                <a:solidFill>
+                  <a:srgbClr val="141717"/>
+                </a:solidFill>
+              </a:rPr>
               <a:t>Runs on their own VM</a:t>
             </a:r>
           </a:p>
@@ -7092,7 +7700,7 @@
 </file>
 
 <file path=ppt/theme/theme1.xml><?xml version="1.0" encoding="utf-8"?>
-<a:theme xmlns:a="http://schemas.openxmlformats.org/drawingml/2006/main" name="Office Theme">
+<a:theme xmlns:a="http://schemas.openxmlformats.org/drawingml/2006/main" name="MonoDroid101">
   <a:themeElements>
     <a:clrScheme name="Office">
       <a:dk1>

</xml_diff>

<commit_message>
updates for lcnug with pics
</commit_message>
<xml_diff>
--- a/slides/Monodroid101.pptx
+++ b/slides/Monodroid101.pptx
@@ -5,7 +5,7 @@
     <p:sldMasterId id="2147483696" r:id="rId1"/>
   </p:sldMasterIdLst>
   <p:notesMasterIdLst>
-    <p:notesMasterId r:id="rId30"/>
+    <p:notesMasterId r:id="rId37"/>
   </p:notesMasterIdLst>
   <p:sldIdLst>
     <p:sldId id="256" r:id="rId2"/>
@@ -20,22 +20,29 @@
     <p:sldId id="277" r:id="rId11"/>
     <p:sldId id="267" r:id="rId12"/>
     <p:sldId id="268" r:id="rId13"/>
-    <p:sldId id="266" r:id="rId14"/>
-    <p:sldId id="271" r:id="rId15"/>
-    <p:sldId id="262" r:id="rId16"/>
-    <p:sldId id="272" r:id="rId17"/>
-    <p:sldId id="260" r:id="rId18"/>
-    <p:sldId id="263" r:id="rId19"/>
-    <p:sldId id="269" r:id="rId20"/>
-    <p:sldId id="270" r:id="rId21"/>
-    <p:sldId id="273" r:id="rId22"/>
-    <p:sldId id="278" r:id="rId23"/>
-    <p:sldId id="286" r:id="rId24"/>
-    <p:sldId id="274" r:id="rId25"/>
-    <p:sldId id="287" r:id="rId26"/>
-    <p:sldId id="279" r:id="rId27"/>
-    <p:sldId id="280" r:id="rId28"/>
-    <p:sldId id="259" r:id="rId29"/>
+    <p:sldId id="289" r:id="rId14"/>
+    <p:sldId id="290" r:id="rId15"/>
+    <p:sldId id="291" r:id="rId16"/>
+    <p:sldId id="266" r:id="rId17"/>
+    <p:sldId id="271" r:id="rId18"/>
+    <p:sldId id="262" r:id="rId19"/>
+    <p:sldId id="292" r:id="rId20"/>
+    <p:sldId id="293" r:id="rId21"/>
+    <p:sldId id="294" r:id="rId22"/>
+    <p:sldId id="295" r:id="rId23"/>
+    <p:sldId id="272" r:id="rId24"/>
+    <p:sldId id="260" r:id="rId25"/>
+    <p:sldId id="263" r:id="rId26"/>
+    <p:sldId id="269" r:id="rId27"/>
+    <p:sldId id="270" r:id="rId28"/>
+    <p:sldId id="273" r:id="rId29"/>
+    <p:sldId id="278" r:id="rId30"/>
+    <p:sldId id="286" r:id="rId31"/>
+    <p:sldId id="274" r:id="rId32"/>
+    <p:sldId id="287" r:id="rId33"/>
+    <p:sldId id="279" r:id="rId34"/>
+    <p:sldId id="280" r:id="rId35"/>
+    <p:sldId id="259" r:id="rId36"/>
   </p:sldIdLst>
   <p:sldSz cx="9144000" cy="6858000" type="screen4x3"/>
   <p:notesSz cx="6858000" cy="9144000"/>
@@ -4502,7 +4509,7 @@
             <a:fld id="{DA2E8BC1-B6F3-3D4E-8CDE-8AF731476279}" type="slidenum">
               <a:rPr lang="en-US" smtClean="0"/>
               <a:pPr/>
-              <a:t>13</a:t>
+              <a:t>16</a:t>
             </a:fld>
             <a:endParaRPr lang="en-US"/>
           </a:p>
@@ -4600,7 +4607,7 @@
             <a:fld id="{DA2E8BC1-B6F3-3D4E-8CDE-8AF731476279}" type="slidenum">
               <a:rPr lang="en-US" smtClean="0"/>
               <a:pPr/>
-              <a:t>26</a:t>
+              <a:t>33</a:t>
             </a:fld>
             <a:endParaRPr lang="en-US" dirty="0"/>
           </a:p>
@@ -4779,7 +4786,7 @@
             <a:fld id="{DA2E8BC1-B6F3-3D4E-8CDE-8AF731476279}" type="slidenum">
               <a:rPr lang="en-US" smtClean="0"/>
               <a:pPr/>
-              <a:t>27</a:t>
+              <a:t>34</a:t>
             </a:fld>
             <a:endParaRPr lang="en-US" dirty="0"/>
           </a:p>
@@ -8420,6 +8427,186 @@
           <a:chExt cx="0" cy="0"/>
         </a:xfrm>
       </p:grpSpPr>
+      <p:pic>
+        <p:nvPicPr>
+          <p:cNvPr id="2" name="Picture 1" descr="android-dalvik-mono-1.png"/>
+          <p:cNvPicPr>
+            <a:picLocks noChangeAspect="1"/>
+          </p:cNvPicPr>
+          <p:nvPr/>
+        </p:nvPicPr>
+        <p:blipFill>
+          <a:blip r:embed="rId2">
+            <a:extLst>
+              <a:ext uri="{28A0092B-C50C-407E-A947-70E740481C1C}">
+                <a14:useLocalDpi xmlns:a14="http://schemas.microsoft.com/office/drawing/2010/main" val="0"/>
+              </a:ext>
+            </a:extLst>
+          </a:blip>
+          <a:stretch>
+            <a:fillRect/>
+          </a:stretch>
+        </p:blipFill>
+        <p:spPr>
+          <a:xfrm>
+            <a:off x="825500" y="254000"/>
+            <a:ext cx="7480300" cy="6337300"/>
+          </a:xfrm>
+          <a:prstGeom prst="rect">
+            <a:avLst/>
+          </a:prstGeom>
+        </p:spPr>
+      </p:pic>
+    </p:spTree>
+    <p:extLst>
+      <p:ext uri="{BB962C8B-B14F-4D97-AF65-F5344CB8AC3E}">
+        <p14:creationId xmlns:p14="http://schemas.microsoft.com/office/powerpoint/2010/main" val="1137735060"/>
+      </p:ext>
+    </p:extLst>
+  </p:cSld>
+  <p:clrMapOvr>
+    <a:masterClrMapping/>
+  </p:clrMapOvr>
+</p:sld>
+</file>
+
+<file path=ppt/slides/slide14.xml><?xml version="1.0" encoding="utf-8"?>
+<p:sld xmlns:a="http://schemas.openxmlformats.org/drawingml/2006/main" xmlns:r="http://schemas.openxmlformats.org/officeDocument/2006/relationships" xmlns:p="http://schemas.openxmlformats.org/presentationml/2006/main">
+  <p:cSld>
+    <p:spTree>
+      <p:nvGrpSpPr>
+        <p:cNvPr id="1" name=""/>
+        <p:cNvGrpSpPr/>
+        <p:nvPr/>
+      </p:nvGrpSpPr>
+      <p:grpSpPr>
+        <a:xfrm>
+          <a:off x="0" y="0"/>
+          <a:ext cx="0" cy="0"/>
+          <a:chOff x="0" y="0"/>
+          <a:chExt cx="0" cy="0"/>
+        </a:xfrm>
+      </p:grpSpPr>
+      <p:pic>
+        <p:nvPicPr>
+          <p:cNvPr id="2" name="Picture 1" descr="android-dalvik-mono-2.png"/>
+          <p:cNvPicPr>
+            <a:picLocks noChangeAspect="1"/>
+          </p:cNvPicPr>
+          <p:nvPr/>
+        </p:nvPicPr>
+        <p:blipFill>
+          <a:blip r:embed="rId2">
+            <a:extLst>
+              <a:ext uri="{28A0092B-C50C-407E-A947-70E740481C1C}">
+                <a14:useLocalDpi xmlns:a14="http://schemas.microsoft.com/office/drawing/2010/main" val="0"/>
+              </a:ext>
+            </a:extLst>
+          </a:blip>
+          <a:stretch>
+            <a:fillRect/>
+          </a:stretch>
+        </p:blipFill>
+        <p:spPr>
+          <a:xfrm>
+            <a:off x="825500" y="254000"/>
+            <a:ext cx="7480300" cy="6337300"/>
+          </a:xfrm>
+          <a:prstGeom prst="rect">
+            <a:avLst/>
+          </a:prstGeom>
+        </p:spPr>
+      </p:pic>
+    </p:spTree>
+    <p:extLst>
+      <p:ext uri="{BB962C8B-B14F-4D97-AF65-F5344CB8AC3E}">
+        <p14:creationId xmlns:p14="http://schemas.microsoft.com/office/powerpoint/2010/main" val="2330110946"/>
+      </p:ext>
+    </p:extLst>
+  </p:cSld>
+  <p:clrMapOvr>
+    <a:masterClrMapping/>
+  </p:clrMapOvr>
+</p:sld>
+</file>
+
+<file path=ppt/slides/slide15.xml><?xml version="1.0" encoding="utf-8"?>
+<p:sld xmlns:a="http://schemas.openxmlformats.org/drawingml/2006/main" xmlns:r="http://schemas.openxmlformats.org/officeDocument/2006/relationships" xmlns:p="http://schemas.openxmlformats.org/presentationml/2006/main">
+  <p:cSld>
+    <p:spTree>
+      <p:nvGrpSpPr>
+        <p:cNvPr id="1" name=""/>
+        <p:cNvGrpSpPr/>
+        <p:nvPr/>
+      </p:nvGrpSpPr>
+      <p:grpSpPr>
+        <a:xfrm>
+          <a:off x="0" y="0"/>
+          <a:ext cx="0" cy="0"/>
+          <a:chOff x="0" y="0"/>
+          <a:chExt cx="0" cy="0"/>
+        </a:xfrm>
+      </p:grpSpPr>
+      <p:pic>
+        <p:nvPicPr>
+          <p:cNvPr id="2" name="Picture 1" descr="android-dalvik-mono-3.png"/>
+          <p:cNvPicPr>
+            <a:picLocks noChangeAspect="1"/>
+          </p:cNvPicPr>
+          <p:nvPr/>
+        </p:nvPicPr>
+        <p:blipFill>
+          <a:blip r:embed="rId2">
+            <a:extLst>
+              <a:ext uri="{28A0092B-C50C-407E-A947-70E740481C1C}">
+                <a14:useLocalDpi xmlns:a14="http://schemas.microsoft.com/office/drawing/2010/main" val="0"/>
+              </a:ext>
+            </a:extLst>
+          </a:blip>
+          <a:stretch>
+            <a:fillRect/>
+          </a:stretch>
+        </p:blipFill>
+        <p:spPr>
+          <a:xfrm>
+            <a:off x="825500" y="254000"/>
+            <a:ext cx="7480300" cy="6337300"/>
+          </a:xfrm>
+          <a:prstGeom prst="rect">
+            <a:avLst/>
+          </a:prstGeom>
+        </p:spPr>
+      </p:pic>
+    </p:spTree>
+    <p:extLst>
+      <p:ext uri="{BB962C8B-B14F-4D97-AF65-F5344CB8AC3E}">
+        <p14:creationId xmlns:p14="http://schemas.microsoft.com/office/powerpoint/2010/main" val="2155255300"/>
+      </p:ext>
+    </p:extLst>
+  </p:cSld>
+  <p:clrMapOvr>
+    <a:masterClrMapping/>
+  </p:clrMapOvr>
+</p:sld>
+</file>
+
+<file path=ppt/slides/slide16.xml><?xml version="1.0" encoding="utf-8"?>
+<p:sld xmlns:a="http://schemas.openxmlformats.org/drawingml/2006/main" xmlns:r="http://schemas.openxmlformats.org/officeDocument/2006/relationships" xmlns:p="http://schemas.openxmlformats.org/presentationml/2006/main">
+  <p:cSld>
+    <p:spTree>
+      <p:nvGrpSpPr>
+        <p:cNvPr id="1" name=""/>
+        <p:cNvGrpSpPr/>
+        <p:nvPr/>
+      </p:nvGrpSpPr>
+      <p:grpSpPr>
+        <a:xfrm>
+          <a:off x="0" y="0"/>
+          <a:ext cx="0" cy="0"/>
+          <a:chOff x="0" y="0"/>
+          <a:chExt cx="0" cy="0"/>
+        </a:xfrm>
+      </p:grpSpPr>
       <p:sp>
         <p:nvSpPr>
           <p:cNvPr id="2" name="Title 1"/>
@@ -8493,530 +8680,6 @@
 </p:sld>
 </file>
 
-<file path=ppt/slides/slide14.xml><?xml version="1.0" encoding="utf-8"?>
-<p:sld xmlns:a="http://schemas.openxmlformats.org/drawingml/2006/main" xmlns:r="http://schemas.openxmlformats.org/officeDocument/2006/relationships" xmlns:p="http://schemas.openxmlformats.org/presentationml/2006/main">
-  <p:cSld>
-    <p:spTree>
-      <p:nvGrpSpPr>
-        <p:cNvPr id="1" name=""/>
-        <p:cNvGrpSpPr/>
-        <p:nvPr/>
-      </p:nvGrpSpPr>
-      <p:grpSpPr>
-        <a:xfrm>
-          <a:off x="0" y="0"/>
-          <a:ext cx="0" cy="0"/>
-          <a:chOff x="0" y="0"/>
-          <a:chExt cx="0" cy="0"/>
-        </a:xfrm>
-      </p:grpSpPr>
-      <p:sp>
-        <p:nvSpPr>
-          <p:cNvPr id="2" name="Title 1"/>
-          <p:cNvSpPr>
-            <a:spLocks noGrp="1"/>
-          </p:cNvSpPr>
-          <p:nvPr>
-            <p:ph type="title"/>
-          </p:nvPr>
-        </p:nvSpPr>
-        <p:spPr/>
-        <p:txBody>
-          <a:bodyPr>
-            <a:normAutofit fontScale="90000"/>
-          </a:bodyPr>
-          <a:lstStyle/>
-          <a:p>
-            <a:r>
-              <a:rPr lang="en-US" dirty="0" smtClean="0">
-                <a:latin typeface="Franklin Gothic Medium"/>
-                <a:cs typeface="Franklin Gothic Medium"/>
-              </a:rPr>
-              <a:t>Mono for Android Design Principles</a:t>
-            </a:r>
-            <a:endParaRPr lang="en-US" dirty="0">
-              <a:latin typeface="Franklin Gothic Medium"/>
-              <a:cs typeface="Franklin Gothic Medium"/>
-            </a:endParaRPr>
-          </a:p>
-        </p:txBody>
-      </p:sp>
-      <p:sp>
-        <p:nvSpPr>
-          <p:cNvPr id="3" name="Content Placeholder 2"/>
-          <p:cNvSpPr>
-            <a:spLocks noGrp="1"/>
-          </p:cNvSpPr>
-          <p:nvPr>
-            <p:ph idx="1"/>
-          </p:nvPr>
-        </p:nvSpPr>
-        <p:spPr/>
-        <p:txBody>
-          <a:bodyPr>
-            <a:normAutofit/>
-          </a:bodyPr>
-          <a:lstStyle/>
-          <a:p>
-            <a:pPr>
-              <a:lnSpc>
-                <a:spcPct val="160000"/>
-              </a:lnSpc>
-            </a:pPr>
-            <a:r>
-              <a:rPr lang="en-US" dirty="0" smtClean="0"/>
-              <a:t>Follow the Framework Design Guidelines</a:t>
-            </a:r>
-          </a:p>
-          <a:p>
-            <a:pPr>
-              <a:lnSpc>
-                <a:spcPct val="160000"/>
-              </a:lnSpc>
-            </a:pPr>
-            <a:r>
-              <a:rPr lang="en-US" dirty="0" smtClean="0"/>
-              <a:t>Allow developers to subclass any Java class</a:t>
-            </a:r>
-          </a:p>
-          <a:p>
-            <a:pPr>
-              <a:lnSpc>
-                <a:spcPct val="160000"/>
-              </a:lnSpc>
-            </a:pPr>
-            <a:r>
-              <a:rPr lang="en-US" dirty="0" smtClean="0"/>
-              <a:t>C# delegates (lambdas, anonymous methods)</a:t>
-            </a:r>
-          </a:p>
-          <a:p>
-            <a:pPr>
-              <a:lnSpc>
-                <a:spcPct val="160000"/>
-              </a:lnSpc>
-            </a:pPr>
-            <a:r>
-              <a:rPr lang="en-US" dirty="0" smtClean="0"/>
-              <a:t>Java properties as C# properties</a:t>
-            </a:r>
-          </a:p>
-          <a:p>
-            <a:pPr>
-              <a:lnSpc>
-                <a:spcPct val="160000"/>
-              </a:lnSpc>
-            </a:pPr>
-            <a:r>
-              <a:rPr lang="en-US" dirty="0" smtClean="0"/>
-              <a:t>Strongly typed API</a:t>
-            </a:r>
-          </a:p>
-          <a:p>
-            <a:pPr>
-              <a:lnSpc>
-                <a:spcPct val="160000"/>
-              </a:lnSpc>
-            </a:pPr>
-            <a:endParaRPr lang="en-US" dirty="0"/>
-          </a:p>
-        </p:txBody>
-      </p:sp>
-    </p:spTree>
-  </p:cSld>
-  <p:clrMapOvr>
-    <a:masterClrMapping/>
-  </p:clrMapOvr>
-</p:sld>
-</file>
-
-<file path=ppt/slides/slide15.xml><?xml version="1.0" encoding="utf-8"?>
-<p:sld xmlns:a="http://schemas.openxmlformats.org/drawingml/2006/main" xmlns:r="http://schemas.openxmlformats.org/officeDocument/2006/relationships" xmlns:p="http://schemas.openxmlformats.org/presentationml/2006/main">
-  <p:cSld>
-    <p:spTree>
-      <p:nvGrpSpPr>
-        <p:cNvPr id="1" name=""/>
-        <p:cNvGrpSpPr/>
-        <p:nvPr/>
-      </p:nvGrpSpPr>
-      <p:grpSpPr>
-        <a:xfrm>
-          <a:off x="0" y="0"/>
-          <a:ext cx="0" cy="0"/>
-          <a:chOff x="0" y="0"/>
-          <a:chExt cx="0" cy="0"/>
-        </a:xfrm>
-      </p:grpSpPr>
-      <p:sp>
-        <p:nvSpPr>
-          <p:cNvPr id="2" name="Title 1"/>
-          <p:cNvSpPr>
-            <a:spLocks noGrp="1"/>
-          </p:cNvSpPr>
-          <p:nvPr>
-            <p:ph type="title"/>
-          </p:nvPr>
-        </p:nvSpPr>
-        <p:spPr/>
-        <p:txBody>
-          <a:bodyPr>
-            <a:normAutofit/>
-          </a:bodyPr>
-          <a:lstStyle/>
-          <a:p>
-            <a:r>
-              <a:rPr lang="en-US" dirty="0" smtClean="0">
-                <a:solidFill>
-                  <a:srgbClr val="141717"/>
-                </a:solidFill>
-                <a:latin typeface="Franklin Gothic Medium"/>
-                <a:cs typeface="Franklin Gothic Medium"/>
-              </a:rPr>
-              <a:t>Why use Mono for Android?</a:t>
-            </a:r>
-            <a:endParaRPr lang="en-US" dirty="0">
-              <a:solidFill>
-                <a:srgbClr val="141717"/>
-              </a:solidFill>
-              <a:latin typeface="Franklin Gothic Medium"/>
-              <a:cs typeface="Franklin Gothic Medium"/>
-            </a:endParaRPr>
-          </a:p>
-        </p:txBody>
-      </p:sp>
-      <p:sp>
-        <p:nvSpPr>
-          <p:cNvPr id="3" name="Content Placeholder 2"/>
-          <p:cNvSpPr>
-            <a:spLocks noGrp="1"/>
-          </p:cNvSpPr>
-          <p:nvPr>
-            <p:ph idx="1"/>
-          </p:nvPr>
-        </p:nvSpPr>
-        <p:spPr/>
-        <p:txBody>
-          <a:bodyPr>
-            <a:normAutofit fontScale="85000" lnSpcReduction="20000"/>
-          </a:bodyPr>
-          <a:lstStyle/>
-          <a:p>
-            <a:r>
-              <a:rPr lang="en-US" dirty="0" smtClean="0">
-                <a:solidFill>
-                  <a:srgbClr val="141717"/>
-                </a:solidFill>
-              </a:rPr>
-              <a:t>Mono for Android story not as compelling as MonoTouch.</a:t>
-            </a:r>
-          </a:p>
-          <a:p>
-            <a:pPr lvl="1"/>
-            <a:r>
-              <a:rPr lang="en-US" dirty="0" smtClean="0">
-                <a:solidFill>
-                  <a:srgbClr val="141717"/>
-                </a:solidFill>
-              </a:rPr>
-              <a:t>GC, decent IDE, not Objective-C</a:t>
-            </a:r>
-          </a:p>
-          <a:p>
-            <a:r>
-              <a:rPr lang="en-US" dirty="0" smtClean="0">
-                <a:solidFill>
-                  <a:srgbClr val="141717"/>
-                </a:solidFill>
-              </a:rPr>
-              <a:t>Opportunities for re-use across platforms</a:t>
-            </a:r>
-          </a:p>
-          <a:p>
-            <a:pPr lvl="1"/>
-            <a:r>
-              <a:rPr lang="en-US" dirty="0" smtClean="0">
-                <a:solidFill>
-                  <a:srgbClr val="141717"/>
-                </a:solidFill>
-              </a:rPr>
-              <a:t>iOS, Android, Windows Phone 7 non-UI components</a:t>
-            </a:r>
-          </a:p>
-          <a:p>
-            <a:pPr lvl="1"/>
-            <a:r>
-              <a:rPr lang="en-US" dirty="0" err="1" smtClean="0">
-                <a:solidFill>
-                  <a:srgbClr val="141717"/>
-                </a:solidFill>
-              </a:rPr>
-              <a:t>MonoGame</a:t>
-            </a:r>
-            <a:r>
-              <a:rPr lang="en-US" dirty="0">
-                <a:solidFill>
-                  <a:srgbClr val="141717"/>
-                </a:solidFill>
-              </a:rPr>
-              <a:t> </a:t>
-            </a:r>
-            <a:r>
-              <a:rPr lang="en-US" dirty="0" smtClean="0">
-                <a:solidFill>
-                  <a:srgbClr val="141717"/>
-                </a:solidFill>
-              </a:rPr>
-              <a:t>which is a port of XNA</a:t>
-            </a:r>
-          </a:p>
-          <a:p>
-            <a:r>
-              <a:rPr lang="en-US" dirty="0" smtClean="0">
-                <a:solidFill>
-                  <a:srgbClr val="141717"/>
-                </a:solidFill>
-              </a:rPr>
-              <a:t>Development tooling and environment</a:t>
-            </a:r>
-          </a:p>
-          <a:p>
-            <a:pPr lvl="1"/>
-            <a:r>
-              <a:rPr lang="en-US" dirty="0" smtClean="0">
-                <a:solidFill>
-                  <a:srgbClr val="141717"/>
-                </a:solidFill>
-              </a:rPr>
-              <a:t>Visual Studio</a:t>
-            </a:r>
-          </a:p>
-          <a:p>
-            <a:pPr lvl="1"/>
-            <a:r>
-              <a:rPr lang="en-US" dirty="0" err="1" smtClean="0">
-                <a:solidFill>
-                  <a:srgbClr val="141717"/>
-                </a:solidFill>
-              </a:rPr>
-              <a:t>MonoDevelop</a:t>
-            </a:r>
-            <a:endParaRPr lang="en-US" dirty="0" smtClean="0">
-              <a:solidFill>
-                <a:srgbClr val="141717"/>
-              </a:solidFill>
-            </a:endParaRPr>
-          </a:p>
-          <a:p>
-            <a:r>
-              <a:rPr lang="en-US" dirty="0" smtClean="0">
-                <a:solidFill>
-                  <a:srgbClr val="141717"/>
-                </a:solidFill>
-              </a:rPr>
-              <a:t>C# &gt; Java</a:t>
-            </a:r>
-          </a:p>
-          <a:p>
-            <a:pPr lvl="1"/>
-            <a:r>
-              <a:rPr lang="en-US" dirty="0" smtClean="0">
-                <a:solidFill>
-                  <a:srgbClr val="141717"/>
-                </a:solidFill>
-              </a:rPr>
-              <a:t>Friction still due to Java idioms and architecture.</a:t>
-            </a:r>
-          </a:p>
-        </p:txBody>
-      </p:sp>
-    </p:spTree>
-  </p:cSld>
-  <p:clrMapOvr>
-    <a:masterClrMapping/>
-  </p:clrMapOvr>
-</p:sld>
-</file>
-
-<file path=ppt/slides/slide16.xml><?xml version="1.0" encoding="utf-8"?>
-<p:sld xmlns:a="http://schemas.openxmlformats.org/drawingml/2006/main" xmlns:r="http://schemas.openxmlformats.org/officeDocument/2006/relationships" xmlns:p="http://schemas.openxmlformats.org/presentationml/2006/main">
-  <p:cSld>
-    <p:spTree>
-      <p:nvGrpSpPr>
-        <p:cNvPr id="1" name=""/>
-        <p:cNvGrpSpPr/>
-        <p:nvPr/>
-      </p:nvGrpSpPr>
-      <p:grpSpPr>
-        <a:xfrm>
-          <a:off x="0" y="0"/>
-          <a:ext cx="0" cy="0"/>
-          <a:chOff x="0" y="0"/>
-          <a:chExt cx="0" cy="0"/>
-        </a:xfrm>
-      </p:grpSpPr>
-      <p:sp>
-        <p:nvSpPr>
-          <p:cNvPr id="2" name="Title 1"/>
-          <p:cNvSpPr>
-            <a:spLocks noGrp="1"/>
-          </p:cNvSpPr>
-          <p:nvPr>
-            <p:ph type="title"/>
-          </p:nvPr>
-        </p:nvSpPr>
-        <p:spPr/>
-        <p:txBody>
-          <a:bodyPr/>
-          <a:lstStyle/>
-          <a:p>
-            <a:r>
-              <a:rPr lang="en-US" dirty="0" smtClean="0">
-                <a:solidFill>
-                  <a:srgbClr val="141717"/>
-                </a:solidFill>
-                <a:latin typeface="Franklin Gothic Medium"/>
-                <a:cs typeface="Franklin Gothic Medium"/>
-              </a:rPr>
-              <a:t>Deployment Options</a:t>
-            </a:r>
-            <a:endParaRPr lang="en-US" dirty="0">
-              <a:solidFill>
-                <a:srgbClr val="141717"/>
-              </a:solidFill>
-              <a:latin typeface="Franklin Gothic Medium"/>
-              <a:cs typeface="Franklin Gothic Medium"/>
-            </a:endParaRPr>
-          </a:p>
-        </p:txBody>
-      </p:sp>
-      <p:sp>
-        <p:nvSpPr>
-          <p:cNvPr id="3" name="Content Placeholder 2"/>
-          <p:cNvSpPr>
-            <a:spLocks noGrp="1"/>
-          </p:cNvSpPr>
-          <p:nvPr>
-            <p:ph idx="1"/>
-          </p:nvPr>
-        </p:nvSpPr>
-        <p:spPr/>
-        <p:txBody>
-          <a:bodyPr>
-            <a:normAutofit/>
-          </a:bodyPr>
-          <a:lstStyle/>
-          <a:p>
-            <a:pPr>
-              <a:spcAft>
-                <a:spcPts val="1200"/>
-              </a:spcAft>
-            </a:pPr>
-            <a:r>
-              <a:rPr lang="en-US" sz="2800" dirty="0" smtClean="0">
-                <a:solidFill>
-                  <a:srgbClr val="141717"/>
-                </a:solidFill>
-              </a:rPr>
-              <a:t>Deploy to Android Virtual Device</a:t>
-            </a:r>
-          </a:p>
-          <a:p>
-            <a:pPr>
-              <a:spcAft>
-                <a:spcPts val="1200"/>
-              </a:spcAft>
-            </a:pPr>
-            <a:r>
-              <a:rPr lang="en-US" sz="2800" dirty="0" smtClean="0">
-                <a:solidFill>
-                  <a:srgbClr val="141717"/>
-                </a:solidFill>
-              </a:rPr>
-              <a:t>Deploy to Device</a:t>
-            </a:r>
-          </a:p>
-          <a:p>
-            <a:pPr>
-              <a:spcAft>
-                <a:spcPts val="1200"/>
-              </a:spcAft>
-            </a:pPr>
-            <a:r>
-              <a:rPr lang="en-US" sz="2800" dirty="0" smtClean="0">
-                <a:solidFill>
-                  <a:srgbClr val="141717"/>
-                </a:solidFill>
-              </a:rPr>
-              <a:t>Debug capabilities on both</a:t>
-            </a:r>
-          </a:p>
-          <a:p>
-            <a:pPr>
-              <a:spcAft>
-                <a:spcPts val="1200"/>
-              </a:spcAft>
-            </a:pPr>
-            <a:r>
-              <a:rPr lang="en-US" sz="2800" dirty="0" smtClean="0">
-                <a:solidFill>
-                  <a:srgbClr val="141717"/>
-                </a:solidFill>
-              </a:rPr>
-              <a:t>Sell (eventually) </a:t>
-            </a:r>
-          </a:p>
-          <a:p>
-            <a:pPr lvl="1">
-              <a:spcAft>
-                <a:spcPts val="1200"/>
-              </a:spcAft>
-            </a:pPr>
-            <a:r>
-              <a:rPr lang="en-US" dirty="0" smtClean="0">
-                <a:solidFill>
-                  <a:srgbClr val="141717"/>
-                </a:solidFill>
-              </a:rPr>
-              <a:t>Android Marketplace</a:t>
-            </a:r>
-          </a:p>
-          <a:p>
-            <a:pPr lvl="1">
-              <a:spcAft>
-                <a:spcPts val="1200"/>
-              </a:spcAft>
-            </a:pPr>
-            <a:r>
-              <a:rPr lang="en-US" dirty="0" smtClean="0">
-                <a:solidFill>
-                  <a:srgbClr val="141717"/>
-                </a:solidFill>
-              </a:rPr>
-              <a:t>Amazon App Store</a:t>
-            </a:r>
-          </a:p>
-          <a:p>
-            <a:pPr lvl="1">
-              <a:spcAft>
-                <a:spcPts val="1200"/>
-              </a:spcAft>
-            </a:pPr>
-            <a:endParaRPr lang="en-US" dirty="0" smtClean="0">
-              <a:solidFill>
-                <a:srgbClr val="141717"/>
-              </a:solidFill>
-            </a:endParaRPr>
-          </a:p>
-        </p:txBody>
-      </p:sp>
-    </p:spTree>
-  </p:cSld>
-  <p:clrMapOvr>
-    <a:masterClrMapping/>
-  </p:clrMapOvr>
-</p:sld>
-</file>
-
 <file path=ppt/slides/slide17.xml><?xml version="1.0" encoding="utf-8"?>
 <p:sld xmlns:a="http://schemas.openxmlformats.org/drawingml/2006/main" xmlns:r="http://schemas.openxmlformats.org/officeDocument/2006/relationships" xmlns:p="http://schemas.openxmlformats.org/presentationml/2006/main">
   <p:cSld>
@@ -9047,116 +8710,102 @@
         <p:spPr/>
         <p:txBody>
           <a:bodyPr>
+            <a:normAutofit fontScale="90000"/>
+          </a:bodyPr>
+          <a:lstStyle/>
+          <a:p>
+            <a:r>
+              <a:rPr lang="en-US" dirty="0" smtClean="0">
+                <a:latin typeface="Franklin Gothic Medium"/>
+                <a:cs typeface="Franklin Gothic Medium"/>
+              </a:rPr>
+              <a:t>Mono for Android Design Principles</a:t>
+            </a:r>
+            <a:endParaRPr lang="en-US" dirty="0">
+              <a:latin typeface="Franklin Gothic Medium"/>
+              <a:cs typeface="Franklin Gothic Medium"/>
+            </a:endParaRPr>
+          </a:p>
+        </p:txBody>
+      </p:sp>
+      <p:sp>
+        <p:nvSpPr>
+          <p:cNvPr id="3" name="Content Placeholder 2"/>
+          <p:cNvSpPr>
+            <a:spLocks noGrp="1"/>
+          </p:cNvSpPr>
+          <p:nvPr>
+            <p:ph idx="1"/>
+          </p:nvPr>
+        </p:nvSpPr>
+        <p:spPr/>
+        <p:txBody>
+          <a:bodyPr>
             <a:normAutofit/>
           </a:bodyPr>
           <a:lstStyle/>
           <a:p>
-            <a:r>
-              <a:rPr lang="en-US" dirty="0" smtClean="0">
-                <a:solidFill>
-                  <a:srgbClr val="141717"/>
-                </a:solidFill>
-                <a:latin typeface="Franklin Gothic Medium"/>
-                <a:cs typeface="Franklin Gothic Medium"/>
-              </a:rPr>
-              <a:t>Android Application Concepts</a:t>
-            </a:r>
-          </a:p>
-        </p:txBody>
-      </p:sp>
-      <p:sp>
-        <p:nvSpPr>
-          <p:cNvPr id="3" name="Content Placeholder 2"/>
-          <p:cNvSpPr>
-            <a:spLocks noGrp="1"/>
-          </p:cNvSpPr>
-          <p:nvPr>
-            <p:ph idx="1"/>
-          </p:nvPr>
-        </p:nvSpPr>
-        <p:spPr/>
-        <p:txBody>
-          <a:bodyPr/>
-          <a:lstStyle/>
-          <a:p>
             <a:pPr>
-              <a:spcAft>
-                <a:spcPts val="3000"/>
-              </a:spcAft>
+              <a:lnSpc>
+                <a:spcPct val="160000"/>
+              </a:lnSpc>
             </a:pPr>
             <a:r>
-              <a:rPr lang="en-US" dirty="0" smtClean="0">
-                <a:solidFill>
-                  <a:srgbClr val="141717"/>
-                </a:solidFill>
-              </a:rPr>
-              <a:t>Activities</a:t>
+              <a:rPr lang="en-US" dirty="0" smtClean="0"/>
+              <a:t>Follow the Framework Design Guidelines</a:t>
             </a:r>
           </a:p>
           <a:p>
             <a:pPr>
-              <a:spcAft>
-                <a:spcPts val="3000"/>
-              </a:spcAft>
+              <a:lnSpc>
+                <a:spcPct val="160000"/>
+              </a:lnSpc>
             </a:pPr>
             <a:r>
-              <a:rPr lang="en-US" dirty="0" smtClean="0">
-                <a:solidFill>
-                  <a:srgbClr val="141717"/>
-                </a:solidFill>
-              </a:rPr>
-              <a:t>Services</a:t>
+              <a:rPr lang="en-US" dirty="0" smtClean="0"/>
+              <a:t>Allow developers to subclass any Java class</a:t>
             </a:r>
           </a:p>
           <a:p>
             <a:pPr>
-              <a:spcAft>
-                <a:spcPts val="3000"/>
-              </a:spcAft>
+              <a:lnSpc>
+                <a:spcPct val="160000"/>
+              </a:lnSpc>
             </a:pPr>
             <a:r>
-              <a:rPr lang="en-US" dirty="0" smtClean="0">
-                <a:solidFill>
-                  <a:srgbClr val="141717"/>
-                </a:solidFill>
-              </a:rPr>
-              <a:t>Content Providers</a:t>
+              <a:rPr lang="en-US" dirty="0" smtClean="0"/>
+              <a:t>C# delegates (lambdas, anonymous methods)</a:t>
             </a:r>
           </a:p>
           <a:p>
             <a:pPr>
-              <a:spcAft>
-                <a:spcPts val="3000"/>
-              </a:spcAft>
+              <a:lnSpc>
+                <a:spcPct val="160000"/>
+              </a:lnSpc>
             </a:pPr>
             <a:r>
-              <a:rPr lang="en-US" dirty="0" smtClean="0">
-                <a:solidFill>
-                  <a:srgbClr val="141717"/>
-                </a:solidFill>
-              </a:rPr>
-              <a:t>Intents</a:t>
+              <a:rPr lang="en-US" dirty="0" smtClean="0"/>
+              <a:t>Java properties as C# properties</a:t>
             </a:r>
           </a:p>
           <a:p>
             <a:pPr>
-              <a:spcAft>
-                <a:spcPts val="3000"/>
-              </a:spcAft>
+              <a:lnSpc>
+                <a:spcPct val="160000"/>
+              </a:lnSpc>
             </a:pPr>
             <a:r>
-              <a:rPr lang="en-US" dirty="0" smtClean="0">
-                <a:solidFill>
-                  <a:srgbClr val="141717"/>
-                </a:solidFill>
-              </a:rPr>
-              <a:t>Resources</a:t>
-            </a:r>
-            <a:endParaRPr lang="en-US" dirty="0">
-              <a:solidFill>
-                <a:srgbClr val="141717"/>
-              </a:solidFill>
-            </a:endParaRPr>
+              <a:rPr lang="en-US" dirty="0" smtClean="0"/>
+              <a:t>Strongly typed API</a:t>
+            </a:r>
+          </a:p>
+          <a:p>
+            <a:pPr>
+              <a:lnSpc>
+                <a:spcPct val="160000"/>
+              </a:lnSpc>
+            </a:pPr>
+            <a:endParaRPr lang="en-US" dirty="0"/>
           </a:p>
         </p:txBody>
       </p:sp>
@@ -9197,19 +8846,11 @@
         </p:nvSpPr>
         <p:spPr/>
         <p:txBody>
-          <a:bodyPr/>
+          <a:bodyPr>
+            <a:normAutofit/>
+          </a:bodyPr>
           <a:lstStyle/>
           <a:p>
-            <a:r>
-              <a:rPr lang="en-US" dirty="0" smtClean="0">
-                <a:solidFill>
-                  <a:srgbClr val="141717"/>
-                </a:solidFill>
-                <a:latin typeface="Franklin Gothic Medium"/>
-                <a:cs typeface="Franklin Gothic Medium"/>
-              </a:rPr>
-              <a:t>Activities</a:t>
-            </a:r>
             <a:endParaRPr lang="en-US" dirty="0">
               <a:solidFill>
                 <a:srgbClr val="141717"/>
@@ -9237,39 +8878,26 @@
           </a:bodyPr>
           <a:lstStyle/>
           <a:p>
-            <a:r>
-              <a:rPr lang="en-US" dirty="0" smtClean="0">
-                <a:solidFill>
-                  <a:srgbClr val="141717"/>
-                </a:solidFill>
-              </a:rPr>
-              <a:t>Orchestrates a UI view</a:t>
-            </a:r>
-          </a:p>
-          <a:p>
-            <a:pPr>
-              <a:spcAft>
-                <a:spcPts val="600"/>
-              </a:spcAft>
+            <a:pPr marL="0" indent="0" algn="ctr">
+              <a:buNone/>
             </a:pPr>
             <a:r>
-              <a:rPr lang="en-US" dirty="0" smtClean="0">
-                <a:solidFill>
-                  <a:srgbClr val="141717"/>
-                </a:solidFill>
-              </a:rPr>
-              <a:t>Applications are composed of 1-to-Many activities</a:t>
-            </a:r>
-          </a:p>
-          <a:p>
-            <a:r>
-              <a:rPr lang="en-US" dirty="0" smtClean="0">
-                <a:solidFill>
-                  <a:srgbClr val="141717"/>
-                </a:solidFill>
-              </a:rPr>
-              <a:t>One activity marked as main and shown first upon launch</a:t>
-            </a:r>
+              <a:rPr lang="en-US" sz="8000" dirty="0" smtClean="0">
+                <a:solidFill>
+                  <a:srgbClr val="141717"/>
+                </a:solidFill>
+                <a:latin typeface="Franklin Gothic Medium"/>
+                <a:cs typeface="Franklin Gothic Medium"/>
+              </a:rPr>
+              <a:t>WHY?</a:t>
+            </a:r>
+            <a:endParaRPr lang="en-US" sz="8000" dirty="0" smtClean="0">
+              <a:solidFill>
+                <a:srgbClr val="141717"/>
+              </a:solidFill>
+              <a:latin typeface="Franklin Gothic Medium"/>
+              <a:cs typeface="Franklin Gothic Medium"/>
+            </a:endParaRPr>
           </a:p>
         </p:txBody>
       </p:sp>
@@ -9278,13 +8906,6 @@
   <p:clrMapOvr>
     <a:masterClrMapping/>
   </p:clrMapOvr>
-  <p:timing>
-    <p:tnLst>
-      <p:par>
-        <p:cTn xmlns:p14="http://schemas.microsoft.com/office/powerpoint/2010/main" id="1" dur="indefinite" restart="never" nodeType="tmRoot"/>
-      </p:par>
-    </p:tnLst>
-  </p:timing>
 </p:sld>
 </file>
 
@@ -9320,23 +8941,7 @@
           <a:bodyPr/>
           <a:lstStyle/>
           <a:p>
-            <a:r>
-              <a:rPr lang="en-US" dirty="0" smtClean="0">
-                <a:solidFill>
-                  <a:srgbClr val="141717"/>
-                </a:solidFill>
-                <a:latin typeface="Franklin Gothic Medium"/>
-                <a:cs typeface="Franklin Gothic Medium"/>
-              </a:rPr>
-              <a:t>Activities - Views</a:t>
-            </a:r>
-            <a:endParaRPr lang="en-US" dirty="0">
-              <a:solidFill>
-                <a:srgbClr val="141717"/>
-              </a:solidFill>
-              <a:latin typeface="Franklin Gothic Medium"/>
-              <a:cs typeface="Franklin Gothic Medium"/>
-            </a:endParaRPr>
+            <a:endParaRPr lang="en-US"/>
           </a:p>
         </p:txBody>
       </p:sp>
@@ -9357,61 +8962,42 @@
           </a:bodyPr>
           <a:lstStyle/>
           <a:p>
-            <a:r>
-              <a:rPr lang="en-US" dirty="0" smtClean="0">
-                <a:solidFill>
-                  <a:srgbClr val="141717"/>
-                </a:solidFill>
-              </a:rPr>
-              <a:t>Each activity is given a default window to draw in. </a:t>
-            </a:r>
-          </a:p>
-          <a:p>
-            <a:r>
-              <a:rPr lang="en-US" dirty="0" smtClean="0">
-                <a:solidFill>
-                  <a:srgbClr val="141717"/>
-                </a:solidFill>
-              </a:rPr>
-              <a:t>Content of the window is provided by a hierarchy of views</a:t>
-            </a:r>
-          </a:p>
-          <a:p>
-            <a:r>
-              <a:rPr lang="en-US" dirty="0" smtClean="0">
-                <a:solidFill>
-                  <a:srgbClr val="141717"/>
-                </a:solidFill>
-              </a:rPr>
-              <a:t>A view hierarchy is placed within an activity's window by the </a:t>
-            </a:r>
-            <a:r>
-              <a:rPr lang="en-US" dirty="0" err="1" smtClean="0">
-                <a:solidFill>
-                  <a:srgbClr val="141717"/>
-                </a:solidFill>
-              </a:rPr>
-              <a:t>Activity.SetContentView</a:t>
-            </a:r>
-            <a:r>
-              <a:rPr lang="en-US" dirty="0" smtClean="0">
-                <a:solidFill>
-                  <a:srgbClr val="141717"/>
-                </a:solidFill>
-              </a:rPr>
-              <a:t>()</a:t>
-            </a:r>
-          </a:p>
-          <a:p>
-            <a:endParaRPr lang="en-US" dirty="0">
-              <a:solidFill>
-                <a:srgbClr val="141717"/>
-              </a:solidFill>
-            </a:endParaRPr>
+            <a:pPr marL="0" indent="0">
+              <a:buNone/>
+            </a:pPr>
+            <a:r>
+              <a:rPr lang="en-US" sz="6000" dirty="0">
+                <a:solidFill>
+                  <a:srgbClr val="141717"/>
+                </a:solidFill>
+              </a:rPr>
+              <a:t>Mono for Android story not as compelling as </a:t>
+            </a:r>
+            <a:r>
+              <a:rPr lang="en-US" sz="6000" dirty="0" err="1" smtClean="0">
+                <a:solidFill>
+                  <a:srgbClr val="141717"/>
+                </a:solidFill>
+              </a:rPr>
+              <a:t>MonoTouch</a:t>
+            </a:r>
+            <a:r>
+              <a:rPr lang="en-US" sz="6000" dirty="0">
+                <a:solidFill>
+                  <a:srgbClr val="141717"/>
+                </a:solidFill>
+              </a:rPr>
+              <a:t>.</a:t>
+            </a:r>
           </a:p>
         </p:txBody>
       </p:sp>
     </p:spTree>
+    <p:extLst>
+      <p:ext uri="{BB962C8B-B14F-4D97-AF65-F5344CB8AC3E}">
+        <p14:creationId xmlns:p14="http://schemas.microsoft.com/office/powerpoint/2010/main" val="2940233252"/>
+      </p:ext>
+    </p:extLst>
   </p:cSld>
   <p:clrMapOvr>
     <a:masterClrMapping/>
@@ -9555,6 +9141,831 @@
 </file>
 
 <file path=ppt/slides/slide20.xml><?xml version="1.0" encoding="utf-8"?>
+<p:sld xmlns:a="http://schemas.openxmlformats.org/drawingml/2006/main" xmlns:r="http://schemas.openxmlformats.org/officeDocument/2006/relationships" xmlns:p="http://schemas.openxmlformats.org/presentationml/2006/main">
+  <p:cSld>
+    <p:spTree>
+      <p:nvGrpSpPr>
+        <p:cNvPr id="1" name=""/>
+        <p:cNvGrpSpPr/>
+        <p:nvPr/>
+      </p:nvGrpSpPr>
+      <p:grpSpPr>
+        <a:xfrm>
+          <a:off x="0" y="0"/>
+          <a:ext cx="0" cy="0"/>
+          <a:chOff x="0" y="0"/>
+          <a:chExt cx="0" cy="0"/>
+        </a:xfrm>
+      </p:grpSpPr>
+      <p:sp>
+        <p:nvSpPr>
+          <p:cNvPr id="2" name="Title 1"/>
+          <p:cNvSpPr>
+            <a:spLocks noGrp="1"/>
+          </p:cNvSpPr>
+          <p:nvPr>
+            <p:ph type="title"/>
+          </p:nvPr>
+        </p:nvSpPr>
+        <p:spPr/>
+        <p:txBody>
+          <a:bodyPr/>
+          <a:lstStyle/>
+          <a:p>
+            <a:endParaRPr lang="en-US"/>
+          </a:p>
+        </p:txBody>
+      </p:sp>
+      <p:sp>
+        <p:nvSpPr>
+          <p:cNvPr id="3" name="Content Placeholder 2"/>
+          <p:cNvSpPr>
+            <a:spLocks noGrp="1"/>
+          </p:cNvSpPr>
+          <p:nvPr>
+            <p:ph idx="1"/>
+          </p:nvPr>
+        </p:nvSpPr>
+        <p:spPr/>
+        <p:txBody>
+          <a:bodyPr/>
+          <a:lstStyle/>
+          <a:p>
+            <a:pPr marL="0" indent="0">
+              <a:buNone/>
+            </a:pPr>
+            <a:r>
+              <a:rPr lang="en-US" sz="6000" dirty="0">
+                <a:solidFill>
+                  <a:srgbClr val="141717"/>
+                </a:solidFill>
+              </a:rPr>
+              <a:t>Opportunities for re-use across platforms</a:t>
+            </a:r>
+          </a:p>
+          <a:p>
+            <a:endParaRPr lang="en-US" dirty="0"/>
+          </a:p>
+        </p:txBody>
+      </p:sp>
+    </p:spTree>
+    <p:extLst>
+      <p:ext uri="{BB962C8B-B14F-4D97-AF65-F5344CB8AC3E}">
+        <p14:creationId xmlns:p14="http://schemas.microsoft.com/office/powerpoint/2010/main" val="1319095591"/>
+      </p:ext>
+    </p:extLst>
+  </p:cSld>
+  <p:clrMapOvr>
+    <a:masterClrMapping/>
+  </p:clrMapOvr>
+</p:sld>
+</file>
+
+<file path=ppt/slides/slide21.xml><?xml version="1.0" encoding="utf-8"?>
+<p:sld xmlns:a="http://schemas.openxmlformats.org/drawingml/2006/main" xmlns:r="http://schemas.openxmlformats.org/officeDocument/2006/relationships" xmlns:p="http://schemas.openxmlformats.org/presentationml/2006/main">
+  <p:cSld>
+    <p:spTree>
+      <p:nvGrpSpPr>
+        <p:cNvPr id="1" name=""/>
+        <p:cNvGrpSpPr/>
+        <p:nvPr/>
+      </p:nvGrpSpPr>
+      <p:grpSpPr>
+        <a:xfrm>
+          <a:off x="0" y="0"/>
+          <a:ext cx="0" cy="0"/>
+          <a:chOff x="0" y="0"/>
+          <a:chExt cx="0" cy="0"/>
+        </a:xfrm>
+      </p:grpSpPr>
+      <p:sp>
+        <p:nvSpPr>
+          <p:cNvPr id="2" name="Title 1"/>
+          <p:cNvSpPr>
+            <a:spLocks noGrp="1"/>
+          </p:cNvSpPr>
+          <p:nvPr>
+            <p:ph type="title"/>
+          </p:nvPr>
+        </p:nvSpPr>
+        <p:spPr/>
+        <p:txBody>
+          <a:bodyPr/>
+          <a:lstStyle/>
+          <a:p>
+            <a:endParaRPr lang="en-US"/>
+          </a:p>
+        </p:txBody>
+      </p:sp>
+      <p:sp>
+        <p:nvSpPr>
+          <p:cNvPr id="3" name="Content Placeholder 2"/>
+          <p:cNvSpPr>
+            <a:spLocks noGrp="1"/>
+          </p:cNvSpPr>
+          <p:nvPr>
+            <p:ph idx="1"/>
+          </p:nvPr>
+        </p:nvSpPr>
+        <p:spPr/>
+        <p:txBody>
+          <a:bodyPr/>
+          <a:lstStyle/>
+          <a:p>
+            <a:pPr marL="0" indent="0">
+              <a:buNone/>
+            </a:pPr>
+            <a:r>
+              <a:rPr lang="en-US" sz="6000" dirty="0">
+                <a:solidFill>
+                  <a:srgbClr val="141717"/>
+                </a:solidFill>
+              </a:rPr>
+              <a:t>Development tooling and environment</a:t>
+            </a:r>
+          </a:p>
+          <a:p>
+            <a:endParaRPr lang="en-US" dirty="0"/>
+          </a:p>
+        </p:txBody>
+      </p:sp>
+    </p:spTree>
+    <p:extLst>
+      <p:ext uri="{BB962C8B-B14F-4D97-AF65-F5344CB8AC3E}">
+        <p14:creationId xmlns:p14="http://schemas.microsoft.com/office/powerpoint/2010/main" val="2988564261"/>
+      </p:ext>
+    </p:extLst>
+  </p:cSld>
+  <p:clrMapOvr>
+    <a:masterClrMapping/>
+  </p:clrMapOvr>
+</p:sld>
+</file>
+
+<file path=ppt/slides/slide22.xml><?xml version="1.0" encoding="utf-8"?>
+<p:sld xmlns:a="http://schemas.openxmlformats.org/drawingml/2006/main" xmlns:r="http://schemas.openxmlformats.org/officeDocument/2006/relationships" xmlns:p="http://schemas.openxmlformats.org/presentationml/2006/main">
+  <p:cSld>
+    <p:spTree>
+      <p:nvGrpSpPr>
+        <p:cNvPr id="1" name=""/>
+        <p:cNvGrpSpPr/>
+        <p:nvPr/>
+      </p:nvGrpSpPr>
+      <p:grpSpPr>
+        <a:xfrm>
+          <a:off x="0" y="0"/>
+          <a:ext cx="0" cy="0"/>
+          <a:chOff x="0" y="0"/>
+          <a:chExt cx="0" cy="0"/>
+        </a:xfrm>
+      </p:grpSpPr>
+      <p:sp>
+        <p:nvSpPr>
+          <p:cNvPr id="2" name="Title 1"/>
+          <p:cNvSpPr>
+            <a:spLocks noGrp="1"/>
+          </p:cNvSpPr>
+          <p:nvPr>
+            <p:ph type="title"/>
+          </p:nvPr>
+        </p:nvSpPr>
+        <p:spPr/>
+        <p:txBody>
+          <a:bodyPr/>
+          <a:lstStyle/>
+          <a:p>
+            <a:endParaRPr lang="en-US"/>
+          </a:p>
+        </p:txBody>
+      </p:sp>
+      <p:sp>
+        <p:nvSpPr>
+          <p:cNvPr id="3" name="Content Placeholder 2"/>
+          <p:cNvSpPr>
+            <a:spLocks noGrp="1"/>
+          </p:cNvSpPr>
+          <p:nvPr>
+            <p:ph idx="1"/>
+          </p:nvPr>
+        </p:nvSpPr>
+        <p:spPr/>
+        <p:txBody>
+          <a:bodyPr/>
+          <a:lstStyle/>
+          <a:p>
+            <a:pPr marL="0" indent="0" algn="ctr">
+              <a:buNone/>
+            </a:pPr>
+            <a:r>
+              <a:rPr lang="en-US" sz="6600" dirty="0">
+                <a:solidFill>
+                  <a:srgbClr val="141717"/>
+                </a:solidFill>
+              </a:rPr>
+              <a:t>C# &gt; Java</a:t>
+            </a:r>
+          </a:p>
+          <a:p>
+            <a:endParaRPr lang="en-US" dirty="0"/>
+          </a:p>
+        </p:txBody>
+      </p:sp>
+    </p:spTree>
+    <p:extLst>
+      <p:ext uri="{BB962C8B-B14F-4D97-AF65-F5344CB8AC3E}">
+        <p14:creationId xmlns:p14="http://schemas.microsoft.com/office/powerpoint/2010/main" val="3781494947"/>
+      </p:ext>
+    </p:extLst>
+  </p:cSld>
+  <p:clrMapOvr>
+    <a:masterClrMapping/>
+  </p:clrMapOvr>
+</p:sld>
+</file>
+
+<file path=ppt/slides/slide23.xml><?xml version="1.0" encoding="utf-8"?>
+<p:sld xmlns:a="http://schemas.openxmlformats.org/drawingml/2006/main" xmlns:r="http://schemas.openxmlformats.org/officeDocument/2006/relationships" xmlns:p="http://schemas.openxmlformats.org/presentationml/2006/main">
+  <p:cSld>
+    <p:spTree>
+      <p:nvGrpSpPr>
+        <p:cNvPr id="1" name=""/>
+        <p:cNvGrpSpPr/>
+        <p:nvPr/>
+      </p:nvGrpSpPr>
+      <p:grpSpPr>
+        <a:xfrm>
+          <a:off x="0" y="0"/>
+          <a:ext cx="0" cy="0"/>
+          <a:chOff x="0" y="0"/>
+          <a:chExt cx="0" cy="0"/>
+        </a:xfrm>
+      </p:grpSpPr>
+      <p:sp>
+        <p:nvSpPr>
+          <p:cNvPr id="2" name="Title 1"/>
+          <p:cNvSpPr>
+            <a:spLocks noGrp="1"/>
+          </p:cNvSpPr>
+          <p:nvPr>
+            <p:ph type="title"/>
+          </p:nvPr>
+        </p:nvSpPr>
+        <p:spPr/>
+        <p:txBody>
+          <a:bodyPr/>
+          <a:lstStyle/>
+          <a:p>
+            <a:r>
+              <a:rPr lang="en-US" dirty="0" smtClean="0">
+                <a:solidFill>
+                  <a:srgbClr val="141717"/>
+                </a:solidFill>
+                <a:latin typeface="Franklin Gothic Medium"/>
+                <a:cs typeface="Franklin Gothic Medium"/>
+              </a:rPr>
+              <a:t>Deployment Options</a:t>
+            </a:r>
+            <a:endParaRPr lang="en-US" dirty="0">
+              <a:solidFill>
+                <a:srgbClr val="141717"/>
+              </a:solidFill>
+              <a:latin typeface="Franklin Gothic Medium"/>
+              <a:cs typeface="Franklin Gothic Medium"/>
+            </a:endParaRPr>
+          </a:p>
+        </p:txBody>
+      </p:sp>
+      <p:sp>
+        <p:nvSpPr>
+          <p:cNvPr id="3" name="Content Placeholder 2"/>
+          <p:cNvSpPr>
+            <a:spLocks noGrp="1"/>
+          </p:cNvSpPr>
+          <p:nvPr>
+            <p:ph idx="1"/>
+          </p:nvPr>
+        </p:nvSpPr>
+        <p:spPr/>
+        <p:txBody>
+          <a:bodyPr>
+            <a:normAutofit/>
+          </a:bodyPr>
+          <a:lstStyle/>
+          <a:p>
+            <a:pPr>
+              <a:spcAft>
+                <a:spcPts val="1200"/>
+              </a:spcAft>
+            </a:pPr>
+            <a:r>
+              <a:rPr lang="en-US" sz="2800" dirty="0" smtClean="0">
+                <a:solidFill>
+                  <a:srgbClr val="141717"/>
+                </a:solidFill>
+              </a:rPr>
+              <a:t>Deploy to Android Virtual Device</a:t>
+            </a:r>
+          </a:p>
+          <a:p>
+            <a:pPr>
+              <a:spcAft>
+                <a:spcPts val="1200"/>
+              </a:spcAft>
+            </a:pPr>
+            <a:r>
+              <a:rPr lang="en-US" sz="2800" dirty="0" smtClean="0">
+                <a:solidFill>
+                  <a:srgbClr val="141717"/>
+                </a:solidFill>
+              </a:rPr>
+              <a:t>Deploy to Device</a:t>
+            </a:r>
+          </a:p>
+          <a:p>
+            <a:pPr>
+              <a:spcAft>
+                <a:spcPts val="1200"/>
+              </a:spcAft>
+            </a:pPr>
+            <a:r>
+              <a:rPr lang="en-US" sz="2800" dirty="0" smtClean="0">
+                <a:solidFill>
+                  <a:srgbClr val="141717"/>
+                </a:solidFill>
+              </a:rPr>
+              <a:t>Debug capabilities on both</a:t>
+            </a:r>
+          </a:p>
+          <a:p>
+            <a:pPr>
+              <a:spcAft>
+                <a:spcPts val="1200"/>
+              </a:spcAft>
+            </a:pPr>
+            <a:r>
+              <a:rPr lang="en-US" sz="2800" dirty="0" smtClean="0">
+                <a:solidFill>
+                  <a:srgbClr val="141717"/>
+                </a:solidFill>
+              </a:rPr>
+              <a:t>Sell (eventually) </a:t>
+            </a:r>
+          </a:p>
+          <a:p>
+            <a:pPr lvl="1">
+              <a:spcAft>
+                <a:spcPts val="1200"/>
+              </a:spcAft>
+            </a:pPr>
+            <a:r>
+              <a:rPr lang="en-US" dirty="0" smtClean="0">
+                <a:solidFill>
+                  <a:srgbClr val="141717"/>
+                </a:solidFill>
+              </a:rPr>
+              <a:t>Android Marketplace</a:t>
+            </a:r>
+          </a:p>
+          <a:p>
+            <a:pPr lvl="1">
+              <a:spcAft>
+                <a:spcPts val="1200"/>
+              </a:spcAft>
+            </a:pPr>
+            <a:r>
+              <a:rPr lang="en-US" dirty="0" smtClean="0">
+                <a:solidFill>
+                  <a:srgbClr val="141717"/>
+                </a:solidFill>
+              </a:rPr>
+              <a:t>Amazon App Store</a:t>
+            </a:r>
+          </a:p>
+          <a:p>
+            <a:pPr lvl="1">
+              <a:spcAft>
+                <a:spcPts val="1200"/>
+              </a:spcAft>
+            </a:pPr>
+            <a:endParaRPr lang="en-US" dirty="0" smtClean="0">
+              <a:solidFill>
+                <a:srgbClr val="141717"/>
+              </a:solidFill>
+            </a:endParaRPr>
+          </a:p>
+        </p:txBody>
+      </p:sp>
+    </p:spTree>
+  </p:cSld>
+  <p:clrMapOvr>
+    <a:masterClrMapping/>
+  </p:clrMapOvr>
+</p:sld>
+</file>
+
+<file path=ppt/slides/slide24.xml><?xml version="1.0" encoding="utf-8"?>
+<p:sld xmlns:a="http://schemas.openxmlformats.org/drawingml/2006/main" xmlns:r="http://schemas.openxmlformats.org/officeDocument/2006/relationships" xmlns:p="http://schemas.openxmlformats.org/presentationml/2006/main">
+  <p:cSld>
+    <p:spTree>
+      <p:nvGrpSpPr>
+        <p:cNvPr id="1" name=""/>
+        <p:cNvGrpSpPr/>
+        <p:nvPr/>
+      </p:nvGrpSpPr>
+      <p:grpSpPr>
+        <a:xfrm>
+          <a:off x="0" y="0"/>
+          <a:ext cx="0" cy="0"/>
+          <a:chOff x="0" y="0"/>
+          <a:chExt cx="0" cy="0"/>
+        </a:xfrm>
+      </p:grpSpPr>
+      <p:sp>
+        <p:nvSpPr>
+          <p:cNvPr id="2" name="Title 1"/>
+          <p:cNvSpPr>
+            <a:spLocks noGrp="1"/>
+          </p:cNvSpPr>
+          <p:nvPr>
+            <p:ph type="title"/>
+          </p:nvPr>
+        </p:nvSpPr>
+        <p:spPr/>
+        <p:txBody>
+          <a:bodyPr>
+            <a:normAutofit/>
+          </a:bodyPr>
+          <a:lstStyle/>
+          <a:p>
+            <a:r>
+              <a:rPr lang="en-US" dirty="0" smtClean="0">
+                <a:solidFill>
+                  <a:srgbClr val="141717"/>
+                </a:solidFill>
+                <a:latin typeface="Franklin Gothic Medium"/>
+                <a:cs typeface="Franklin Gothic Medium"/>
+              </a:rPr>
+              <a:t>Android Application Concepts</a:t>
+            </a:r>
+          </a:p>
+        </p:txBody>
+      </p:sp>
+      <p:sp>
+        <p:nvSpPr>
+          <p:cNvPr id="3" name="Content Placeholder 2"/>
+          <p:cNvSpPr>
+            <a:spLocks noGrp="1"/>
+          </p:cNvSpPr>
+          <p:nvPr>
+            <p:ph idx="1"/>
+          </p:nvPr>
+        </p:nvSpPr>
+        <p:spPr/>
+        <p:txBody>
+          <a:bodyPr/>
+          <a:lstStyle/>
+          <a:p>
+            <a:pPr>
+              <a:spcAft>
+                <a:spcPts val="3000"/>
+              </a:spcAft>
+            </a:pPr>
+            <a:r>
+              <a:rPr lang="en-US" dirty="0" smtClean="0">
+                <a:solidFill>
+                  <a:srgbClr val="141717"/>
+                </a:solidFill>
+              </a:rPr>
+              <a:t>Activities</a:t>
+            </a:r>
+          </a:p>
+          <a:p>
+            <a:pPr>
+              <a:spcAft>
+                <a:spcPts val="3000"/>
+              </a:spcAft>
+            </a:pPr>
+            <a:r>
+              <a:rPr lang="en-US" dirty="0" smtClean="0">
+                <a:solidFill>
+                  <a:srgbClr val="141717"/>
+                </a:solidFill>
+              </a:rPr>
+              <a:t>Services</a:t>
+            </a:r>
+          </a:p>
+          <a:p>
+            <a:pPr>
+              <a:spcAft>
+                <a:spcPts val="3000"/>
+              </a:spcAft>
+            </a:pPr>
+            <a:r>
+              <a:rPr lang="en-US" dirty="0" smtClean="0">
+                <a:solidFill>
+                  <a:srgbClr val="141717"/>
+                </a:solidFill>
+              </a:rPr>
+              <a:t>Content Providers</a:t>
+            </a:r>
+          </a:p>
+          <a:p>
+            <a:pPr>
+              <a:spcAft>
+                <a:spcPts val="3000"/>
+              </a:spcAft>
+            </a:pPr>
+            <a:r>
+              <a:rPr lang="en-US" dirty="0" smtClean="0">
+                <a:solidFill>
+                  <a:srgbClr val="141717"/>
+                </a:solidFill>
+              </a:rPr>
+              <a:t>Intents</a:t>
+            </a:r>
+          </a:p>
+          <a:p>
+            <a:pPr>
+              <a:spcAft>
+                <a:spcPts val="3000"/>
+              </a:spcAft>
+            </a:pPr>
+            <a:r>
+              <a:rPr lang="en-US" dirty="0" smtClean="0">
+                <a:solidFill>
+                  <a:srgbClr val="141717"/>
+                </a:solidFill>
+              </a:rPr>
+              <a:t>Resources</a:t>
+            </a:r>
+            <a:endParaRPr lang="en-US" dirty="0">
+              <a:solidFill>
+                <a:srgbClr val="141717"/>
+              </a:solidFill>
+            </a:endParaRPr>
+          </a:p>
+        </p:txBody>
+      </p:sp>
+    </p:spTree>
+  </p:cSld>
+  <p:clrMapOvr>
+    <a:masterClrMapping/>
+  </p:clrMapOvr>
+</p:sld>
+</file>
+
+<file path=ppt/slides/slide25.xml><?xml version="1.0" encoding="utf-8"?>
+<p:sld xmlns:a="http://schemas.openxmlformats.org/drawingml/2006/main" xmlns:r="http://schemas.openxmlformats.org/officeDocument/2006/relationships" xmlns:p="http://schemas.openxmlformats.org/presentationml/2006/main">
+  <p:cSld>
+    <p:spTree>
+      <p:nvGrpSpPr>
+        <p:cNvPr id="1" name=""/>
+        <p:cNvGrpSpPr/>
+        <p:nvPr/>
+      </p:nvGrpSpPr>
+      <p:grpSpPr>
+        <a:xfrm>
+          <a:off x="0" y="0"/>
+          <a:ext cx="0" cy="0"/>
+          <a:chOff x="0" y="0"/>
+          <a:chExt cx="0" cy="0"/>
+        </a:xfrm>
+      </p:grpSpPr>
+      <p:sp>
+        <p:nvSpPr>
+          <p:cNvPr id="2" name="Title 1"/>
+          <p:cNvSpPr>
+            <a:spLocks noGrp="1"/>
+          </p:cNvSpPr>
+          <p:nvPr>
+            <p:ph type="title"/>
+          </p:nvPr>
+        </p:nvSpPr>
+        <p:spPr/>
+        <p:txBody>
+          <a:bodyPr/>
+          <a:lstStyle/>
+          <a:p>
+            <a:r>
+              <a:rPr lang="en-US" dirty="0" smtClean="0">
+                <a:solidFill>
+                  <a:srgbClr val="141717"/>
+                </a:solidFill>
+                <a:latin typeface="Franklin Gothic Medium"/>
+                <a:cs typeface="Franklin Gothic Medium"/>
+              </a:rPr>
+              <a:t>Activities</a:t>
+            </a:r>
+            <a:endParaRPr lang="en-US" dirty="0">
+              <a:solidFill>
+                <a:srgbClr val="141717"/>
+              </a:solidFill>
+              <a:latin typeface="Franklin Gothic Medium"/>
+              <a:cs typeface="Franklin Gothic Medium"/>
+            </a:endParaRPr>
+          </a:p>
+        </p:txBody>
+      </p:sp>
+      <p:sp>
+        <p:nvSpPr>
+          <p:cNvPr id="3" name="Content Placeholder 2"/>
+          <p:cNvSpPr>
+            <a:spLocks noGrp="1"/>
+          </p:cNvSpPr>
+          <p:nvPr>
+            <p:ph idx="1"/>
+          </p:nvPr>
+        </p:nvSpPr>
+        <p:spPr/>
+        <p:txBody>
+          <a:bodyPr>
+            <a:normAutofit/>
+          </a:bodyPr>
+          <a:lstStyle/>
+          <a:p>
+            <a:r>
+              <a:rPr lang="en-US" dirty="0" smtClean="0">
+                <a:solidFill>
+                  <a:srgbClr val="141717"/>
+                </a:solidFill>
+              </a:rPr>
+              <a:t>Orchestrates a UI view</a:t>
+            </a:r>
+          </a:p>
+          <a:p>
+            <a:pPr>
+              <a:spcAft>
+                <a:spcPts val="600"/>
+              </a:spcAft>
+            </a:pPr>
+            <a:r>
+              <a:rPr lang="en-US" dirty="0" smtClean="0">
+                <a:solidFill>
+                  <a:srgbClr val="141717"/>
+                </a:solidFill>
+              </a:rPr>
+              <a:t>Applications are composed of 1-to-Many activities</a:t>
+            </a:r>
+          </a:p>
+          <a:p>
+            <a:r>
+              <a:rPr lang="en-US" dirty="0" smtClean="0">
+                <a:solidFill>
+                  <a:srgbClr val="141717"/>
+                </a:solidFill>
+              </a:rPr>
+              <a:t>One activity marked as main and shown first upon launch</a:t>
+            </a:r>
+          </a:p>
+        </p:txBody>
+      </p:sp>
+    </p:spTree>
+  </p:cSld>
+  <p:clrMapOvr>
+    <a:masterClrMapping/>
+  </p:clrMapOvr>
+  <p:timing>
+    <p:tnLst>
+      <p:par>
+        <p:cTn xmlns:p14="http://schemas.microsoft.com/office/powerpoint/2010/main" id="1" dur="indefinite" restart="never" nodeType="tmRoot"/>
+      </p:par>
+    </p:tnLst>
+  </p:timing>
+</p:sld>
+</file>
+
+<file path=ppt/slides/slide26.xml><?xml version="1.0" encoding="utf-8"?>
+<p:sld xmlns:a="http://schemas.openxmlformats.org/drawingml/2006/main" xmlns:r="http://schemas.openxmlformats.org/officeDocument/2006/relationships" xmlns:p="http://schemas.openxmlformats.org/presentationml/2006/main">
+  <p:cSld>
+    <p:spTree>
+      <p:nvGrpSpPr>
+        <p:cNvPr id="1" name=""/>
+        <p:cNvGrpSpPr/>
+        <p:nvPr/>
+      </p:nvGrpSpPr>
+      <p:grpSpPr>
+        <a:xfrm>
+          <a:off x="0" y="0"/>
+          <a:ext cx="0" cy="0"/>
+          <a:chOff x="0" y="0"/>
+          <a:chExt cx="0" cy="0"/>
+        </a:xfrm>
+      </p:grpSpPr>
+      <p:sp>
+        <p:nvSpPr>
+          <p:cNvPr id="2" name="Title 1"/>
+          <p:cNvSpPr>
+            <a:spLocks noGrp="1"/>
+          </p:cNvSpPr>
+          <p:nvPr>
+            <p:ph type="title"/>
+          </p:nvPr>
+        </p:nvSpPr>
+        <p:spPr/>
+        <p:txBody>
+          <a:bodyPr/>
+          <a:lstStyle/>
+          <a:p>
+            <a:r>
+              <a:rPr lang="en-US" dirty="0" smtClean="0">
+                <a:solidFill>
+                  <a:srgbClr val="141717"/>
+                </a:solidFill>
+                <a:latin typeface="Franklin Gothic Medium"/>
+                <a:cs typeface="Franklin Gothic Medium"/>
+              </a:rPr>
+              <a:t>Activities - Views</a:t>
+            </a:r>
+            <a:endParaRPr lang="en-US" dirty="0">
+              <a:solidFill>
+                <a:srgbClr val="141717"/>
+              </a:solidFill>
+              <a:latin typeface="Franklin Gothic Medium"/>
+              <a:cs typeface="Franklin Gothic Medium"/>
+            </a:endParaRPr>
+          </a:p>
+        </p:txBody>
+      </p:sp>
+      <p:sp>
+        <p:nvSpPr>
+          <p:cNvPr id="3" name="Content Placeholder 2"/>
+          <p:cNvSpPr>
+            <a:spLocks noGrp="1"/>
+          </p:cNvSpPr>
+          <p:nvPr>
+            <p:ph idx="1"/>
+          </p:nvPr>
+        </p:nvSpPr>
+        <p:spPr/>
+        <p:txBody>
+          <a:bodyPr>
+            <a:normAutofit/>
+          </a:bodyPr>
+          <a:lstStyle/>
+          <a:p>
+            <a:r>
+              <a:rPr lang="en-US" dirty="0" smtClean="0">
+                <a:solidFill>
+                  <a:srgbClr val="141717"/>
+                </a:solidFill>
+              </a:rPr>
+              <a:t>Each activity is given a default window to draw in. </a:t>
+            </a:r>
+          </a:p>
+          <a:p>
+            <a:r>
+              <a:rPr lang="en-US" dirty="0" smtClean="0">
+                <a:solidFill>
+                  <a:srgbClr val="141717"/>
+                </a:solidFill>
+              </a:rPr>
+              <a:t>Content of the window is provided by a hierarchy of views</a:t>
+            </a:r>
+          </a:p>
+          <a:p>
+            <a:r>
+              <a:rPr lang="en-US" dirty="0" smtClean="0">
+                <a:solidFill>
+                  <a:srgbClr val="141717"/>
+                </a:solidFill>
+              </a:rPr>
+              <a:t>A view hierarchy is placed within an activity's window by the </a:t>
+            </a:r>
+            <a:r>
+              <a:rPr lang="en-US" dirty="0" err="1" smtClean="0">
+                <a:solidFill>
+                  <a:srgbClr val="141717"/>
+                </a:solidFill>
+              </a:rPr>
+              <a:t>Activity.SetContentView</a:t>
+            </a:r>
+            <a:r>
+              <a:rPr lang="en-US" dirty="0" smtClean="0">
+                <a:solidFill>
+                  <a:srgbClr val="141717"/>
+                </a:solidFill>
+              </a:rPr>
+              <a:t>()</a:t>
+            </a:r>
+          </a:p>
+          <a:p>
+            <a:endParaRPr lang="en-US" dirty="0">
+              <a:solidFill>
+                <a:srgbClr val="141717"/>
+              </a:solidFill>
+            </a:endParaRPr>
+          </a:p>
+        </p:txBody>
+      </p:sp>
+    </p:spTree>
+  </p:cSld>
+  <p:clrMapOvr>
+    <a:masterClrMapping/>
+  </p:clrMapOvr>
+</p:sld>
+</file>
+
+<file path=ppt/slides/slide27.xml><?xml version="1.0" encoding="utf-8"?>
 <p:sld xmlns:a="http://schemas.openxmlformats.org/drawingml/2006/main" xmlns:r="http://schemas.openxmlformats.org/officeDocument/2006/relationships" xmlns:p="http://schemas.openxmlformats.org/presentationml/2006/main" show="0">
   <p:cSld>
     <p:spTree>
@@ -9644,931 +10055,6 @@
 </p:sld>
 </file>
 
-<file path=ppt/slides/slide21.xml><?xml version="1.0" encoding="utf-8"?>
-<p:sld xmlns:a="http://schemas.openxmlformats.org/drawingml/2006/main" xmlns:r="http://schemas.openxmlformats.org/officeDocument/2006/relationships" xmlns:p="http://schemas.openxmlformats.org/presentationml/2006/main">
-  <p:cSld>
-    <p:spTree>
-      <p:nvGrpSpPr>
-        <p:cNvPr id="1" name=""/>
-        <p:cNvGrpSpPr/>
-        <p:nvPr/>
-      </p:nvGrpSpPr>
-      <p:grpSpPr>
-        <a:xfrm>
-          <a:off x="0" y="0"/>
-          <a:ext cx="0" cy="0"/>
-          <a:chOff x="0" y="0"/>
-          <a:chExt cx="0" cy="0"/>
-        </a:xfrm>
-      </p:grpSpPr>
-      <p:sp>
-        <p:nvSpPr>
-          <p:cNvPr id="2" name="Title 1"/>
-          <p:cNvSpPr>
-            <a:spLocks noGrp="1"/>
-          </p:cNvSpPr>
-          <p:nvPr>
-            <p:ph type="title"/>
-          </p:nvPr>
-        </p:nvSpPr>
-        <p:spPr/>
-        <p:txBody>
-          <a:bodyPr/>
-          <a:lstStyle/>
-          <a:p>
-            <a:r>
-              <a:rPr lang="en-US" dirty="0" smtClean="0">
-                <a:solidFill>
-                  <a:srgbClr val="141717"/>
-                </a:solidFill>
-                <a:latin typeface="Franklin Gothic Medium"/>
-                <a:cs typeface="Franklin Gothic Medium"/>
-              </a:rPr>
-              <a:t>Activity Life Cycle</a:t>
-            </a:r>
-          </a:p>
-        </p:txBody>
-      </p:sp>
-      <p:sp>
-        <p:nvSpPr>
-          <p:cNvPr id="3" name="Content Placeholder 2"/>
-          <p:cNvSpPr>
-            <a:spLocks noGrp="1"/>
-          </p:cNvSpPr>
-          <p:nvPr>
-            <p:ph idx="1"/>
-          </p:nvPr>
-        </p:nvSpPr>
-        <p:spPr/>
-        <p:txBody>
-          <a:bodyPr/>
-          <a:lstStyle/>
-          <a:p>
-            <a:r>
-              <a:rPr lang="en-US" dirty="0" err="1" smtClean="0">
-                <a:solidFill>
-                  <a:srgbClr val="141717"/>
-                </a:solidFill>
-              </a:rPr>
-              <a:t>onCreate</a:t>
-            </a:r>
-            <a:endParaRPr lang="en-US" dirty="0" smtClean="0">
-              <a:solidFill>
-                <a:srgbClr val="141717"/>
-              </a:solidFill>
-            </a:endParaRPr>
-          </a:p>
-          <a:p>
-            <a:r>
-              <a:rPr lang="en-US" dirty="0" err="1" smtClean="0">
-                <a:solidFill>
-                  <a:srgbClr val="141717"/>
-                </a:solidFill>
-              </a:rPr>
-              <a:t>onStart</a:t>
-            </a:r>
-            <a:endParaRPr lang="en-US" dirty="0" smtClean="0">
-              <a:solidFill>
-                <a:srgbClr val="141717"/>
-              </a:solidFill>
-            </a:endParaRPr>
-          </a:p>
-          <a:p>
-            <a:r>
-              <a:rPr lang="en-US" dirty="0" err="1" smtClean="0">
-                <a:solidFill>
-                  <a:srgbClr val="141717"/>
-                </a:solidFill>
-              </a:rPr>
-              <a:t>onResume</a:t>
-            </a:r>
-            <a:endParaRPr lang="en-US" dirty="0" smtClean="0">
-              <a:solidFill>
-                <a:srgbClr val="141717"/>
-              </a:solidFill>
-            </a:endParaRPr>
-          </a:p>
-          <a:p>
-            <a:r>
-              <a:rPr lang="en-US" dirty="0" err="1" smtClean="0">
-                <a:solidFill>
-                  <a:srgbClr val="141717"/>
-                </a:solidFill>
-              </a:rPr>
-              <a:t>onPause</a:t>
-            </a:r>
-            <a:endParaRPr lang="en-US" dirty="0" smtClean="0">
-              <a:solidFill>
-                <a:srgbClr val="141717"/>
-              </a:solidFill>
-            </a:endParaRPr>
-          </a:p>
-          <a:p>
-            <a:r>
-              <a:rPr lang="en-US" dirty="0" err="1" smtClean="0">
-                <a:solidFill>
-                  <a:srgbClr val="141717"/>
-                </a:solidFill>
-              </a:rPr>
-              <a:t>onStop</a:t>
-            </a:r>
-            <a:endParaRPr lang="en-US" dirty="0" smtClean="0">
-              <a:solidFill>
-                <a:srgbClr val="141717"/>
-              </a:solidFill>
-            </a:endParaRPr>
-          </a:p>
-          <a:p>
-            <a:r>
-              <a:rPr lang="en-US" dirty="0" err="1" smtClean="0">
-                <a:solidFill>
-                  <a:srgbClr val="141717"/>
-                </a:solidFill>
-              </a:rPr>
-              <a:t>onDestroy</a:t>
-            </a:r>
-            <a:endParaRPr lang="en-US" dirty="0" smtClean="0">
-              <a:solidFill>
-                <a:srgbClr val="141717"/>
-              </a:solidFill>
-            </a:endParaRPr>
-          </a:p>
-          <a:p>
-            <a:endParaRPr lang="en-US" dirty="0" smtClean="0">
-              <a:solidFill>
-                <a:srgbClr val="141717"/>
-              </a:solidFill>
-            </a:endParaRPr>
-          </a:p>
-          <a:p>
-            <a:endParaRPr lang="en-US" dirty="0" smtClean="0">
-              <a:solidFill>
-                <a:srgbClr val="141717"/>
-              </a:solidFill>
-            </a:endParaRPr>
-          </a:p>
-          <a:p>
-            <a:endParaRPr lang="en-US" dirty="0">
-              <a:solidFill>
-                <a:srgbClr val="141717"/>
-              </a:solidFill>
-            </a:endParaRPr>
-          </a:p>
-        </p:txBody>
-      </p:sp>
-    </p:spTree>
-  </p:cSld>
-  <p:clrMapOvr>
-    <a:masterClrMapping/>
-  </p:clrMapOvr>
-</p:sld>
-</file>
-
-<file path=ppt/slides/slide22.xml><?xml version="1.0" encoding="utf-8"?>
-<p:sld xmlns:a="http://schemas.openxmlformats.org/drawingml/2006/main" xmlns:r="http://schemas.openxmlformats.org/officeDocument/2006/relationships" xmlns:p="http://schemas.openxmlformats.org/presentationml/2006/main">
-  <p:cSld>
-    <p:spTree>
-      <p:nvGrpSpPr>
-        <p:cNvPr id="1" name=""/>
-        <p:cNvGrpSpPr/>
-        <p:nvPr/>
-      </p:nvGrpSpPr>
-      <p:grpSpPr>
-        <a:xfrm>
-          <a:off x="0" y="0"/>
-          <a:ext cx="0" cy="0"/>
-          <a:chOff x="0" y="0"/>
-          <a:chExt cx="0" cy="0"/>
-        </a:xfrm>
-      </p:grpSpPr>
-      <p:sp>
-        <p:nvSpPr>
-          <p:cNvPr id="2" name="Title 1"/>
-          <p:cNvSpPr>
-            <a:spLocks noGrp="1"/>
-          </p:cNvSpPr>
-          <p:nvPr>
-            <p:ph type="title"/>
-          </p:nvPr>
-        </p:nvSpPr>
-        <p:spPr/>
-        <p:txBody>
-          <a:bodyPr>
-            <a:normAutofit/>
-          </a:bodyPr>
-          <a:lstStyle/>
-          <a:p>
-            <a:r>
-              <a:rPr lang="en-US" dirty="0" smtClean="0">
-                <a:solidFill>
-                  <a:srgbClr val="141717"/>
-                </a:solidFill>
-                <a:latin typeface="Franklin Gothic Medium"/>
-                <a:cs typeface="Franklin Gothic Medium"/>
-              </a:rPr>
-              <a:t>Intents</a:t>
-            </a:r>
-          </a:p>
-        </p:txBody>
-      </p:sp>
-      <p:sp>
-        <p:nvSpPr>
-          <p:cNvPr id="3" name="Content Placeholder 2"/>
-          <p:cNvSpPr>
-            <a:spLocks noGrp="1"/>
-          </p:cNvSpPr>
-          <p:nvPr>
-            <p:ph idx="1"/>
-          </p:nvPr>
-        </p:nvSpPr>
-        <p:spPr/>
-        <p:txBody>
-          <a:bodyPr/>
-          <a:lstStyle/>
-          <a:p>
-            <a:r>
-              <a:rPr lang="en-US" dirty="0" err="1" smtClean="0">
-                <a:solidFill>
-                  <a:srgbClr val="141717"/>
-                </a:solidFill>
-              </a:rPr>
-              <a:t>Eventing</a:t>
-            </a:r>
-            <a:r>
-              <a:rPr lang="en-US" dirty="0" smtClean="0">
-                <a:solidFill>
-                  <a:srgbClr val="141717"/>
-                </a:solidFill>
-              </a:rPr>
-              <a:t> mechanism</a:t>
-            </a:r>
-          </a:p>
-          <a:p>
-            <a:r>
-              <a:rPr lang="en-US" dirty="0" smtClean="0">
-                <a:solidFill>
-                  <a:srgbClr val="141717"/>
-                </a:solidFill>
-              </a:rPr>
-              <a:t>Intent objects are passive data that is of interest to the component that is receiving the intent</a:t>
-            </a:r>
-          </a:p>
-          <a:p>
-            <a:r>
-              <a:rPr lang="en-US" dirty="0" smtClean="0">
-                <a:solidFill>
-                  <a:srgbClr val="141717"/>
-                </a:solidFill>
-              </a:rPr>
-              <a:t>Filterable so you can pick and choose which events to respond to</a:t>
-            </a:r>
-          </a:p>
-          <a:p>
-            <a:endParaRPr lang="en-US" dirty="0" smtClean="0">
-              <a:solidFill>
-                <a:srgbClr val="141717"/>
-              </a:solidFill>
-            </a:endParaRPr>
-          </a:p>
-          <a:p>
-            <a:endParaRPr lang="en-US" dirty="0" smtClean="0">
-              <a:solidFill>
-                <a:srgbClr val="141717"/>
-              </a:solidFill>
-            </a:endParaRPr>
-          </a:p>
-        </p:txBody>
-      </p:sp>
-    </p:spTree>
-  </p:cSld>
-  <p:clrMapOvr>
-    <a:masterClrMapping/>
-  </p:clrMapOvr>
-</p:sld>
-</file>
-
-<file path=ppt/slides/slide23.xml><?xml version="1.0" encoding="utf-8"?>
-<p:sld xmlns:a="http://schemas.openxmlformats.org/drawingml/2006/main" xmlns:r="http://schemas.openxmlformats.org/officeDocument/2006/relationships" xmlns:p="http://schemas.openxmlformats.org/presentationml/2006/main">
-  <p:cSld>
-    <p:spTree>
-      <p:nvGrpSpPr>
-        <p:cNvPr id="1" name=""/>
-        <p:cNvGrpSpPr/>
-        <p:nvPr/>
-      </p:nvGrpSpPr>
-      <p:grpSpPr>
-        <a:xfrm>
-          <a:off x="0" y="0"/>
-          <a:ext cx="0" cy="0"/>
-          <a:chOff x="0" y="0"/>
-          <a:chExt cx="0" cy="0"/>
-        </a:xfrm>
-      </p:grpSpPr>
-      <p:sp>
-        <p:nvSpPr>
-          <p:cNvPr id="2" name="Title 1"/>
-          <p:cNvSpPr>
-            <a:spLocks noGrp="1"/>
-          </p:cNvSpPr>
-          <p:nvPr>
-            <p:ph type="title"/>
-          </p:nvPr>
-        </p:nvSpPr>
-        <p:spPr/>
-        <p:txBody>
-          <a:bodyPr/>
-          <a:lstStyle/>
-          <a:p>
-            <a:r>
-              <a:rPr lang="en-US" dirty="0" smtClean="0">
-                <a:solidFill>
-                  <a:srgbClr val="141717"/>
-                </a:solidFill>
-                <a:latin typeface="Franklin Gothic Medium"/>
-                <a:cs typeface="Franklin Gothic Medium"/>
-              </a:rPr>
-              <a:t>Services</a:t>
-            </a:r>
-          </a:p>
-        </p:txBody>
-      </p:sp>
-      <p:sp>
-        <p:nvSpPr>
-          <p:cNvPr id="3" name="Content Placeholder 2"/>
-          <p:cNvSpPr>
-            <a:spLocks noGrp="1"/>
-          </p:cNvSpPr>
-          <p:nvPr>
-            <p:ph idx="1"/>
-          </p:nvPr>
-        </p:nvSpPr>
-        <p:spPr/>
-        <p:txBody>
-          <a:bodyPr/>
-          <a:lstStyle/>
-          <a:p>
-            <a:r>
-              <a:rPr lang="en-US" dirty="0" smtClean="0">
-                <a:solidFill>
-                  <a:srgbClr val="141717"/>
-                </a:solidFill>
-              </a:rPr>
-              <a:t>Android service are what you’d expect.</a:t>
-            </a:r>
-          </a:p>
-          <a:p>
-            <a:r>
-              <a:rPr lang="en-US" dirty="0" smtClean="0">
-                <a:solidFill>
-                  <a:srgbClr val="141717"/>
-                </a:solidFill>
-              </a:rPr>
-              <a:t>Possible to bind to an ongoing service and communicate via exposed interface</a:t>
-            </a:r>
-          </a:p>
-          <a:p>
-            <a:r>
-              <a:rPr lang="en-US" dirty="0" smtClean="0">
-                <a:solidFill>
-                  <a:srgbClr val="141717"/>
-                </a:solidFill>
-              </a:rPr>
-              <a:t>Runs in main application process but doesn’t block other components or UI</a:t>
-            </a:r>
-          </a:p>
-          <a:p>
-            <a:endParaRPr lang="en-US" dirty="0" smtClean="0">
-              <a:solidFill>
-                <a:srgbClr val="141717"/>
-              </a:solidFill>
-            </a:endParaRPr>
-          </a:p>
-          <a:p>
-            <a:endParaRPr lang="en-US" dirty="0">
-              <a:solidFill>
-                <a:srgbClr val="141717"/>
-              </a:solidFill>
-            </a:endParaRPr>
-          </a:p>
-        </p:txBody>
-      </p:sp>
-    </p:spTree>
-    <p:extLst>
-      <p:ext uri="{BB962C8B-B14F-4D97-AF65-F5344CB8AC3E}">
-        <p14:creationId xmlns:p14="http://schemas.microsoft.com/office/powerpoint/2010/main" val="847587006"/>
-      </p:ext>
-    </p:extLst>
-  </p:cSld>
-  <p:clrMapOvr>
-    <a:masterClrMapping/>
-  </p:clrMapOvr>
-</p:sld>
-</file>
-
-<file path=ppt/slides/slide24.xml><?xml version="1.0" encoding="utf-8"?>
-<p:sld xmlns:a="http://schemas.openxmlformats.org/drawingml/2006/main" xmlns:r="http://schemas.openxmlformats.org/officeDocument/2006/relationships" xmlns:p="http://schemas.openxmlformats.org/presentationml/2006/main">
-  <p:cSld>
-    <p:spTree>
-      <p:nvGrpSpPr>
-        <p:cNvPr id="1" name=""/>
-        <p:cNvGrpSpPr/>
-        <p:nvPr/>
-      </p:nvGrpSpPr>
-      <p:grpSpPr>
-        <a:xfrm>
-          <a:off x="0" y="0"/>
-          <a:ext cx="0" cy="0"/>
-          <a:chOff x="0" y="0"/>
-          <a:chExt cx="0" cy="0"/>
-        </a:xfrm>
-      </p:grpSpPr>
-      <p:sp>
-        <p:nvSpPr>
-          <p:cNvPr id="2" name="Title 1"/>
-          <p:cNvSpPr>
-            <a:spLocks noGrp="1"/>
-          </p:cNvSpPr>
-          <p:nvPr>
-            <p:ph type="title"/>
-          </p:nvPr>
-        </p:nvSpPr>
-        <p:spPr/>
-        <p:txBody>
-          <a:bodyPr/>
-          <a:lstStyle/>
-          <a:p>
-            <a:r>
-              <a:rPr lang="en-US" dirty="0" smtClean="0">
-                <a:solidFill>
-                  <a:srgbClr val="141717"/>
-                </a:solidFill>
-                <a:latin typeface="Franklin Gothic Medium"/>
-                <a:cs typeface="Franklin Gothic Medium"/>
-              </a:rPr>
-              <a:t>Content</a:t>
-            </a:r>
-            <a:r>
-              <a:rPr lang="en-US" dirty="0" smtClean="0">
-                <a:solidFill>
-                  <a:srgbClr val="141717"/>
-                </a:solidFill>
-              </a:rPr>
-              <a:t> </a:t>
-            </a:r>
-            <a:r>
-              <a:rPr lang="en-US" dirty="0" smtClean="0">
-                <a:solidFill>
-                  <a:srgbClr val="141717"/>
-                </a:solidFill>
-                <a:latin typeface="Franklin Gothic Medium"/>
-                <a:cs typeface="Franklin Gothic Medium"/>
-              </a:rPr>
-              <a:t>Providers</a:t>
-            </a:r>
-          </a:p>
-        </p:txBody>
-      </p:sp>
-      <p:sp>
-        <p:nvSpPr>
-          <p:cNvPr id="3" name="Content Placeholder 2"/>
-          <p:cNvSpPr>
-            <a:spLocks noGrp="1"/>
-          </p:cNvSpPr>
-          <p:nvPr>
-            <p:ph idx="1"/>
-          </p:nvPr>
-        </p:nvSpPr>
-        <p:spPr/>
-        <p:txBody>
-          <a:bodyPr/>
-          <a:lstStyle/>
-          <a:p>
-            <a:r>
-              <a:rPr lang="en-US" dirty="0" err="1" smtClean="0">
-                <a:solidFill>
-                  <a:srgbClr val="141717"/>
-                </a:solidFill>
-              </a:rPr>
-              <a:t>Queryable</a:t>
-            </a:r>
-            <a:r>
-              <a:rPr lang="en-US" dirty="0" smtClean="0">
-                <a:solidFill>
-                  <a:srgbClr val="141717"/>
-                </a:solidFill>
-              </a:rPr>
-              <a:t> application data stores</a:t>
-            </a:r>
-          </a:p>
-          <a:p>
-            <a:r>
-              <a:rPr lang="en-US" dirty="0" smtClean="0">
-                <a:solidFill>
-                  <a:srgbClr val="141717"/>
-                </a:solidFill>
-              </a:rPr>
-              <a:t>Only way to share data amongst other apps</a:t>
-            </a:r>
-          </a:p>
-          <a:p>
-            <a:r>
-              <a:rPr lang="en-US" dirty="0" smtClean="0">
-                <a:solidFill>
-                  <a:srgbClr val="141717"/>
-                </a:solidFill>
-              </a:rPr>
-              <a:t>Android ships with common providers</a:t>
-            </a:r>
-          </a:p>
-          <a:p>
-            <a:pPr lvl="1"/>
-            <a:r>
-              <a:rPr lang="en-US" dirty="0" smtClean="0">
-                <a:solidFill>
-                  <a:srgbClr val="141717"/>
-                </a:solidFill>
-              </a:rPr>
-              <a:t>Audio, video, images, contacts, etc.</a:t>
-            </a:r>
-          </a:p>
-          <a:p>
-            <a:r>
-              <a:rPr lang="en-US" dirty="0" smtClean="0">
-                <a:solidFill>
-                  <a:srgbClr val="141717"/>
-                </a:solidFill>
-              </a:rPr>
-              <a:t>Making your application’s data public</a:t>
-            </a:r>
-          </a:p>
-          <a:p>
-            <a:pPr lvl="1"/>
-            <a:r>
-              <a:rPr lang="en-US" dirty="0" smtClean="0">
-                <a:solidFill>
-                  <a:srgbClr val="141717"/>
-                </a:solidFill>
-              </a:rPr>
-              <a:t>Create a new provider</a:t>
-            </a:r>
-          </a:p>
-          <a:p>
-            <a:pPr lvl="1"/>
-            <a:r>
-              <a:rPr lang="en-US" dirty="0" smtClean="0">
-                <a:solidFill>
-                  <a:srgbClr val="141717"/>
-                </a:solidFill>
-              </a:rPr>
-              <a:t>Add your data to existing provider</a:t>
-            </a:r>
-          </a:p>
-        </p:txBody>
-      </p:sp>
-    </p:spTree>
-  </p:cSld>
-  <p:clrMapOvr>
-    <a:masterClrMapping/>
-  </p:clrMapOvr>
-</p:sld>
-</file>
-
-<file path=ppt/slides/slide25.xml><?xml version="1.0" encoding="utf-8"?>
-<p:sld xmlns:a="http://schemas.openxmlformats.org/drawingml/2006/main" xmlns:r="http://schemas.openxmlformats.org/officeDocument/2006/relationships" xmlns:p="http://schemas.openxmlformats.org/presentationml/2006/main">
-  <p:cSld>
-    <p:spTree>
-      <p:nvGrpSpPr>
-        <p:cNvPr id="1" name=""/>
-        <p:cNvGrpSpPr/>
-        <p:nvPr/>
-      </p:nvGrpSpPr>
-      <p:grpSpPr>
-        <a:xfrm>
-          <a:off x="0" y="0"/>
-          <a:ext cx="0" cy="0"/>
-          <a:chOff x="0" y="0"/>
-          <a:chExt cx="0" cy="0"/>
-        </a:xfrm>
-      </p:grpSpPr>
-      <p:sp>
-        <p:nvSpPr>
-          <p:cNvPr id="2" name="Title 1"/>
-          <p:cNvSpPr>
-            <a:spLocks noGrp="1"/>
-          </p:cNvSpPr>
-          <p:nvPr>
-            <p:ph type="title"/>
-          </p:nvPr>
-        </p:nvSpPr>
-        <p:spPr/>
-        <p:txBody>
-          <a:bodyPr/>
-          <a:lstStyle/>
-          <a:p>
-            <a:r>
-              <a:rPr lang="en-US" dirty="0" smtClean="0"/>
-              <a:t>Content </a:t>
-            </a:r>
-            <a:r>
-              <a:rPr lang="en-US" smtClean="0"/>
-              <a:t>Provider Layer</a:t>
-            </a:r>
-            <a:endParaRPr lang="en-US"/>
-          </a:p>
-        </p:txBody>
-      </p:sp>
-      <p:graphicFrame>
-        <p:nvGraphicFramePr>
-          <p:cNvPr id="3" name="Diagram 2"/>
-          <p:cNvGraphicFramePr/>
-          <p:nvPr/>
-        </p:nvGraphicFramePr>
-        <p:xfrm>
-          <a:off x="723900" y="1905000"/>
-          <a:ext cx="7696200" cy="3048000"/>
-        </p:xfrm>
-        <a:graphic>
-          <a:graphicData uri="http://schemas.openxmlformats.org/drawingml/2006/diagram">
-            <dgm:relIds xmlns:dgm="http://schemas.openxmlformats.org/drawingml/2006/diagram" xmlns:r="http://schemas.openxmlformats.org/officeDocument/2006/relationships" r:dm="rId2" r:lo="rId3" r:qs="rId4" r:cs="rId5"/>
-          </a:graphicData>
-        </a:graphic>
-      </p:graphicFrame>
-    </p:spTree>
-    <p:extLst>
-      <p:ext uri="{BB962C8B-B14F-4D97-AF65-F5344CB8AC3E}">
-        <p14:creationId xmlns:p14="http://schemas.microsoft.com/office/powerpoint/2010/main" val="554593828"/>
-      </p:ext>
-    </p:extLst>
-  </p:cSld>
-  <p:clrMapOvr>
-    <a:masterClrMapping/>
-  </p:clrMapOvr>
-</p:sld>
-</file>
-
-<file path=ppt/slides/slide26.xml><?xml version="1.0" encoding="utf-8"?>
-<p:sld xmlns:a="http://schemas.openxmlformats.org/drawingml/2006/main" xmlns:r="http://schemas.openxmlformats.org/officeDocument/2006/relationships" xmlns:p="http://schemas.openxmlformats.org/presentationml/2006/main">
-  <p:cSld>
-    <p:spTree>
-      <p:nvGrpSpPr>
-        <p:cNvPr id="1" name=""/>
-        <p:cNvGrpSpPr/>
-        <p:nvPr/>
-      </p:nvGrpSpPr>
-      <p:grpSpPr>
-        <a:xfrm>
-          <a:off x="0" y="0"/>
-          <a:ext cx="0" cy="0"/>
-          <a:chOff x="0" y="0"/>
-          <a:chExt cx="0" cy="0"/>
-        </a:xfrm>
-      </p:grpSpPr>
-      <p:sp>
-        <p:nvSpPr>
-          <p:cNvPr id="2" name="Title 1"/>
-          <p:cNvSpPr>
-            <a:spLocks noGrp="1"/>
-          </p:cNvSpPr>
-          <p:nvPr>
-            <p:ph type="title"/>
-          </p:nvPr>
-        </p:nvSpPr>
-        <p:spPr/>
-        <p:txBody>
-          <a:bodyPr>
-            <a:normAutofit/>
-          </a:bodyPr>
-          <a:lstStyle/>
-          <a:p>
-            <a:r>
-              <a:rPr lang="en-US" dirty="0" smtClean="0">
-                <a:solidFill>
-                  <a:srgbClr val="141717"/>
-                </a:solidFill>
-                <a:latin typeface="Franklin Gothic Medium"/>
-                <a:cs typeface="Franklin Gothic Medium"/>
-              </a:rPr>
-              <a:t>Resources</a:t>
-            </a:r>
-          </a:p>
-        </p:txBody>
-      </p:sp>
-      <p:sp>
-        <p:nvSpPr>
-          <p:cNvPr id="3" name="Content Placeholder 2"/>
-          <p:cNvSpPr>
-            <a:spLocks noGrp="1"/>
-          </p:cNvSpPr>
-          <p:nvPr>
-            <p:ph idx="1"/>
-          </p:nvPr>
-        </p:nvSpPr>
-        <p:spPr/>
-        <p:txBody>
-          <a:bodyPr>
-            <a:normAutofit fontScale="92500" lnSpcReduction="20000"/>
-          </a:bodyPr>
-          <a:lstStyle/>
-          <a:p>
-            <a:pPr>
-              <a:lnSpc>
-                <a:spcPct val="150000"/>
-              </a:lnSpc>
-            </a:pPr>
-            <a:r>
-              <a:rPr lang="en-US" dirty="0" smtClean="0">
-                <a:solidFill>
-                  <a:srgbClr val="141717"/>
-                </a:solidFill>
-              </a:rPr>
-              <a:t>Images, layout descriptions, binary blobs and string dictionaries</a:t>
-            </a:r>
-          </a:p>
-          <a:p>
-            <a:pPr>
-              <a:lnSpc>
-                <a:spcPct val="150000"/>
-              </a:lnSpc>
-            </a:pPr>
-            <a:r>
-              <a:rPr lang="en-US" dirty="0" smtClean="0">
-                <a:solidFill>
-                  <a:srgbClr val="141717"/>
-                </a:solidFill>
-              </a:rPr>
-              <a:t>Abstraction layer which helps decouples code</a:t>
-            </a:r>
-          </a:p>
-          <a:p>
-            <a:pPr>
-              <a:lnSpc>
-                <a:spcPct val="150000"/>
-              </a:lnSpc>
-            </a:pPr>
-            <a:r>
-              <a:rPr lang="en-US" dirty="0" smtClean="0">
-                <a:solidFill>
-                  <a:srgbClr val="141717"/>
-                </a:solidFill>
-              </a:rPr>
-              <a:t>Makes managing assets easier</a:t>
-            </a:r>
-          </a:p>
-          <a:p>
-            <a:pPr lvl="1">
-              <a:lnSpc>
-                <a:spcPct val="150000"/>
-              </a:lnSpc>
-            </a:pPr>
-            <a:r>
-              <a:rPr lang="en-US" dirty="0" smtClean="0">
-                <a:solidFill>
-                  <a:srgbClr val="141717"/>
-                </a:solidFill>
-              </a:rPr>
-              <a:t>Localization</a:t>
-            </a:r>
-          </a:p>
-          <a:p>
-            <a:pPr lvl="1">
-              <a:lnSpc>
-                <a:spcPct val="150000"/>
-              </a:lnSpc>
-            </a:pPr>
-            <a:r>
-              <a:rPr lang="en-US" dirty="0" smtClean="0">
-                <a:solidFill>
-                  <a:srgbClr val="141717"/>
-                </a:solidFill>
-              </a:rPr>
-              <a:t>Multiple displays</a:t>
-            </a:r>
-          </a:p>
-          <a:p>
-            <a:pPr lvl="1">
-              <a:lnSpc>
-                <a:spcPct val="150000"/>
-              </a:lnSpc>
-            </a:pPr>
-            <a:r>
-              <a:rPr lang="en-US" dirty="0" smtClean="0">
-                <a:solidFill>
-                  <a:srgbClr val="141717"/>
-                </a:solidFill>
-              </a:rPr>
-              <a:t>Different hardware configurations</a:t>
-            </a:r>
-          </a:p>
-        </p:txBody>
-      </p:sp>
-    </p:spTree>
-  </p:cSld>
-  <p:clrMapOvr>
-    <a:masterClrMapping/>
-  </p:clrMapOvr>
-</p:sld>
-</file>
-
-<file path=ppt/slides/slide27.xml><?xml version="1.0" encoding="utf-8"?>
-<p:sld xmlns:a="http://schemas.openxmlformats.org/drawingml/2006/main" xmlns:r="http://schemas.openxmlformats.org/officeDocument/2006/relationships" xmlns:p="http://schemas.openxmlformats.org/presentationml/2006/main">
-  <p:cSld>
-    <p:spTree>
-      <p:nvGrpSpPr>
-        <p:cNvPr id="1" name=""/>
-        <p:cNvGrpSpPr/>
-        <p:nvPr/>
-      </p:nvGrpSpPr>
-      <p:grpSpPr>
-        <a:xfrm>
-          <a:off x="0" y="0"/>
-          <a:ext cx="0" cy="0"/>
-          <a:chOff x="0" y="0"/>
-          <a:chExt cx="0" cy="0"/>
-        </a:xfrm>
-      </p:grpSpPr>
-      <p:sp>
-        <p:nvSpPr>
-          <p:cNvPr id="2" name="Title 1"/>
-          <p:cNvSpPr>
-            <a:spLocks noGrp="1"/>
-          </p:cNvSpPr>
-          <p:nvPr>
-            <p:ph type="title"/>
-          </p:nvPr>
-        </p:nvSpPr>
-        <p:spPr/>
-        <p:txBody>
-          <a:bodyPr>
-            <a:normAutofit/>
-          </a:bodyPr>
-          <a:lstStyle/>
-          <a:p>
-            <a:r>
-              <a:rPr lang="en-US" dirty="0" smtClean="0">
-                <a:solidFill>
-                  <a:srgbClr val="141717"/>
-                </a:solidFill>
-                <a:latin typeface="Franklin Gothic Medium"/>
-                <a:cs typeface="Franklin Gothic Medium"/>
-              </a:rPr>
-              <a:t>Code Demo</a:t>
-            </a:r>
-          </a:p>
-        </p:txBody>
-      </p:sp>
-      <p:sp>
-        <p:nvSpPr>
-          <p:cNvPr id="3" name="Content Placeholder 2"/>
-          <p:cNvSpPr>
-            <a:spLocks noGrp="1"/>
-          </p:cNvSpPr>
-          <p:nvPr>
-            <p:ph idx="1"/>
-          </p:nvPr>
-        </p:nvSpPr>
-        <p:spPr/>
-        <p:txBody>
-          <a:bodyPr>
-            <a:normAutofit/>
-          </a:bodyPr>
-          <a:lstStyle/>
-          <a:p>
-            <a:endParaRPr lang="en-US" dirty="0" smtClean="0"/>
-          </a:p>
-          <a:p>
-            <a:endParaRPr lang="en-US" dirty="0" smtClean="0"/>
-          </a:p>
-          <a:p>
-            <a:pPr>
-              <a:buNone/>
-            </a:pPr>
-            <a:endParaRPr lang="en-US" dirty="0" smtClean="0"/>
-          </a:p>
-          <a:p>
-            <a:pPr algn="ctr">
-              <a:buNone/>
-            </a:pPr>
-            <a:r>
-              <a:rPr lang="en-US" sz="2000" dirty="0" smtClean="0">
-                <a:latin typeface="Lucida Console" pitchFamily="49" charset="0"/>
-                <a:hlinkClick r:id="rId3"/>
-              </a:rPr>
-              <a:t>https://github.com/kevinmcmahon/MonoDroid101</a:t>
-            </a:r>
-            <a:endParaRPr lang="en-US" sz="2000" dirty="0" smtClean="0">
-              <a:latin typeface="Lucida Console" pitchFamily="49" charset="0"/>
-            </a:endParaRPr>
-          </a:p>
-        </p:txBody>
-      </p:sp>
-    </p:spTree>
-  </p:cSld>
-  <p:clrMapOvr>
-    <a:masterClrMapping/>
-  </p:clrMapOvr>
-</p:sld>
-</file>
-
 <file path=ppt/slides/slide28.xml><?xml version="1.0" encoding="utf-8"?>
 <p:sld xmlns:a="http://schemas.openxmlformats.org/drawingml/2006/main" xmlns:r="http://schemas.openxmlformats.org/officeDocument/2006/relationships" xmlns:p="http://schemas.openxmlformats.org/presentationml/2006/main">
   <p:cSld>
@@ -10609,35 +10095,8 @@
                 <a:latin typeface="Franklin Gothic Medium"/>
                 <a:cs typeface="Franklin Gothic Medium"/>
               </a:rPr>
-              <a:t>Mono </a:t>
-            </a:r>
-            <a:r>
-              <a:rPr lang="en-US" smtClean="0">
-                <a:solidFill>
-                  <a:srgbClr val="141717"/>
-                </a:solidFill>
-                <a:latin typeface="Franklin Gothic Medium"/>
-                <a:cs typeface="Franklin Gothic Medium"/>
-              </a:rPr>
-              <a:t>for Android </a:t>
-            </a:r>
-            <a:r>
-              <a:rPr lang="en-US" dirty="0" smtClean="0">
-                <a:solidFill>
-                  <a:srgbClr val="141717"/>
-                </a:solidFill>
-                <a:latin typeface="Franklin Gothic Medium"/>
-                <a:cs typeface="Franklin Gothic Medium"/>
-              </a:rPr>
-              <a:t>Resources</a:t>
-            </a:r>
-            <a:endParaRPr lang="en-US" dirty="0">
-              <a:solidFill>
-                <a:srgbClr val="141717"/>
-              </a:solidFill>
-              <a:latin typeface="Franklin Gothic Medium"/>
-              <a:cs typeface="Franklin Gothic Medium"/>
-            </a:endParaRPr>
+              <a:t>Activity Life Cycle</a:t>
+            </a:r>
           </a:p>
         </p:txBody>
       </p:sp>
@@ -10653,91 +10112,17 @@
         </p:nvSpPr>
         <p:spPr/>
         <p:txBody>
-          <a:bodyPr>
-            <a:normAutofit fontScale="70000" lnSpcReduction="20000"/>
-          </a:bodyPr>
+          <a:bodyPr/>
           <a:lstStyle/>
           <a:p>
-            <a:pPr>
-              <a:buNone/>
-            </a:pPr>
-            <a:r>
-              <a:rPr lang="en-US" dirty="0" smtClean="0">
-                <a:solidFill>
-                  <a:srgbClr val="141717"/>
-                </a:solidFill>
-              </a:rPr>
-              <a:t>Download the Preview!</a:t>
-            </a:r>
-          </a:p>
-          <a:p>
-            <a:r>
-              <a:rPr lang="en-US" dirty="0" smtClean="0">
-                <a:solidFill>
-                  <a:srgbClr val="141717"/>
-                </a:solidFill>
-                <a:latin typeface="Lucida Console"/>
-                <a:cs typeface="Lucida Console"/>
-                <a:hlinkClick r:id="rId2"/>
-              </a:rPr>
-              <a:t>http:</a:t>
-            </a:r>
-            <a:r>
-              <a:rPr lang="en-US" dirty="0">
-                <a:solidFill>
-                  <a:srgbClr val="141717"/>
-                </a:solidFill>
-                <a:latin typeface="Lucida Console"/>
-                <a:cs typeface="Lucida Console"/>
-                <a:hlinkClick r:id="rId2"/>
-              </a:rPr>
-              <a:t>/</a:t>
-            </a:r>
-            <a:r>
-              <a:rPr lang="en-US" dirty="0" smtClean="0">
-                <a:solidFill>
-                  <a:srgbClr val="141717"/>
-                </a:solidFill>
-                <a:latin typeface="Lucida Console"/>
-                <a:cs typeface="Lucida Console"/>
-                <a:hlinkClick r:id="rId2"/>
-              </a:rPr>
-              <a:t>/mono</a:t>
-            </a:r>
-            <a:r>
-              <a:rPr lang="en-US" dirty="0">
-                <a:solidFill>
-                  <a:srgbClr val="141717"/>
-                </a:solidFill>
-                <a:latin typeface="Lucida Console"/>
-                <a:cs typeface="Lucida Console"/>
-                <a:hlinkClick r:id="rId2"/>
-              </a:rPr>
-              <a:t>-</a:t>
-            </a:r>
-            <a:r>
-              <a:rPr lang="en-US" dirty="0" smtClean="0">
-                <a:solidFill>
-                  <a:srgbClr val="141717"/>
-                </a:solidFill>
-                <a:latin typeface="Lucida Console"/>
-                <a:cs typeface="Lucida Console"/>
-                <a:hlinkClick r:id="rId2"/>
-              </a:rPr>
-              <a:t>android.net/Welcome</a:t>
-            </a:r>
-            <a:endParaRPr lang="en-US" dirty="0" smtClean="0">
-              <a:solidFill>
-                <a:srgbClr val="141717"/>
-              </a:solidFill>
-              <a:latin typeface="Lucida Console"/>
-              <a:cs typeface="Lucida Console"/>
-            </a:endParaRPr>
-          </a:p>
-          <a:p>
-            <a:pPr>
-              <a:buNone/>
-            </a:pPr>
+            <a:r>
+              <a:rPr lang="en-US" dirty="0" err="1" smtClean="0">
+                <a:solidFill>
+                  <a:srgbClr val="141717"/>
+                </a:solidFill>
+              </a:rPr>
+              <a:t>onCreate</a:t>
+            </a:r>
             <a:endParaRPr lang="en-US" dirty="0" smtClean="0">
               <a:solidFill>
                 <a:srgbClr val="141717"/>
@@ -10745,49 +10130,14 @@
             </a:endParaRPr>
           </a:p>
           <a:p>
-            <a:pPr>
-              <a:buNone/>
-            </a:pPr>
-            <a:r>
-              <a:rPr lang="en-US" dirty="0" smtClean="0">
-                <a:solidFill>
-                  <a:srgbClr val="141717"/>
-                </a:solidFill>
-              </a:rPr>
-              <a:t>Links</a:t>
-            </a:r>
-          </a:p>
-          <a:p>
-            <a:r>
-              <a:rPr lang="en-US" sz="2571" dirty="0" smtClean="0">
-                <a:solidFill>
-                  <a:srgbClr val="141717"/>
-                </a:solidFill>
-                <a:latin typeface="Lucida Console"/>
-                <a:hlinkClick r:id="rId3"/>
-              </a:rPr>
-              <a:t>http://www.mono-android.net</a:t>
-            </a:r>
-          </a:p>
-          <a:p>
-            <a:r>
-              <a:rPr lang="en-US" sz="2571" dirty="0" smtClean="0">
-                <a:solidFill>
-                  <a:srgbClr val="141717"/>
-                </a:solidFill>
-                <a:latin typeface="Lucida Console"/>
-                <a:hlinkClick r:id="rId4"/>
-              </a:rPr>
-              <a:t>http://developer.android.com/</a:t>
-            </a:r>
-            <a:endParaRPr lang="en-US" sz="2571" dirty="0" smtClean="0">
-              <a:solidFill>
-                <a:srgbClr val="141717"/>
-              </a:solidFill>
-              <a:latin typeface="Lucida Console"/>
-            </a:endParaRPr>
-          </a:p>
-          <a:p>
+            <a:r>
+              <a:rPr lang="en-US" dirty="0" err="1" smtClean="0">
+                <a:solidFill>
+                  <a:srgbClr val="141717"/>
+                </a:solidFill>
+              </a:rPr>
+              <a:t>onStart</a:t>
+            </a:r>
             <a:endParaRPr lang="en-US" dirty="0" smtClean="0">
               <a:solidFill>
                 <a:srgbClr val="141717"/>
@@ -10795,68 +10145,14 @@
             </a:endParaRPr>
           </a:p>
           <a:p>
-            <a:pPr>
-              <a:buNone/>
-            </a:pPr>
-            <a:r>
-              <a:rPr lang="en-US" dirty="0" smtClean="0">
-                <a:solidFill>
-                  <a:srgbClr val="141717"/>
-                </a:solidFill>
-              </a:rPr>
-              <a:t>IRC Support / Discussion</a:t>
-            </a:r>
-          </a:p>
-          <a:p>
-            <a:r>
-              <a:rPr lang="en-US" sz="2581" dirty="0" smtClean="0">
-                <a:solidFill>
-                  <a:srgbClr val="141717"/>
-                </a:solidFill>
-                <a:latin typeface="Lucida Console"/>
-                <a:cs typeface="Lucida Console"/>
-              </a:rPr>
-              <a:t>#</a:t>
-            </a:r>
-            <a:r>
-              <a:rPr lang="en-US" sz="2581" dirty="0" err="1" smtClean="0">
-                <a:solidFill>
-                  <a:srgbClr val="141717"/>
-                </a:solidFill>
-                <a:latin typeface="Lucida Console"/>
-                <a:cs typeface="Lucida Console"/>
-              </a:rPr>
-              <a:t>monodroid</a:t>
-            </a:r>
-            <a:r>
-              <a:rPr lang="en-US" sz="2581" dirty="0" smtClean="0">
-                <a:solidFill>
-                  <a:srgbClr val="141717"/>
-                </a:solidFill>
-                <a:latin typeface="Lucida Console"/>
-                <a:cs typeface="Lucida Console"/>
-              </a:rPr>
-              <a:t>  on </a:t>
-            </a:r>
-            <a:r>
-              <a:rPr lang="en-US" sz="2581" dirty="0" err="1" smtClean="0">
-                <a:solidFill>
-                  <a:srgbClr val="141717"/>
-                </a:solidFill>
-                <a:latin typeface="Lucida Console"/>
-                <a:cs typeface="Lucida Console"/>
-              </a:rPr>
-              <a:t>irc.gnome.org</a:t>
-            </a:r>
-            <a:endParaRPr lang="en-US" sz="2581" dirty="0" smtClean="0">
-              <a:solidFill>
-                <a:srgbClr val="141717"/>
-              </a:solidFill>
-              <a:latin typeface="Lucida Console"/>
-              <a:cs typeface="Lucida Console"/>
-            </a:endParaRPr>
-          </a:p>
-          <a:p>
+            <a:r>
+              <a:rPr lang="en-US" dirty="0" err="1" smtClean="0">
+                <a:solidFill>
+                  <a:srgbClr val="141717"/>
+                </a:solidFill>
+              </a:rPr>
+              <a:t>onResume</a:t>
+            </a:r>
             <a:endParaRPr lang="en-US" dirty="0" smtClean="0">
               <a:solidFill>
                 <a:srgbClr val="141717"/>
@@ -10864,51 +10160,189 @@
             </a:endParaRPr>
           </a:p>
           <a:p>
-            <a:pPr>
-              <a:buNone/>
-            </a:pPr>
-            <a:r>
-              <a:rPr lang="en-US" dirty="0" smtClean="0">
-                <a:solidFill>
-                  <a:srgbClr val="141717"/>
-                </a:solidFill>
-              </a:rPr>
-              <a:t>Code</a:t>
-            </a:r>
-          </a:p>
-          <a:p>
-            <a:r>
-              <a:rPr lang="en-US" sz="2571" dirty="0" smtClean="0">
-                <a:solidFill>
-                  <a:srgbClr val="141717"/>
-                </a:solidFill>
-                <a:latin typeface="Lucida Console"/>
-                <a:cs typeface="Lucida Console"/>
-                <a:hlinkClick r:id="rId5"/>
-              </a:rPr>
-              <a:t>https://github.com/mono/monodroid-samples</a:t>
-            </a:r>
-            <a:endParaRPr lang="en-US" sz="2571" dirty="0" smtClean="0">
+            <a:r>
+              <a:rPr lang="en-US" dirty="0" err="1" smtClean="0">
+                <a:solidFill>
+                  <a:srgbClr val="141717"/>
+                </a:solidFill>
+              </a:rPr>
+              <a:t>onPause</a:t>
+            </a:r>
+            <a:endParaRPr lang="en-US" dirty="0" smtClean="0">
               <a:solidFill>
                 <a:srgbClr val="141717"/>
               </a:solidFill>
-              <a:latin typeface="Lucida Console"/>
-              <a:cs typeface="Lucida Console"/>
             </a:endParaRPr>
           </a:p>
           <a:p>
             <a:r>
-              <a:rPr lang="en-US" sz="2571" dirty="0" smtClean="0">
-                <a:solidFill>
-                  <a:srgbClr val="141717"/>
-                </a:solidFill>
-                <a:latin typeface="Lucida Console"/>
-                <a:cs typeface="Lucida Console"/>
-                <a:hlinkClick r:id="rId6"/>
-              </a:rPr>
-              <a:t>https://github.com/kevinmcmahon/MonoDroid101</a:t>
-            </a:r>
-            <a:endParaRPr lang="en-US" sz="2400" dirty="0" smtClean="0">
+              <a:rPr lang="en-US" dirty="0" err="1" smtClean="0">
+                <a:solidFill>
+                  <a:srgbClr val="141717"/>
+                </a:solidFill>
+              </a:rPr>
+              <a:t>onStop</a:t>
+            </a:r>
+            <a:endParaRPr lang="en-US" dirty="0" smtClean="0">
+              <a:solidFill>
+                <a:srgbClr val="141717"/>
+              </a:solidFill>
+            </a:endParaRPr>
+          </a:p>
+          <a:p>
+            <a:r>
+              <a:rPr lang="en-US" dirty="0" err="1" smtClean="0">
+                <a:solidFill>
+                  <a:srgbClr val="141717"/>
+                </a:solidFill>
+              </a:rPr>
+              <a:t>onDestroy</a:t>
+            </a:r>
+            <a:endParaRPr lang="en-US" dirty="0" smtClean="0">
+              <a:solidFill>
+                <a:srgbClr val="141717"/>
+              </a:solidFill>
+            </a:endParaRPr>
+          </a:p>
+          <a:p>
+            <a:endParaRPr lang="en-US" dirty="0" smtClean="0">
+              <a:solidFill>
+                <a:srgbClr val="141717"/>
+              </a:solidFill>
+            </a:endParaRPr>
+          </a:p>
+          <a:p>
+            <a:endParaRPr lang="en-US" dirty="0" smtClean="0">
+              <a:solidFill>
+                <a:srgbClr val="141717"/>
+              </a:solidFill>
+            </a:endParaRPr>
+          </a:p>
+          <a:p>
+            <a:endParaRPr lang="en-US" dirty="0">
+              <a:solidFill>
+                <a:srgbClr val="141717"/>
+              </a:solidFill>
+            </a:endParaRPr>
+          </a:p>
+        </p:txBody>
+      </p:sp>
+    </p:spTree>
+  </p:cSld>
+  <p:clrMapOvr>
+    <a:masterClrMapping/>
+  </p:clrMapOvr>
+</p:sld>
+</file>
+
+<file path=ppt/slides/slide29.xml><?xml version="1.0" encoding="utf-8"?>
+<p:sld xmlns:a="http://schemas.openxmlformats.org/drawingml/2006/main" xmlns:r="http://schemas.openxmlformats.org/officeDocument/2006/relationships" xmlns:p="http://schemas.openxmlformats.org/presentationml/2006/main">
+  <p:cSld>
+    <p:spTree>
+      <p:nvGrpSpPr>
+        <p:cNvPr id="1" name=""/>
+        <p:cNvGrpSpPr/>
+        <p:nvPr/>
+      </p:nvGrpSpPr>
+      <p:grpSpPr>
+        <a:xfrm>
+          <a:off x="0" y="0"/>
+          <a:ext cx="0" cy="0"/>
+          <a:chOff x="0" y="0"/>
+          <a:chExt cx="0" cy="0"/>
+        </a:xfrm>
+      </p:grpSpPr>
+      <p:sp>
+        <p:nvSpPr>
+          <p:cNvPr id="2" name="Title 1"/>
+          <p:cNvSpPr>
+            <a:spLocks noGrp="1"/>
+          </p:cNvSpPr>
+          <p:nvPr>
+            <p:ph type="title"/>
+          </p:nvPr>
+        </p:nvSpPr>
+        <p:spPr/>
+        <p:txBody>
+          <a:bodyPr>
+            <a:normAutofit/>
+          </a:bodyPr>
+          <a:lstStyle/>
+          <a:p>
+            <a:r>
+              <a:rPr lang="en-US" dirty="0" smtClean="0">
+                <a:solidFill>
+                  <a:srgbClr val="141717"/>
+                </a:solidFill>
+                <a:latin typeface="Franklin Gothic Medium"/>
+                <a:cs typeface="Franklin Gothic Medium"/>
+              </a:rPr>
+              <a:t>Intents</a:t>
+            </a:r>
+          </a:p>
+        </p:txBody>
+      </p:sp>
+      <p:sp>
+        <p:nvSpPr>
+          <p:cNvPr id="3" name="Content Placeholder 2"/>
+          <p:cNvSpPr>
+            <a:spLocks noGrp="1"/>
+          </p:cNvSpPr>
+          <p:nvPr>
+            <p:ph idx="1"/>
+          </p:nvPr>
+        </p:nvSpPr>
+        <p:spPr/>
+        <p:txBody>
+          <a:bodyPr/>
+          <a:lstStyle/>
+          <a:p>
+            <a:r>
+              <a:rPr lang="en-US" dirty="0" err="1" smtClean="0">
+                <a:solidFill>
+                  <a:srgbClr val="141717"/>
+                </a:solidFill>
+              </a:rPr>
+              <a:t>Eventing</a:t>
+            </a:r>
+            <a:r>
+              <a:rPr lang="en-US" dirty="0" smtClean="0">
+                <a:solidFill>
+                  <a:srgbClr val="141717"/>
+                </a:solidFill>
+              </a:rPr>
+              <a:t> mechanism</a:t>
+            </a:r>
+          </a:p>
+          <a:p>
+            <a:r>
+              <a:rPr lang="en-US" dirty="0" smtClean="0">
+                <a:solidFill>
+                  <a:srgbClr val="141717"/>
+                </a:solidFill>
+              </a:rPr>
+              <a:t>Intent objects are passive data that is of interest to the component that is receiving the intent</a:t>
+            </a:r>
+          </a:p>
+          <a:p>
+            <a:r>
+              <a:rPr lang="en-US" dirty="0" smtClean="0">
+                <a:solidFill>
+                  <a:srgbClr val="141717"/>
+                </a:solidFill>
+              </a:rPr>
+              <a:t>Filterable so you can pick and choose which events to respond to</a:t>
+            </a:r>
+          </a:p>
+          <a:p>
+            <a:endParaRPr lang="en-US" dirty="0" smtClean="0">
+              <a:solidFill>
+                <a:srgbClr val="141717"/>
+              </a:solidFill>
+            </a:endParaRPr>
+          </a:p>
+          <a:p>
+            <a:endParaRPr lang="en-US" dirty="0" smtClean="0">
               <a:solidFill>
                 <a:srgbClr val="141717"/>
               </a:solidFill>
@@ -11030,38 +10464,989 @@
           </a:p>
         </p:txBody>
       </p:sp>
-      <p:sp>
-        <p:nvSpPr>
-          <p:cNvPr id="9" name="TextBox 8"/>
-          <p:cNvSpPr txBox="1"/>
-          <p:nvPr/>
-        </p:nvSpPr>
-        <p:spPr>
-          <a:xfrm>
-            <a:off x="1778000" y="2981158"/>
-            <a:ext cx="184666" cy="369332"/>
-          </a:xfrm>
-          <a:prstGeom prst="rect">
-            <a:avLst/>
-          </a:prstGeom>
-          <a:noFill/>
-        </p:spPr>
-        <p:txBody>
-          <a:bodyPr wrap="none" rtlCol="0">
-            <a:spAutoFit/>
-          </a:bodyPr>
-          <a:lstStyle/>
-          <a:p>
-            <a:endParaRPr lang="en-US" dirty="0"/>
-          </a:p>
-        </p:txBody>
-      </p:sp>
     </p:spTree>
     <p:extLst>
       <p:ext uri="{BB962C8B-B14F-4D97-AF65-F5344CB8AC3E}">
         <p14:creationId xmlns:p14="http://schemas.microsoft.com/office/powerpoint/2010/main" val="1847769883"/>
       </p:ext>
     </p:extLst>
+  </p:cSld>
+  <p:clrMapOvr>
+    <a:masterClrMapping/>
+  </p:clrMapOvr>
+</p:sld>
+</file>
+
+<file path=ppt/slides/slide30.xml><?xml version="1.0" encoding="utf-8"?>
+<p:sld xmlns:a="http://schemas.openxmlformats.org/drawingml/2006/main" xmlns:r="http://schemas.openxmlformats.org/officeDocument/2006/relationships" xmlns:p="http://schemas.openxmlformats.org/presentationml/2006/main">
+  <p:cSld>
+    <p:spTree>
+      <p:nvGrpSpPr>
+        <p:cNvPr id="1" name=""/>
+        <p:cNvGrpSpPr/>
+        <p:nvPr/>
+      </p:nvGrpSpPr>
+      <p:grpSpPr>
+        <a:xfrm>
+          <a:off x="0" y="0"/>
+          <a:ext cx="0" cy="0"/>
+          <a:chOff x="0" y="0"/>
+          <a:chExt cx="0" cy="0"/>
+        </a:xfrm>
+      </p:grpSpPr>
+      <p:sp>
+        <p:nvSpPr>
+          <p:cNvPr id="2" name="Title 1"/>
+          <p:cNvSpPr>
+            <a:spLocks noGrp="1"/>
+          </p:cNvSpPr>
+          <p:nvPr>
+            <p:ph type="title"/>
+          </p:nvPr>
+        </p:nvSpPr>
+        <p:spPr/>
+        <p:txBody>
+          <a:bodyPr/>
+          <a:lstStyle/>
+          <a:p>
+            <a:r>
+              <a:rPr lang="en-US" dirty="0" smtClean="0">
+                <a:solidFill>
+                  <a:srgbClr val="141717"/>
+                </a:solidFill>
+                <a:latin typeface="Franklin Gothic Medium"/>
+                <a:cs typeface="Franklin Gothic Medium"/>
+              </a:rPr>
+              <a:t>Services</a:t>
+            </a:r>
+          </a:p>
+        </p:txBody>
+      </p:sp>
+      <p:sp>
+        <p:nvSpPr>
+          <p:cNvPr id="3" name="Content Placeholder 2"/>
+          <p:cNvSpPr>
+            <a:spLocks noGrp="1"/>
+          </p:cNvSpPr>
+          <p:nvPr>
+            <p:ph idx="1"/>
+          </p:nvPr>
+        </p:nvSpPr>
+        <p:spPr/>
+        <p:txBody>
+          <a:bodyPr/>
+          <a:lstStyle/>
+          <a:p>
+            <a:r>
+              <a:rPr lang="en-US" dirty="0" smtClean="0">
+                <a:solidFill>
+                  <a:srgbClr val="141717"/>
+                </a:solidFill>
+              </a:rPr>
+              <a:t>Android service are what you’d expect.</a:t>
+            </a:r>
+          </a:p>
+          <a:p>
+            <a:r>
+              <a:rPr lang="en-US" dirty="0" smtClean="0">
+                <a:solidFill>
+                  <a:srgbClr val="141717"/>
+                </a:solidFill>
+              </a:rPr>
+              <a:t>Possible to bind to an ongoing service and communicate via exposed interface</a:t>
+            </a:r>
+          </a:p>
+          <a:p>
+            <a:r>
+              <a:rPr lang="en-US" dirty="0" smtClean="0">
+                <a:solidFill>
+                  <a:srgbClr val="141717"/>
+                </a:solidFill>
+              </a:rPr>
+              <a:t>Runs in main application process but doesn’t block other components or UI</a:t>
+            </a:r>
+          </a:p>
+          <a:p>
+            <a:endParaRPr lang="en-US" dirty="0" smtClean="0">
+              <a:solidFill>
+                <a:srgbClr val="141717"/>
+              </a:solidFill>
+            </a:endParaRPr>
+          </a:p>
+          <a:p>
+            <a:endParaRPr lang="en-US" dirty="0">
+              <a:solidFill>
+                <a:srgbClr val="141717"/>
+              </a:solidFill>
+            </a:endParaRPr>
+          </a:p>
+        </p:txBody>
+      </p:sp>
+    </p:spTree>
+    <p:extLst>
+      <p:ext uri="{BB962C8B-B14F-4D97-AF65-F5344CB8AC3E}">
+        <p14:creationId xmlns:p14="http://schemas.microsoft.com/office/powerpoint/2010/main" val="847587006"/>
+      </p:ext>
+    </p:extLst>
+  </p:cSld>
+  <p:clrMapOvr>
+    <a:masterClrMapping/>
+  </p:clrMapOvr>
+</p:sld>
+</file>
+
+<file path=ppt/slides/slide31.xml><?xml version="1.0" encoding="utf-8"?>
+<p:sld xmlns:a="http://schemas.openxmlformats.org/drawingml/2006/main" xmlns:r="http://schemas.openxmlformats.org/officeDocument/2006/relationships" xmlns:p="http://schemas.openxmlformats.org/presentationml/2006/main">
+  <p:cSld>
+    <p:spTree>
+      <p:nvGrpSpPr>
+        <p:cNvPr id="1" name=""/>
+        <p:cNvGrpSpPr/>
+        <p:nvPr/>
+      </p:nvGrpSpPr>
+      <p:grpSpPr>
+        <a:xfrm>
+          <a:off x="0" y="0"/>
+          <a:ext cx="0" cy="0"/>
+          <a:chOff x="0" y="0"/>
+          <a:chExt cx="0" cy="0"/>
+        </a:xfrm>
+      </p:grpSpPr>
+      <p:sp>
+        <p:nvSpPr>
+          <p:cNvPr id="2" name="Title 1"/>
+          <p:cNvSpPr>
+            <a:spLocks noGrp="1"/>
+          </p:cNvSpPr>
+          <p:nvPr>
+            <p:ph type="title"/>
+          </p:nvPr>
+        </p:nvSpPr>
+        <p:spPr/>
+        <p:txBody>
+          <a:bodyPr/>
+          <a:lstStyle/>
+          <a:p>
+            <a:r>
+              <a:rPr lang="en-US" dirty="0" smtClean="0">
+                <a:solidFill>
+                  <a:srgbClr val="141717"/>
+                </a:solidFill>
+                <a:latin typeface="Franklin Gothic Medium"/>
+                <a:cs typeface="Franklin Gothic Medium"/>
+              </a:rPr>
+              <a:t>Content</a:t>
+            </a:r>
+            <a:r>
+              <a:rPr lang="en-US" dirty="0" smtClean="0">
+                <a:solidFill>
+                  <a:srgbClr val="141717"/>
+                </a:solidFill>
+              </a:rPr>
+              <a:t> </a:t>
+            </a:r>
+            <a:r>
+              <a:rPr lang="en-US" dirty="0" smtClean="0">
+                <a:solidFill>
+                  <a:srgbClr val="141717"/>
+                </a:solidFill>
+                <a:latin typeface="Franklin Gothic Medium"/>
+                <a:cs typeface="Franklin Gothic Medium"/>
+              </a:rPr>
+              <a:t>Providers</a:t>
+            </a:r>
+          </a:p>
+        </p:txBody>
+      </p:sp>
+      <p:sp>
+        <p:nvSpPr>
+          <p:cNvPr id="3" name="Content Placeholder 2"/>
+          <p:cNvSpPr>
+            <a:spLocks noGrp="1"/>
+          </p:cNvSpPr>
+          <p:nvPr>
+            <p:ph idx="1"/>
+          </p:nvPr>
+        </p:nvSpPr>
+        <p:spPr/>
+        <p:txBody>
+          <a:bodyPr/>
+          <a:lstStyle/>
+          <a:p>
+            <a:r>
+              <a:rPr lang="en-US" dirty="0" err="1" smtClean="0">
+                <a:solidFill>
+                  <a:srgbClr val="141717"/>
+                </a:solidFill>
+              </a:rPr>
+              <a:t>Queryable</a:t>
+            </a:r>
+            <a:r>
+              <a:rPr lang="en-US" dirty="0" smtClean="0">
+                <a:solidFill>
+                  <a:srgbClr val="141717"/>
+                </a:solidFill>
+              </a:rPr>
+              <a:t> application data stores</a:t>
+            </a:r>
+          </a:p>
+          <a:p>
+            <a:r>
+              <a:rPr lang="en-US" dirty="0" smtClean="0">
+                <a:solidFill>
+                  <a:srgbClr val="141717"/>
+                </a:solidFill>
+              </a:rPr>
+              <a:t>Only way to share data amongst other apps</a:t>
+            </a:r>
+          </a:p>
+          <a:p>
+            <a:r>
+              <a:rPr lang="en-US" dirty="0" smtClean="0">
+                <a:solidFill>
+                  <a:srgbClr val="141717"/>
+                </a:solidFill>
+              </a:rPr>
+              <a:t>Android ships with common providers</a:t>
+            </a:r>
+          </a:p>
+          <a:p>
+            <a:pPr lvl="1"/>
+            <a:r>
+              <a:rPr lang="en-US" dirty="0" smtClean="0">
+                <a:solidFill>
+                  <a:srgbClr val="141717"/>
+                </a:solidFill>
+              </a:rPr>
+              <a:t>Audio, video, images, contacts, etc.</a:t>
+            </a:r>
+          </a:p>
+          <a:p>
+            <a:r>
+              <a:rPr lang="en-US" dirty="0" smtClean="0">
+                <a:solidFill>
+                  <a:srgbClr val="141717"/>
+                </a:solidFill>
+              </a:rPr>
+              <a:t>Making your application’s data public</a:t>
+            </a:r>
+          </a:p>
+          <a:p>
+            <a:pPr lvl="1"/>
+            <a:r>
+              <a:rPr lang="en-US" dirty="0" smtClean="0">
+                <a:solidFill>
+                  <a:srgbClr val="141717"/>
+                </a:solidFill>
+              </a:rPr>
+              <a:t>Create a new provider</a:t>
+            </a:r>
+          </a:p>
+          <a:p>
+            <a:pPr lvl="1"/>
+            <a:r>
+              <a:rPr lang="en-US" dirty="0" smtClean="0">
+                <a:solidFill>
+                  <a:srgbClr val="141717"/>
+                </a:solidFill>
+              </a:rPr>
+              <a:t>Add your data to existing provider</a:t>
+            </a:r>
+          </a:p>
+        </p:txBody>
+      </p:sp>
+    </p:spTree>
+  </p:cSld>
+  <p:clrMapOvr>
+    <a:masterClrMapping/>
+  </p:clrMapOvr>
+</p:sld>
+</file>
+
+<file path=ppt/slides/slide32.xml><?xml version="1.0" encoding="utf-8"?>
+<p:sld xmlns:a="http://schemas.openxmlformats.org/drawingml/2006/main" xmlns:r="http://schemas.openxmlformats.org/officeDocument/2006/relationships" xmlns:p="http://schemas.openxmlformats.org/presentationml/2006/main">
+  <p:cSld>
+    <p:spTree>
+      <p:nvGrpSpPr>
+        <p:cNvPr id="1" name=""/>
+        <p:cNvGrpSpPr/>
+        <p:nvPr/>
+      </p:nvGrpSpPr>
+      <p:grpSpPr>
+        <a:xfrm>
+          <a:off x="0" y="0"/>
+          <a:ext cx="0" cy="0"/>
+          <a:chOff x="0" y="0"/>
+          <a:chExt cx="0" cy="0"/>
+        </a:xfrm>
+      </p:grpSpPr>
+      <p:sp>
+        <p:nvSpPr>
+          <p:cNvPr id="2" name="Title 1"/>
+          <p:cNvSpPr>
+            <a:spLocks noGrp="1"/>
+          </p:cNvSpPr>
+          <p:nvPr>
+            <p:ph type="title"/>
+          </p:nvPr>
+        </p:nvSpPr>
+        <p:spPr/>
+        <p:txBody>
+          <a:bodyPr/>
+          <a:lstStyle/>
+          <a:p>
+            <a:r>
+              <a:rPr lang="en-US" dirty="0" smtClean="0"/>
+              <a:t>Content </a:t>
+            </a:r>
+            <a:r>
+              <a:rPr lang="en-US" smtClean="0"/>
+              <a:t>Provider Layer</a:t>
+            </a:r>
+            <a:endParaRPr lang="en-US"/>
+          </a:p>
+        </p:txBody>
+      </p:sp>
+      <p:graphicFrame>
+        <p:nvGraphicFramePr>
+          <p:cNvPr id="3" name="Diagram 2"/>
+          <p:cNvGraphicFramePr/>
+          <p:nvPr/>
+        </p:nvGraphicFramePr>
+        <p:xfrm>
+          <a:off x="723900" y="1905000"/>
+          <a:ext cx="7696200" cy="3048000"/>
+        </p:xfrm>
+        <a:graphic>
+          <a:graphicData uri="http://schemas.openxmlformats.org/drawingml/2006/diagram">
+            <dgm:relIds xmlns:dgm="http://schemas.openxmlformats.org/drawingml/2006/diagram" xmlns:r="http://schemas.openxmlformats.org/officeDocument/2006/relationships" r:dm="rId2" r:lo="rId3" r:qs="rId4" r:cs="rId5"/>
+          </a:graphicData>
+        </a:graphic>
+      </p:graphicFrame>
+    </p:spTree>
+    <p:extLst>
+      <p:ext uri="{BB962C8B-B14F-4D97-AF65-F5344CB8AC3E}">
+        <p14:creationId xmlns:p14="http://schemas.microsoft.com/office/powerpoint/2010/main" val="554593828"/>
+      </p:ext>
+    </p:extLst>
+  </p:cSld>
+  <p:clrMapOvr>
+    <a:masterClrMapping/>
+  </p:clrMapOvr>
+</p:sld>
+</file>
+
+<file path=ppt/slides/slide33.xml><?xml version="1.0" encoding="utf-8"?>
+<p:sld xmlns:a="http://schemas.openxmlformats.org/drawingml/2006/main" xmlns:r="http://schemas.openxmlformats.org/officeDocument/2006/relationships" xmlns:p="http://schemas.openxmlformats.org/presentationml/2006/main">
+  <p:cSld>
+    <p:spTree>
+      <p:nvGrpSpPr>
+        <p:cNvPr id="1" name=""/>
+        <p:cNvGrpSpPr/>
+        <p:nvPr/>
+      </p:nvGrpSpPr>
+      <p:grpSpPr>
+        <a:xfrm>
+          <a:off x="0" y="0"/>
+          <a:ext cx="0" cy="0"/>
+          <a:chOff x="0" y="0"/>
+          <a:chExt cx="0" cy="0"/>
+        </a:xfrm>
+      </p:grpSpPr>
+      <p:sp>
+        <p:nvSpPr>
+          <p:cNvPr id="2" name="Title 1"/>
+          <p:cNvSpPr>
+            <a:spLocks noGrp="1"/>
+          </p:cNvSpPr>
+          <p:nvPr>
+            <p:ph type="title"/>
+          </p:nvPr>
+        </p:nvSpPr>
+        <p:spPr/>
+        <p:txBody>
+          <a:bodyPr>
+            <a:normAutofit/>
+          </a:bodyPr>
+          <a:lstStyle/>
+          <a:p>
+            <a:r>
+              <a:rPr lang="en-US" dirty="0" smtClean="0">
+                <a:solidFill>
+                  <a:srgbClr val="141717"/>
+                </a:solidFill>
+                <a:latin typeface="Franklin Gothic Medium"/>
+                <a:cs typeface="Franklin Gothic Medium"/>
+              </a:rPr>
+              <a:t>Resources</a:t>
+            </a:r>
+          </a:p>
+        </p:txBody>
+      </p:sp>
+      <p:sp>
+        <p:nvSpPr>
+          <p:cNvPr id="3" name="Content Placeholder 2"/>
+          <p:cNvSpPr>
+            <a:spLocks noGrp="1"/>
+          </p:cNvSpPr>
+          <p:nvPr>
+            <p:ph idx="1"/>
+          </p:nvPr>
+        </p:nvSpPr>
+        <p:spPr/>
+        <p:txBody>
+          <a:bodyPr>
+            <a:normAutofit fontScale="92500" lnSpcReduction="20000"/>
+          </a:bodyPr>
+          <a:lstStyle/>
+          <a:p>
+            <a:pPr>
+              <a:lnSpc>
+                <a:spcPct val="150000"/>
+              </a:lnSpc>
+            </a:pPr>
+            <a:r>
+              <a:rPr lang="en-US" dirty="0" smtClean="0">
+                <a:solidFill>
+                  <a:srgbClr val="141717"/>
+                </a:solidFill>
+              </a:rPr>
+              <a:t>Images, layout descriptions, binary blobs and string dictionaries</a:t>
+            </a:r>
+          </a:p>
+          <a:p>
+            <a:pPr>
+              <a:lnSpc>
+                <a:spcPct val="150000"/>
+              </a:lnSpc>
+            </a:pPr>
+            <a:r>
+              <a:rPr lang="en-US" dirty="0" smtClean="0">
+                <a:solidFill>
+                  <a:srgbClr val="141717"/>
+                </a:solidFill>
+              </a:rPr>
+              <a:t>Abstraction layer which helps decouples code</a:t>
+            </a:r>
+          </a:p>
+          <a:p>
+            <a:pPr>
+              <a:lnSpc>
+                <a:spcPct val="150000"/>
+              </a:lnSpc>
+            </a:pPr>
+            <a:r>
+              <a:rPr lang="en-US" dirty="0" smtClean="0">
+                <a:solidFill>
+                  <a:srgbClr val="141717"/>
+                </a:solidFill>
+              </a:rPr>
+              <a:t>Makes managing assets easier</a:t>
+            </a:r>
+          </a:p>
+          <a:p>
+            <a:pPr lvl="1">
+              <a:lnSpc>
+                <a:spcPct val="150000"/>
+              </a:lnSpc>
+            </a:pPr>
+            <a:r>
+              <a:rPr lang="en-US" dirty="0" smtClean="0">
+                <a:solidFill>
+                  <a:srgbClr val="141717"/>
+                </a:solidFill>
+              </a:rPr>
+              <a:t>Localization</a:t>
+            </a:r>
+          </a:p>
+          <a:p>
+            <a:pPr lvl="1">
+              <a:lnSpc>
+                <a:spcPct val="150000"/>
+              </a:lnSpc>
+            </a:pPr>
+            <a:r>
+              <a:rPr lang="en-US" dirty="0" smtClean="0">
+                <a:solidFill>
+                  <a:srgbClr val="141717"/>
+                </a:solidFill>
+              </a:rPr>
+              <a:t>Multiple displays</a:t>
+            </a:r>
+          </a:p>
+          <a:p>
+            <a:pPr lvl="1">
+              <a:lnSpc>
+                <a:spcPct val="150000"/>
+              </a:lnSpc>
+            </a:pPr>
+            <a:r>
+              <a:rPr lang="en-US" dirty="0" smtClean="0">
+                <a:solidFill>
+                  <a:srgbClr val="141717"/>
+                </a:solidFill>
+              </a:rPr>
+              <a:t>Different hardware configurations</a:t>
+            </a:r>
+          </a:p>
+        </p:txBody>
+      </p:sp>
+    </p:spTree>
+  </p:cSld>
+  <p:clrMapOvr>
+    <a:masterClrMapping/>
+  </p:clrMapOvr>
+</p:sld>
+</file>
+
+<file path=ppt/slides/slide34.xml><?xml version="1.0" encoding="utf-8"?>
+<p:sld xmlns:a="http://schemas.openxmlformats.org/drawingml/2006/main" xmlns:r="http://schemas.openxmlformats.org/officeDocument/2006/relationships" xmlns:p="http://schemas.openxmlformats.org/presentationml/2006/main">
+  <p:cSld>
+    <p:spTree>
+      <p:nvGrpSpPr>
+        <p:cNvPr id="1" name=""/>
+        <p:cNvGrpSpPr/>
+        <p:nvPr/>
+      </p:nvGrpSpPr>
+      <p:grpSpPr>
+        <a:xfrm>
+          <a:off x="0" y="0"/>
+          <a:ext cx="0" cy="0"/>
+          <a:chOff x="0" y="0"/>
+          <a:chExt cx="0" cy="0"/>
+        </a:xfrm>
+      </p:grpSpPr>
+      <p:sp>
+        <p:nvSpPr>
+          <p:cNvPr id="2" name="Title 1"/>
+          <p:cNvSpPr>
+            <a:spLocks noGrp="1"/>
+          </p:cNvSpPr>
+          <p:nvPr>
+            <p:ph type="title"/>
+          </p:nvPr>
+        </p:nvSpPr>
+        <p:spPr/>
+        <p:txBody>
+          <a:bodyPr>
+            <a:normAutofit/>
+          </a:bodyPr>
+          <a:lstStyle/>
+          <a:p>
+            <a:r>
+              <a:rPr lang="en-US" dirty="0" smtClean="0">
+                <a:solidFill>
+                  <a:srgbClr val="141717"/>
+                </a:solidFill>
+                <a:latin typeface="Franklin Gothic Medium"/>
+                <a:cs typeface="Franklin Gothic Medium"/>
+              </a:rPr>
+              <a:t>Code Demo</a:t>
+            </a:r>
+          </a:p>
+        </p:txBody>
+      </p:sp>
+      <p:sp>
+        <p:nvSpPr>
+          <p:cNvPr id="3" name="Content Placeholder 2"/>
+          <p:cNvSpPr>
+            <a:spLocks noGrp="1"/>
+          </p:cNvSpPr>
+          <p:nvPr>
+            <p:ph idx="1"/>
+          </p:nvPr>
+        </p:nvSpPr>
+        <p:spPr/>
+        <p:txBody>
+          <a:bodyPr>
+            <a:normAutofit/>
+          </a:bodyPr>
+          <a:lstStyle/>
+          <a:p>
+            <a:endParaRPr lang="en-US" dirty="0" smtClean="0"/>
+          </a:p>
+          <a:p>
+            <a:endParaRPr lang="en-US" dirty="0" smtClean="0"/>
+          </a:p>
+          <a:p>
+            <a:pPr>
+              <a:buNone/>
+            </a:pPr>
+            <a:endParaRPr lang="en-US" dirty="0" smtClean="0"/>
+          </a:p>
+          <a:p>
+            <a:pPr algn="ctr">
+              <a:buNone/>
+            </a:pPr>
+            <a:r>
+              <a:rPr lang="en-US" sz="2000" dirty="0" smtClean="0">
+                <a:latin typeface="Lucida Console" pitchFamily="49" charset="0"/>
+                <a:hlinkClick r:id="rId3"/>
+              </a:rPr>
+              <a:t>https://github.com/kevinmcmahon/MonoDroid101</a:t>
+            </a:r>
+            <a:endParaRPr lang="en-US" sz="2000" dirty="0" smtClean="0">
+              <a:latin typeface="Lucida Console" pitchFamily="49" charset="0"/>
+            </a:endParaRPr>
+          </a:p>
+        </p:txBody>
+      </p:sp>
+    </p:spTree>
+  </p:cSld>
+  <p:clrMapOvr>
+    <a:masterClrMapping/>
+  </p:clrMapOvr>
+</p:sld>
+</file>
+
+<file path=ppt/slides/slide35.xml><?xml version="1.0" encoding="utf-8"?>
+<p:sld xmlns:a="http://schemas.openxmlformats.org/drawingml/2006/main" xmlns:r="http://schemas.openxmlformats.org/officeDocument/2006/relationships" xmlns:p="http://schemas.openxmlformats.org/presentationml/2006/main">
+  <p:cSld>
+    <p:spTree>
+      <p:nvGrpSpPr>
+        <p:cNvPr id="1" name=""/>
+        <p:cNvGrpSpPr/>
+        <p:nvPr/>
+      </p:nvGrpSpPr>
+      <p:grpSpPr>
+        <a:xfrm>
+          <a:off x="0" y="0"/>
+          <a:ext cx="0" cy="0"/>
+          <a:chOff x="0" y="0"/>
+          <a:chExt cx="0" cy="0"/>
+        </a:xfrm>
+      </p:grpSpPr>
+      <p:sp>
+        <p:nvSpPr>
+          <p:cNvPr id="2" name="Title 1"/>
+          <p:cNvSpPr>
+            <a:spLocks noGrp="1"/>
+          </p:cNvSpPr>
+          <p:nvPr>
+            <p:ph type="title"/>
+          </p:nvPr>
+        </p:nvSpPr>
+        <p:spPr/>
+        <p:txBody>
+          <a:bodyPr/>
+          <a:lstStyle/>
+          <a:p>
+            <a:r>
+              <a:rPr lang="en-US" dirty="0" smtClean="0">
+                <a:solidFill>
+                  <a:srgbClr val="141717"/>
+                </a:solidFill>
+                <a:latin typeface="Franklin Gothic Medium"/>
+                <a:cs typeface="Franklin Gothic Medium"/>
+              </a:rPr>
+              <a:t>Mono </a:t>
+            </a:r>
+            <a:r>
+              <a:rPr lang="en-US" smtClean="0">
+                <a:solidFill>
+                  <a:srgbClr val="141717"/>
+                </a:solidFill>
+                <a:latin typeface="Franklin Gothic Medium"/>
+                <a:cs typeface="Franklin Gothic Medium"/>
+              </a:rPr>
+              <a:t>for Android </a:t>
+            </a:r>
+            <a:r>
+              <a:rPr lang="en-US" dirty="0" smtClean="0">
+                <a:solidFill>
+                  <a:srgbClr val="141717"/>
+                </a:solidFill>
+                <a:latin typeface="Franklin Gothic Medium"/>
+                <a:cs typeface="Franklin Gothic Medium"/>
+              </a:rPr>
+              <a:t>Resources</a:t>
+            </a:r>
+            <a:endParaRPr lang="en-US" dirty="0">
+              <a:solidFill>
+                <a:srgbClr val="141717"/>
+              </a:solidFill>
+              <a:latin typeface="Franklin Gothic Medium"/>
+              <a:cs typeface="Franklin Gothic Medium"/>
+            </a:endParaRPr>
+          </a:p>
+        </p:txBody>
+      </p:sp>
+      <p:sp>
+        <p:nvSpPr>
+          <p:cNvPr id="3" name="Content Placeholder 2"/>
+          <p:cNvSpPr>
+            <a:spLocks noGrp="1"/>
+          </p:cNvSpPr>
+          <p:nvPr>
+            <p:ph idx="1"/>
+          </p:nvPr>
+        </p:nvSpPr>
+        <p:spPr/>
+        <p:txBody>
+          <a:bodyPr>
+            <a:normAutofit fontScale="70000" lnSpcReduction="20000"/>
+          </a:bodyPr>
+          <a:lstStyle/>
+          <a:p>
+            <a:pPr>
+              <a:buNone/>
+            </a:pPr>
+            <a:r>
+              <a:rPr lang="en-US" dirty="0" smtClean="0">
+                <a:solidFill>
+                  <a:srgbClr val="141717"/>
+                </a:solidFill>
+              </a:rPr>
+              <a:t>Download the Preview!</a:t>
+            </a:r>
+          </a:p>
+          <a:p>
+            <a:r>
+              <a:rPr lang="en-US" dirty="0" smtClean="0">
+                <a:solidFill>
+                  <a:srgbClr val="141717"/>
+                </a:solidFill>
+                <a:latin typeface="Lucida Console"/>
+                <a:cs typeface="Lucida Console"/>
+                <a:hlinkClick r:id="rId2"/>
+              </a:rPr>
+              <a:t>http:</a:t>
+            </a:r>
+            <a:r>
+              <a:rPr lang="en-US" dirty="0">
+                <a:solidFill>
+                  <a:srgbClr val="141717"/>
+                </a:solidFill>
+                <a:latin typeface="Lucida Console"/>
+                <a:cs typeface="Lucida Console"/>
+                <a:hlinkClick r:id="rId2"/>
+              </a:rPr>
+              <a:t>/</a:t>
+            </a:r>
+            <a:r>
+              <a:rPr lang="en-US" dirty="0" smtClean="0">
+                <a:solidFill>
+                  <a:srgbClr val="141717"/>
+                </a:solidFill>
+                <a:latin typeface="Lucida Console"/>
+                <a:cs typeface="Lucida Console"/>
+                <a:hlinkClick r:id="rId2"/>
+              </a:rPr>
+              <a:t>/mono</a:t>
+            </a:r>
+            <a:r>
+              <a:rPr lang="en-US" dirty="0">
+                <a:solidFill>
+                  <a:srgbClr val="141717"/>
+                </a:solidFill>
+                <a:latin typeface="Lucida Console"/>
+                <a:cs typeface="Lucida Console"/>
+                <a:hlinkClick r:id="rId2"/>
+              </a:rPr>
+              <a:t>-</a:t>
+            </a:r>
+            <a:r>
+              <a:rPr lang="en-US" dirty="0" smtClean="0">
+                <a:solidFill>
+                  <a:srgbClr val="141717"/>
+                </a:solidFill>
+                <a:latin typeface="Lucida Console"/>
+                <a:cs typeface="Lucida Console"/>
+                <a:hlinkClick r:id="rId2"/>
+              </a:rPr>
+              <a:t>android.net/Welcome</a:t>
+            </a:r>
+            <a:endParaRPr lang="en-US" dirty="0" smtClean="0">
+              <a:solidFill>
+                <a:srgbClr val="141717"/>
+              </a:solidFill>
+              <a:latin typeface="Lucida Console"/>
+              <a:cs typeface="Lucida Console"/>
+            </a:endParaRPr>
+          </a:p>
+          <a:p>
+            <a:pPr>
+              <a:buNone/>
+            </a:pPr>
+            <a:endParaRPr lang="en-US" dirty="0" smtClean="0">
+              <a:solidFill>
+                <a:srgbClr val="141717"/>
+              </a:solidFill>
+            </a:endParaRPr>
+          </a:p>
+          <a:p>
+            <a:pPr>
+              <a:buNone/>
+            </a:pPr>
+            <a:r>
+              <a:rPr lang="en-US" dirty="0" smtClean="0">
+                <a:solidFill>
+                  <a:srgbClr val="141717"/>
+                </a:solidFill>
+              </a:rPr>
+              <a:t>Links</a:t>
+            </a:r>
+          </a:p>
+          <a:p>
+            <a:r>
+              <a:rPr lang="en-US" sz="2571" dirty="0" smtClean="0">
+                <a:solidFill>
+                  <a:srgbClr val="141717"/>
+                </a:solidFill>
+                <a:latin typeface="Lucida Console"/>
+                <a:hlinkClick r:id="rId3"/>
+              </a:rPr>
+              <a:t>http://www.mono-android.net</a:t>
+            </a:r>
+          </a:p>
+          <a:p>
+            <a:r>
+              <a:rPr lang="en-US" sz="2571" dirty="0" smtClean="0">
+                <a:solidFill>
+                  <a:srgbClr val="141717"/>
+                </a:solidFill>
+                <a:latin typeface="Lucida Console"/>
+                <a:hlinkClick r:id="rId4"/>
+              </a:rPr>
+              <a:t>http://developer.android.com/</a:t>
+            </a:r>
+            <a:endParaRPr lang="en-US" sz="2571" dirty="0" smtClean="0">
+              <a:solidFill>
+                <a:srgbClr val="141717"/>
+              </a:solidFill>
+              <a:latin typeface="Lucida Console"/>
+            </a:endParaRPr>
+          </a:p>
+          <a:p>
+            <a:endParaRPr lang="en-US" dirty="0" smtClean="0">
+              <a:solidFill>
+                <a:srgbClr val="141717"/>
+              </a:solidFill>
+            </a:endParaRPr>
+          </a:p>
+          <a:p>
+            <a:pPr>
+              <a:buNone/>
+            </a:pPr>
+            <a:r>
+              <a:rPr lang="en-US" dirty="0" smtClean="0">
+                <a:solidFill>
+                  <a:srgbClr val="141717"/>
+                </a:solidFill>
+              </a:rPr>
+              <a:t>IRC Support / Discussion</a:t>
+            </a:r>
+          </a:p>
+          <a:p>
+            <a:r>
+              <a:rPr lang="en-US" sz="2581" dirty="0" smtClean="0">
+                <a:solidFill>
+                  <a:srgbClr val="141717"/>
+                </a:solidFill>
+                <a:latin typeface="Lucida Console"/>
+                <a:cs typeface="Lucida Console"/>
+              </a:rPr>
+              <a:t>#</a:t>
+            </a:r>
+            <a:r>
+              <a:rPr lang="en-US" sz="2581" dirty="0" err="1" smtClean="0">
+                <a:solidFill>
+                  <a:srgbClr val="141717"/>
+                </a:solidFill>
+                <a:latin typeface="Lucida Console"/>
+                <a:cs typeface="Lucida Console"/>
+              </a:rPr>
+              <a:t>monodroid</a:t>
+            </a:r>
+            <a:r>
+              <a:rPr lang="en-US" sz="2581" dirty="0" smtClean="0">
+                <a:solidFill>
+                  <a:srgbClr val="141717"/>
+                </a:solidFill>
+                <a:latin typeface="Lucida Console"/>
+                <a:cs typeface="Lucida Console"/>
+              </a:rPr>
+              <a:t>  on </a:t>
+            </a:r>
+            <a:r>
+              <a:rPr lang="en-US" sz="2581" dirty="0" err="1" smtClean="0">
+                <a:solidFill>
+                  <a:srgbClr val="141717"/>
+                </a:solidFill>
+                <a:latin typeface="Lucida Console"/>
+                <a:cs typeface="Lucida Console"/>
+              </a:rPr>
+              <a:t>irc.gnome.org</a:t>
+            </a:r>
+            <a:endParaRPr lang="en-US" sz="2581" dirty="0" smtClean="0">
+              <a:solidFill>
+                <a:srgbClr val="141717"/>
+              </a:solidFill>
+              <a:latin typeface="Lucida Console"/>
+              <a:cs typeface="Lucida Console"/>
+            </a:endParaRPr>
+          </a:p>
+          <a:p>
+            <a:endParaRPr lang="en-US" dirty="0" smtClean="0">
+              <a:solidFill>
+                <a:srgbClr val="141717"/>
+              </a:solidFill>
+            </a:endParaRPr>
+          </a:p>
+          <a:p>
+            <a:pPr>
+              <a:buNone/>
+            </a:pPr>
+            <a:r>
+              <a:rPr lang="en-US" dirty="0" smtClean="0">
+                <a:solidFill>
+                  <a:srgbClr val="141717"/>
+                </a:solidFill>
+              </a:rPr>
+              <a:t>Code</a:t>
+            </a:r>
+          </a:p>
+          <a:p>
+            <a:r>
+              <a:rPr lang="en-US" sz="2571" dirty="0" smtClean="0">
+                <a:solidFill>
+                  <a:srgbClr val="141717"/>
+                </a:solidFill>
+                <a:latin typeface="Lucida Console"/>
+                <a:cs typeface="Lucida Console"/>
+                <a:hlinkClick r:id="rId5"/>
+              </a:rPr>
+              <a:t>https://github.com/mono/monodroid-samples</a:t>
+            </a:r>
+            <a:endParaRPr lang="en-US" sz="2571" dirty="0" smtClean="0">
+              <a:solidFill>
+                <a:srgbClr val="141717"/>
+              </a:solidFill>
+              <a:latin typeface="Lucida Console"/>
+              <a:cs typeface="Lucida Console"/>
+            </a:endParaRPr>
+          </a:p>
+          <a:p>
+            <a:r>
+              <a:rPr lang="en-US" sz="2571" dirty="0" smtClean="0">
+                <a:solidFill>
+                  <a:srgbClr val="141717"/>
+                </a:solidFill>
+                <a:latin typeface="Lucida Console"/>
+                <a:cs typeface="Lucida Console"/>
+                <a:hlinkClick r:id="rId6"/>
+              </a:rPr>
+              <a:t>https://github.com/kevinmcmahon/MonoDroid101</a:t>
+            </a:r>
+            <a:endParaRPr lang="en-US" sz="2400" dirty="0" smtClean="0">
+              <a:solidFill>
+                <a:srgbClr val="141717"/>
+              </a:solidFill>
+            </a:endParaRPr>
+          </a:p>
+        </p:txBody>
+      </p:sp>
+    </p:spTree>
   </p:cSld>
   <p:clrMapOvr>
     <a:masterClrMapping/>

</xml_diff>